<commit_message>
after meeting with micha
</commit_message>
<xml_diff>
--- a/poster.pptx
+++ b/poster.pptx
@@ -129,12 +129,12 @@
   <pc:docChgLst>
     <pc:chgData name="Shahar Shalom" userId="c1657878-da89-43af-9535-4a8d3e59b096" providerId="ADAL" clId="{B1541A9E-69A3-4C64-B18D-7A7F88D200FD}"/>
     <pc:docChg chg="undo custSel addSld delSld modSld">
-      <pc:chgData name="Shahar Shalom" userId="c1657878-da89-43af-9535-4a8d3e59b096" providerId="ADAL" clId="{B1541A9E-69A3-4C64-B18D-7A7F88D200FD}" dt="2023-06-05T17:46:59.514" v="730" actId="478"/>
+      <pc:chgData name="Shahar Shalom" userId="c1657878-da89-43af-9535-4a8d3e59b096" providerId="ADAL" clId="{B1541A9E-69A3-4C64-B18D-7A7F88D200FD}" dt="2023-06-06T12:33:11.461" v="731" actId="1076"/>
       <pc:docMkLst>
         <pc:docMk/>
       </pc:docMkLst>
       <pc:sldChg chg="addSp delSp modSp mod">
-        <pc:chgData name="Shahar Shalom" userId="c1657878-da89-43af-9535-4a8d3e59b096" providerId="ADAL" clId="{B1541A9E-69A3-4C64-B18D-7A7F88D200FD}" dt="2023-06-05T17:45:02.964" v="701" actId="14734"/>
+        <pc:chgData name="Shahar Shalom" userId="c1657878-da89-43af-9535-4a8d3e59b096" providerId="ADAL" clId="{B1541A9E-69A3-4C64-B18D-7A7F88D200FD}" dt="2023-06-06T12:33:11.461" v="731" actId="1076"/>
         <pc:sldMkLst>
           <pc:docMk/>
           <pc:sldMk cId="1000118881" sldId="256"/>
@@ -172,7 +172,7 @@
           </ac:spMkLst>
         </pc:spChg>
         <pc:graphicFrameChg chg="add mod modGraphic">
-          <ac:chgData name="Shahar Shalom" userId="c1657878-da89-43af-9535-4a8d3e59b096" providerId="ADAL" clId="{B1541A9E-69A3-4C64-B18D-7A7F88D200FD}" dt="2023-06-05T17:39:39.237" v="684" actId="1076"/>
+          <ac:chgData name="Shahar Shalom" userId="c1657878-da89-43af-9535-4a8d3e59b096" providerId="ADAL" clId="{B1541A9E-69A3-4C64-B18D-7A7F88D200FD}" dt="2023-06-06T12:33:11.461" v="731" actId="1076"/>
           <ac:graphicFrameMkLst>
             <pc:docMk/>
             <pc:sldMk cId="1000118881" sldId="256"/>
@@ -473,7 +473,7 @@
           <a:p>
             <a:fld id="{CFC00A23-1BFE-4A7E-A521-7B2182A093B7}" type="datetimeFigureOut">
               <a:rPr lang="he-IL" smtClean="0"/>
-              <a:t>ט"ז/סיון/תשפ"ג</a:t>
+              <a:t>י"ז/סיון/תשפ"ג</a:t>
             </a:fld>
             <a:endParaRPr lang="he-IL"/>
           </a:p>
@@ -872,7 +872,7 @@
           <a:p>
             <a:fld id="{449B0C55-391A-4BA7-BF59-0A370099757C}" type="datetimeFigureOut">
               <a:rPr lang="he-IL" smtClean="0"/>
-              <a:t>ט"ז/סיון/תשפ"ג</a:t>
+              <a:t>י"ז/סיון/תשפ"ג</a:t>
             </a:fld>
             <a:endParaRPr lang="he-IL"/>
           </a:p>
@@ -1042,7 +1042,7 @@
           <a:p>
             <a:fld id="{449B0C55-391A-4BA7-BF59-0A370099757C}" type="datetimeFigureOut">
               <a:rPr lang="he-IL" smtClean="0"/>
-              <a:t>ט"ז/סיון/תשפ"ג</a:t>
+              <a:t>י"ז/סיון/תשפ"ג</a:t>
             </a:fld>
             <a:endParaRPr lang="he-IL"/>
           </a:p>
@@ -1222,7 +1222,7 @@
           <a:p>
             <a:fld id="{449B0C55-391A-4BA7-BF59-0A370099757C}" type="datetimeFigureOut">
               <a:rPr lang="he-IL" smtClean="0"/>
-              <a:t>ט"ז/סיון/תשפ"ג</a:t>
+              <a:t>י"ז/סיון/תשפ"ג</a:t>
             </a:fld>
             <a:endParaRPr lang="he-IL"/>
           </a:p>
@@ -1392,7 +1392,7 @@
           <a:p>
             <a:fld id="{449B0C55-391A-4BA7-BF59-0A370099757C}" type="datetimeFigureOut">
               <a:rPr lang="he-IL" smtClean="0"/>
-              <a:t>ט"ז/סיון/תשפ"ג</a:t>
+              <a:t>י"ז/סיון/תשפ"ג</a:t>
             </a:fld>
             <a:endParaRPr lang="he-IL"/>
           </a:p>
@@ -1636,7 +1636,7 @@
           <a:p>
             <a:fld id="{449B0C55-391A-4BA7-BF59-0A370099757C}" type="datetimeFigureOut">
               <a:rPr lang="he-IL" smtClean="0"/>
-              <a:t>ט"ז/סיון/תשפ"ג</a:t>
+              <a:t>י"ז/סיון/תשפ"ג</a:t>
             </a:fld>
             <a:endParaRPr lang="he-IL"/>
           </a:p>
@@ -1868,7 +1868,7 @@
           <a:p>
             <a:fld id="{449B0C55-391A-4BA7-BF59-0A370099757C}" type="datetimeFigureOut">
               <a:rPr lang="he-IL" smtClean="0"/>
-              <a:t>ט"ז/סיון/תשפ"ג</a:t>
+              <a:t>י"ז/סיון/תשפ"ג</a:t>
             </a:fld>
             <a:endParaRPr lang="he-IL"/>
           </a:p>
@@ -2235,7 +2235,7 @@
           <a:p>
             <a:fld id="{449B0C55-391A-4BA7-BF59-0A370099757C}" type="datetimeFigureOut">
               <a:rPr lang="he-IL" smtClean="0"/>
-              <a:t>ט"ז/סיון/תשפ"ג</a:t>
+              <a:t>י"ז/סיון/תשפ"ג</a:t>
             </a:fld>
             <a:endParaRPr lang="he-IL"/>
           </a:p>
@@ -2353,7 +2353,7 @@
           <a:p>
             <a:fld id="{449B0C55-391A-4BA7-BF59-0A370099757C}" type="datetimeFigureOut">
               <a:rPr lang="he-IL" smtClean="0"/>
-              <a:t>ט"ז/סיון/תשפ"ג</a:t>
+              <a:t>י"ז/סיון/תשפ"ג</a:t>
             </a:fld>
             <a:endParaRPr lang="he-IL"/>
           </a:p>
@@ -2448,7 +2448,7 @@
           <a:p>
             <a:fld id="{449B0C55-391A-4BA7-BF59-0A370099757C}" type="datetimeFigureOut">
               <a:rPr lang="he-IL" smtClean="0"/>
-              <a:t>ט"ז/סיון/תשפ"ג</a:t>
+              <a:t>י"ז/סיון/תשפ"ג</a:t>
             </a:fld>
             <a:endParaRPr lang="he-IL"/>
           </a:p>
@@ -2725,7 +2725,7 @@
           <a:p>
             <a:fld id="{449B0C55-391A-4BA7-BF59-0A370099757C}" type="datetimeFigureOut">
               <a:rPr lang="he-IL" smtClean="0"/>
-              <a:t>ט"ז/סיון/תשפ"ג</a:t>
+              <a:t>י"ז/סיון/תשפ"ג</a:t>
             </a:fld>
             <a:endParaRPr lang="he-IL"/>
           </a:p>
@@ -2982,7 +2982,7 @@
           <a:p>
             <a:fld id="{449B0C55-391A-4BA7-BF59-0A370099757C}" type="datetimeFigureOut">
               <a:rPr lang="he-IL" smtClean="0"/>
-              <a:t>ט"ז/סיון/תשפ"ג</a:t>
+              <a:t>י"ז/סיון/תשפ"ג</a:t>
             </a:fld>
             <a:endParaRPr lang="he-IL"/>
           </a:p>
@@ -3195,7 +3195,7 @@
           <a:p>
             <a:fld id="{449B0C55-391A-4BA7-BF59-0A370099757C}" type="datetimeFigureOut">
               <a:rPr lang="he-IL" smtClean="0"/>
-              <a:t>ט"ז/סיון/תשפ"ג</a:t>
+              <a:t>י"ז/סיון/תשפ"ג</a:t>
             </a:fld>
             <a:endParaRPr lang="he-IL"/>
           </a:p>
@@ -5709,8 +5709,8 @@
           </a:graphicData>
         </a:graphic>
       </p:graphicFrame>
-      <mc:AlternateContent xmlns:mc="http://schemas.openxmlformats.org/markup-compatibility/2006">
-        <mc:Choice xmlns:a14="http://schemas.microsoft.com/office/drawing/2010/main" Requires="a14">
+      <mc:AlternateContent xmlns:mc="http://schemas.openxmlformats.org/markup-compatibility/2006" xmlns:a14="http://schemas.microsoft.com/office/drawing/2010/main">
+        <mc:Choice Requires="a14">
           <p:sp>
             <p:nvSpPr>
               <p:cNvPr id="4" name="TextBox 3">
@@ -5781,7 +5781,7 @@
                           <m:begChr m:val="{"/>
                           <m:endChr m:val=""/>
                           <m:ctrlPr>
-                            <a:rPr lang="en-US" sz="2800">
+                            <a:rPr lang="en-US" sz="2800" i="1">
                               <a:solidFill>
                                 <a:srgbClr val="836967"/>
                               </a:solidFill>
@@ -5793,7 +5793,7 @@
                           <m:eqArr>
                             <m:eqArrPr>
                               <m:ctrlPr>
-                                <a:rPr lang="en-US" sz="2800">
+                                <a:rPr lang="en-US" sz="2800" i="1">
                                   <a:solidFill>
                                     <a:srgbClr val="836967"/>
                                   </a:solidFill>
@@ -5818,13 +5818,7 @@
                                 <a:rPr lang="en-US" sz="2800" i="0">
                                   <a:latin typeface="Cambria Math" panose="02040503050406030204" pitchFamily="18" charset="0"/>
                                 </a:rPr>
-                                <m:t>                                           </m:t>
-                              </m:r>
-                              <m:r>
-                                <a:rPr lang="en-US" sz="2800" i="0">
-                                  <a:latin typeface="Cambria Math" panose="02040503050406030204" pitchFamily="18" charset="0"/>
-                                </a:rPr>
-                                <m:t> </m:t>
+                                <m:t>                                            </m:t>
                               </m:r>
                               <m:r>
                                 <m:rPr>
@@ -6234,7 +6228,7 @@
             </p:txBody>
           </p:sp>
         </mc:Choice>
-        <mc:Fallback>
+        <mc:Fallback xmlns="">
           <p:sp>
             <p:nvSpPr>
               <p:cNvPr id="4" name="TextBox 3">
@@ -6438,13 +6432,13 @@
           <p:nvPr>
             <p:extLst>
               <p:ext uri="{D42A27DB-BD31-4B8C-83A1-F6EECF244321}">
-                <p14:modId xmlns:p14="http://schemas.microsoft.com/office/powerpoint/2010/main" val="1790998923"/>
+                <p14:modId xmlns:p14="http://schemas.microsoft.com/office/powerpoint/2010/main" val="1384839691"/>
               </p:ext>
             </p:extLst>
           </p:nvPr>
         </p:nvGraphicFramePr>
         <p:xfrm>
-          <a:off x="-7682015" y="17440942"/>
+          <a:off x="-7521012" y="17584325"/>
           <a:ext cx="6832600" cy="2597849"/>
         </p:xfrm>
         <a:graphic>
@@ -9123,8 +9117,8 @@
           </a:graphicData>
         </a:graphic>
       </p:graphicFrame>
-      <mc:AlternateContent xmlns:mc="http://schemas.openxmlformats.org/markup-compatibility/2006">
-        <mc:Choice xmlns:a14="http://schemas.microsoft.com/office/drawing/2010/main" Requires="a14">
+      <mc:AlternateContent xmlns:mc="http://schemas.openxmlformats.org/markup-compatibility/2006" xmlns:a14="http://schemas.microsoft.com/office/drawing/2010/main">
+        <mc:Choice Requires="a14">
           <p:sp>
             <p:nvSpPr>
               <p:cNvPr id="4" name="TextBox 3">
@@ -9195,7 +9189,7 @@
                           <m:begChr m:val="{"/>
                           <m:endChr m:val=""/>
                           <m:ctrlPr>
-                            <a:rPr lang="en-US" sz="2800">
+                            <a:rPr lang="en-US" sz="2800" i="1">
                               <a:solidFill>
                                 <a:srgbClr val="836967"/>
                               </a:solidFill>
@@ -9207,7 +9201,7 @@
                           <m:eqArr>
                             <m:eqArrPr>
                               <m:ctrlPr>
-                                <a:rPr lang="en-US" sz="2800">
+                                <a:rPr lang="en-US" sz="2800" i="1">
                                   <a:solidFill>
                                     <a:srgbClr val="836967"/>
                                   </a:solidFill>
@@ -9220,19 +9214,25 @@
                                 <a:rPr lang="en-US" sz="2800" i="0">
                                   <a:latin typeface="Cambria Math" panose="02040503050406030204" pitchFamily="18" charset="0"/>
                                 </a:rPr>
-                                <m:t>&amp;1                                       </m:t>
-                              </m:r>
-                              <m:r>
-                                <a:rPr lang="en-US" sz="2800" b="0" i="0" smtClean="0">
+                                <m:t>&amp;</m:t>
+                              </m:r>
+                              <m:r>
+                                <a:rPr lang="en-US" sz="2800" i="0">
+                                  <a:latin typeface="Cambria Math" panose="02040503050406030204" pitchFamily="18" charset="0"/>
+                                </a:rPr>
+                                <m:t>1</m:t>
+                              </m:r>
+                              <m:r>
+                                <a:rPr lang="en-US" sz="2800" i="0">
+                                  <a:latin typeface="Cambria Math" panose="02040503050406030204" pitchFamily="18" charset="0"/>
+                                </a:rPr>
+                                <m:t>                                           </m:t>
+                              </m:r>
+                              <m:r>
+                                <a:rPr lang="en-US" sz="2800" i="0">
                                   <a:latin typeface="Cambria Math" panose="02040503050406030204" pitchFamily="18" charset="0"/>
                                 </a:rPr>
                                 <m:t> </m:t>
-                              </m:r>
-                              <m:r>
-                                <a:rPr lang="en-US" sz="2800" i="0">
-                                  <a:latin typeface="Cambria Math" panose="02040503050406030204" pitchFamily="18" charset="0"/>
-                                </a:rPr>
-                                <m:t>    </m:t>
                               </m:r>
                               <m:r>
                                 <m:rPr>
@@ -9277,7 +9277,31 @@
                                 <a:rPr lang="en-US" sz="2800" i="0">
                                   <a:latin typeface="Cambria Math" panose="02040503050406030204" pitchFamily="18" charset="0"/>
                                 </a:rPr>
-                                <m:t> 1, 2019 </m:t>
+                                <m:t> </m:t>
+                              </m:r>
+                              <m:r>
+                                <a:rPr lang="en-US" sz="2800" i="0">
+                                  <a:latin typeface="Cambria Math" panose="02040503050406030204" pitchFamily="18" charset="0"/>
+                                </a:rPr>
+                                <m:t>1</m:t>
+                              </m:r>
+                              <m:r>
+                                <a:rPr lang="en-US" sz="2800" i="0">
+                                  <a:latin typeface="Cambria Math" panose="02040503050406030204" pitchFamily="18" charset="0"/>
+                                </a:rPr>
+                                <m:t>, </m:t>
+                              </m:r>
+                              <m:r>
+                                <a:rPr lang="en-US" sz="2800" i="0">
+                                  <a:latin typeface="Cambria Math" panose="02040503050406030204" pitchFamily="18" charset="0"/>
+                                </a:rPr>
+                                <m:t>2019</m:t>
+                              </m:r>
+                              <m:r>
+                                <a:rPr lang="en-US" sz="2800" i="0">
+                                  <a:latin typeface="Cambria Math" panose="02040503050406030204" pitchFamily="18" charset="0"/>
+                                </a:rPr>
+                                <m:t> </m:t>
                               </m:r>
                             </m:e>
                             <m:e>
@@ -9285,7 +9309,19 @@
                                 <a:rPr lang="en-US" sz="2800" i="0">
                                   <a:latin typeface="Cambria Math" panose="02040503050406030204" pitchFamily="18" charset="0"/>
                                 </a:rPr>
-                                <m:t>&amp;2       </m:t>
+                                <m:t>&amp;</m:t>
+                              </m:r>
+                              <m:r>
+                                <a:rPr lang="en-US" sz="2800" i="0">
+                                  <a:latin typeface="Cambria Math" panose="02040503050406030204" pitchFamily="18" charset="0"/>
+                                </a:rPr>
+                                <m:t>2</m:t>
+                              </m:r>
+                              <m:r>
+                                <a:rPr lang="en-US" sz="2800" i="0">
+                                  <a:latin typeface="Cambria Math" panose="02040503050406030204" pitchFamily="18" charset="0"/>
+                                </a:rPr>
+                                <m:t>       </m:t>
                               </m:r>
                               <m:r>
                                 <m:rPr>
@@ -9300,7 +9336,31 @@
                                 <a:rPr lang="en-US" sz="2800" i="0">
                                   <a:latin typeface="Cambria Math" panose="02040503050406030204" pitchFamily="18" charset="0"/>
                                 </a:rPr>
-                                <m:t> 1, 2019≤</m:t>
+                                <m:t> </m:t>
+                              </m:r>
+                              <m:r>
+                                <a:rPr lang="en-US" sz="2800" i="0">
+                                  <a:latin typeface="Cambria Math" panose="02040503050406030204" pitchFamily="18" charset="0"/>
+                                </a:rPr>
+                                <m:t>1</m:t>
+                              </m:r>
+                              <m:r>
+                                <a:rPr lang="en-US" sz="2800" i="0">
+                                  <a:latin typeface="Cambria Math" panose="02040503050406030204" pitchFamily="18" charset="0"/>
+                                </a:rPr>
+                                <m:t>, </m:t>
+                              </m:r>
+                              <m:r>
+                                <a:rPr lang="en-US" sz="2800" i="0">
+                                  <a:latin typeface="Cambria Math" panose="02040503050406030204" pitchFamily="18" charset="0"/>
+                                </a:rPr>
+                                <m:t>2019</m:t>
+                              </m:r>
+                              <m:r>
+                                <a:rPr lang="en-US" sz="2800" i="0">
+                                  <a:latin typeface="Cambria Math" panose="02040503050406030204" pitchFamily="18" charset="0"/>
+                                </a:rPr>
+                                <m:t>≤</m:t>
                               </m:r>
                               <m:r>
                                 <m:rPr>
@@ -9345,7 +9405,25 @@
                                 <a:rPr lang="en-US" sz="2800" i="0">
                                   <a:latin typeface="Cambria Math" panose="02040503050406030204" pitchFamily="18" charset="0"/>
                                 </a:rPr>
-                                <m:t> 11, 2019</m:t>
+                                <m:t> </m:t>
+                              </m:r>
+                              <m:r>
+                                <a:rPr lang="en-US" sz="2800" i="0">
+                                  <a:latin typeface="Cambria Math" panose="02040503050406030204" pitchFamily="18" charset="0"/>
+                                </a:rPr>
+                                <m:t>11</m:t>
+                              </m:r>
+                              <m:r>
+                                <a:rPr lang="en-US" sz="2800" i="0">
+                                  <a:latin typeface="Cambria Math" panose="02040503050406030204" pitchFamily="18" charset="0"/>
+                                </a:rPr>
+                                <m:t>, </m:t>
+                              </m:r>
+                              <m:r>
+                                <a:rPr lang="en-US" sz="2800" i="0">
+                                  <a:latin typeface="Cambria Math" panose="02040503050406030204" pitchFamily="18" charset="0"/>
+                                </a:rPr>
+                                <m:t>2019</m:t>
                               </m:r>
                             </m:e>
                             <m:e>
@@ -9353,7 +9431,19 @@
                                 <a:rPr lang="en-US" sz="2800" i="0">
                                   <a:latin typeface="Cambria Math" panose="02040503050406030204" pitchFamily="18" charset="0"/>
                                 </a:rPr>
-                                <m:t>&amp;3             </m:t>
+                                <m:t>&amp;</m:t>
+                              </m:r>
+                              <m:r>
+                                <a:rPr lang="en-US" sz="2800" i="0">
+                                  <a:latin typeface="Cambria Math" panose="02040503050406030204" pitchFamily="18" charset="0"/>
+                                </a:rPr>
+                                <m:t>3</m:t>
+                              </m:r>
+                              <m:r>
+                                <a:rPr lang="en-US" sz="2800" i="0">
+                                  <a:latin typeface="Cambria Math" panose="02040503050406030204" pitchFamily="18" charset="0"/>
+                                </a:rPr>
+                                <m:t>             </m:t>
                               </m:r>
                               <m:r>
                                 <m:rPr>
@@ -9368,7 +9458,31 @@
                                 <a:rPr lang="en-US" sz="2800" i="0">
                                   <a:latin typeface="Cambria Math" panose="02040503050406030204" pitchFamily="18" charset="0"/>
                                 </a:rPr>
-                                <m:t> 11, 2019≤</m:t>
+                                <m:t> </m:t>
+                              </m:r>
+                              <m:r>
+                                <a:rPr lang="en-US" sz="2800" i="0">
+                                  <a:latin typeface="Cambria Math" panose="02040503050406030204" pitchFamily="18" charset="0"/>
+                                </a:rPr>
+                                <m:t>11</m:t>
+                              </m:r>
+                              <m:r>
+                                <a:rPr lang="en-US" sz="2800" i="0">
+                                  <a:latin typeface="Cambria Math" panose="02040503050406030204" pitchFamily="18" charset="0"/>
+                                </a:rPr>
+                                <m:t>, </m:t>
+                              </m:r>
+                              <m:r>
+                                <a:rPr lang="en-US" sz="2800" i="0">
+                                  <a:latin typeface="Cambria Math" panose="02040503050406030204" pitchFamily="18" charset="0"/>
+                                </a:rPr>
+                                <m:t>2019</m:t>
+                              </m:r>
+                              <m:r>
+                                <a:rPr lang="en-US" sz="2800" i="0">
+                                  <a:latin typeface="Cambria Math" panose="02040503050406030204" pitchFamily="18" charset="0"/>
+                                </a:rPr>
+                                <m:t>≤</m:t>
                               </m:r>
                               <m:r>
                                 <m:rPr>
@@ -9413,7 +9527,25 @@
                                 <a:rPr lang="en-US" sz="2800" i="0">
                                   <a:latin typeface="Cambria Math" panose="02040503050406030204" pitchFamily="18" charset="0"/>
                                 </a:rPr>
-                                <m:t> 7, 2021</m:t>
+                                <m:t> </m:t>
+                              </m:r>
+                              <m:r>
+                                <a:rPr lang="en-US" sz="2800" i="0">
+                                  <a:latin typeface="Cambria Math" panose="02040503050406030204" pitchFamily="18" charset="0"/>
+                                </a:rPr>
+                                <m:t>7</m:t>
+                              </m:r>
+                              <m:r>
+                                <a:rPr lang="en-US" sz="2800" i="0">
+                                  <a:latin typeface="Cambria Math" panose="02040503050406030204" pitchFamily="18" charset="0"/>
+                                </a:rPr>
+                                <m:t>, </m:t>
+                              </m:r>
+                              <m:r>
+                                <a:rPr lang="en-US" sz="2800" i="0">
+                                  <a:latin typeface="Cambria Math" panose="02040503050406030204" pitchFamily="18" charset="0"/>
+                                </a:rPr>
+                                <m:t>2021</m:t>
                               </m:r>
                             </m:e>
                             <m:e>
@@ -9421,7 +9553,13 @@
                                 <a:rPr lang="en-US" sz="2800" i="0">
                                   <a:latin typeface="Cambria Math" panose="02040503050406030204" pitchFamily="18" charset="0"/>
                                 </a:rPr>
-                                <m:t>&amp;4</m:t>
+                                <m:t>&amp;</m:t>
+                              </m:r>
+                              <m:r>
+                                <a:rPr lang="en-US" sz="2800" i="0">
+                                  <a:latin typeface="Cambria Math" panose="02040503050406030204" pitchFamily="18" charset="0"/>
+                                </a:rPr>
+                                <m:t>4</m:t>
                               </m:r>
                               <m:r>
                                 <a:rPr lang="en-US" sz="2800" b="0" i="0" smtClean="0">
@@ -9472,7 +9610,25 @@
                                 <a:rPr lang="en-US" sz="2800" i="0">
                                   <a:latin typeface="Cambria Math" panose="02040503050406030204" pitchFamily="18" charset="0"/>
                                 </a:rPr>
-                                <m:t> 7, 2021</m:t>
+                                <m:t> </m:t>
+                              </m:r>
+                              <m:r>
+                                <a:rPr lang="en-US" sz="2800" i="0">
+                                  <a:latin typeface="Cambria Math" panose="02040503050406030204" pitchFamily="18" charset="0"/>
+                                </a:rPr>
+                                <m:t>7</m:t>
+                              </m:r>
+                              <m:r>
+                                <a:rPr lang="en-US" sz="2800" i="0">
+                                  <a:latin typeface="Cambria Math" panose="02040503050406030204" pitchFamily="18" charset="0"/>
+                                </a:rPr>
+                                <m:t>, </m:t>
+                              </m:r>
+                              <m:r>
+                                <a:rPr lang="en-US" sz="2800" i="0">
+                                  <a:latin typeface="Cambria Math" panose="02040503050406030204" pitchFamily="18" charset="0"/>
+                                </a:rPr>
+                                <m:t>2021</m:t>
                               </m:r>
                             </m:e>
                           </m:eqArr>
@@ -9486,7 +9642,7 @@
             </p:txBody>
           </p:sp>
         </mc:Choice>
-        <mc:Fallback>
+        <mc:Fallback xmlns="">
           <p:sp>
             <p:nvSpPr>
               <p:cNvPr id="4" name="TextBox 3">

</xml_diff>

<commit_message>
add graph and table to poster
</commit_message>
<xml_diff>
--- a/poster.pptx
+++ b/poster.pptx
@@ -5,11 +5,10 @@
     <p:sldMasterId id="2147483660" r:id="rId1"/>
   </p:sldMasterIdLst>
   <p:notesMasterIdLst>
-    <p:notesMasterId r:id="rId4"/>
+    <p:notesMasterId r:id="rId3"/>
   </p:notesMasterIdLst>
   <p:sldIdLst>
-    <p:sldId id="256" r:id="rId2"/>
-    <p:sldId id="257" r:id="rId3"/>
+    <p:sldId id="257" r:id="rId2"/>
   </p:sldIdLst>
   <p:sldSz cx="29519563" cy="34559875"/>
   <p:notesSz cx="6858000" cy="9144000"/>
@@ -119,7 +118,7 @@
 <file path=ppt/revisionInfo.xml><?xml version="1.0" encoding="utf-8"?>
 <p1510:revInfo xmlns:a="http://schemas.openxmlformats.org/drawingml/2006/main" xmlns:r="http://schemas.openxmlformats.org/officeDocument/2006/relationships" xmlns:p1510="http://schemas.microsoft.com/office/powerpoint/2015/10/main">
   <p1510:revLst>
-    <p1510:client id="{B1541A9E-69A3-4C64-B18D-7A7F88D200FD}" v="176" dt="2023-06-05T17:46:55.674"/>
+    <p1510:client id="{B1541A9E-69A3-4C64-B18D-7A7F88D200FD}" v="183" dt="2023-06-09T16:37:05.205"/>
   </p1510:revLst>
 </p1510:revInfo>
 </file>
@@ -129,12 +128,12 @@
   <pc:docChgLst>
     <pc:chgData name="Shahar Shalom" userId="c1657878-da89-43af-9535-4a8d3e59b096" providerId="ADAL" clId="{B1541A9E-69A3-4C64-B18D-7A7F88D200FD}"/>
     <pc:docChg chg="undo custSel addSld delSld modSld">
-      <pc:chgData name="Shahar Shalom" userId="c1657878-da89-43af-9535-4a8d3e59b096" providerId="ADAL" clId="{B1541A9E-69A3-4C64-B18D-7A7F88D200FD}" dt="2023-06-06T12:33:11.461" v="731" actId="1076"/>
+      <pc:chgData name="Shahar Shalom" userId="c1657878-da89-43af-9535-4a8d3e59b096" providerId="ADAL" clId="{B1541A9E-69A3-4C64-B18D-7A7F88D200FD}" dt="2023-06-09T16:37:41.997" v="926" actId="1076"/>
       <pc:docMkLst>
         <pc:docMk/>
       </pc:docMkLst>
-      <pc:sldChg chg="addSp delSp modSp mod">
-        <pc:chgData name="Shahar Shalom" userId="c1657878-da89-43af-9535-4a8d3e59b096" providerId="ADAL" clId="{B1541A9E-69A3-4C64-B18D-7A7F88D200FD}" dt="2023-06-06T12:33:11.461" v="731" actId="1076"/>
+      <pc:sldChg chg="addSp delSp modSp del mod">
+        <pc:chgData name="Shahar Shalom" userId="c1657878-da89-43af-9535-4a8d3e59b096" providerId="ADAL" clId="{B1541A9E-69A3-4C64-B18D-7A7F88D200FD}" dt="2023-06-09T13:46:45.294" v="742" actId="2696"/>
         <pc:sldMkLst>
           <pc:docMk/>
           <pc:sldMk cId="1000118881" sldId="256"/>
@@ -163,8 +162,8 @@
             <ac:spMk id="4" creationId="{902ED1D7-E996-EF69-829B-593F4BE2D5F1}"/>
           </ac:spMkLst>
         </pc:spChg>
-        <pc:spChg chg="mod">
-          <ac:chgData name="Shahar Shalom" userId="c1657878-da89-43af-9535-4a8d3e59b096" providerId="ADAL" clId="{B1541A9E-69A3-4C64-B18D-7A7F88D200FD}" dt="2023-06-05T14:52:11.784" v="27" actId="14100"/>
+        <pc:spChg chg="add del mod">
+          <ac:chgData name="Shahar Shalom" userId="c1657878-da89-43af-9535-4a8d3e59b096" providerId="ADAL" clId="{B1541A9E-69A3-4C64-B18D-7A7F88D200FD}" dt="2023-06-09T13:46:40.696" v="741" actId="1076"/>
           <ac:spMkLst>
             <pc:docMk/>
             <pc:sldMk cId="1000118881" sldId="256"/>
@@ -243,32 +242,32 @@
             <ac:picMk id="10" creationId="{F09E36AB-BD31-C8D6-A946-2EE58AE932C0}"/>
           </ac:picMkLst>
         </pc:picChg>
-        <pc:picChg chg="add mod">
-          <ac:chgData name="Shahar Shalom" userId="c1657878-da89-43af-9535-4a8d3e59b096" providerId="ADAL" clId="{B1541A9E-69A3-4C64-B18D-7A7F88D200FD}" dt="2023-06-05T17:34:48.356" v="669" actId="14100"/>
+        <pc:picChg chg="add del mod">
+          <ac:chgData name="Shahar Shalom" userId="c1657878-da89-43af-9535-4a8d3e59b096" providerId="ADAL" clId="{B1541A9E-69A3-4C64-B18D-7A7F88D200FD}" dt="2023-06-09T13:43:53.213" v="732" actId="478"/>
           <ac:picMkLst>
             <pc:docMk/>
             <pc:sldMk cId="1000118881" sldId="256"/>
             <ac:picMk id="12" creationId="{64B92B50-C75F-DFD6-5C24-3116D80DA9FB}"/>
           </ac:picMkLst>
         </pc:picChg>
-        <pc:picChg chg="add mod">
-          <ac:chgData name="Shahar Shalom" userId="c1657878-da89-43af-9535-4a8d3e59b096" providerId="ADAL" clId="{B1541A9E-69A3-4C64-B18D-7A7F88D200FD}" dt="2023-06-05T17:33:07.011" v="667" actId="1076"/>
+        <pc:picChg chg="add del mod">
+          <ac:chgData name="Shahar Shalom" userId="c1657878-da89-43af-9535-4a8d3e59b096" providerId="ADAL" clId="{B1541A9E-69A3-4C64-B18D-7A7F88D200FD}" dt="2023-06-09T13:43:54.005" v="734" actId="478"/>
           <ac:picMkLst>
             <pc:docMk/>
             <pc:sldMk cId="1000118881" sldId="256"/>
             <ac:picMk id="14" creationId="{76C44484-5FED-B635-14D0-FFCBD25AFD57}"/>
           </ac:picMkLst>
         </pc:picChg>
-        <pc:picChg chg="add mod">
-          <ac:chgData name="Shahar Shalom" userId="c1657878-da89-43af-9535-4a8d3e59b096" providerId="ADAL" clId="{B1541A9E-69A3-4C64-B18D-7A7F88D200FD}" dt="2023-06-05T17:34:48.356" v="669" actId="14100"/>
+        <pc:picChg chg="add del mod">
+          <ac:chgData name="Shahar Shalom" userId="c1657878-da89-43af-9535-4a8d3e59b096" providerId="ADAL" clId="{B1541A9E-69A3-4C64-B18D-7A7F88D200FD}" dt="2023-06-09T13:43:53.734" v="733" actId="478"/>
           <ac:picMkLst>
             <pc:docMk/>
             <pc:sldMk cId="1000118881" sldId="256"/>
             <ac:picMk id="19" creationId="{1D90C954-C4BF-FD27-0BD1-0C1E40F43CC9}"/>
           </ac:picMkLst>
         </pc:picChg>
-        <pc:picChg chg="add mod">
-          <ac:chgData name="Shahar Shalom" userId="c1657878-da89-43af-9535-4a8d3e59b096" providerId="ADAL" clId="{B1541A9E-69A3-4C64-B18D-7A7F88D200FD}" dt="2023-06-05T17:33:03.502" v="666" actId="1076"/>
+        <pc:picChg chg="add del mod">
+          <ac:chgData name="Shahar Shalom" userId="c1657878-da89-43af-9535-4a8d3e59b096" providerId="ADAL" clId="{B1541A9E-69A3-4C64-B18D-7A7F88D200FD}" dt="2023-06-09T13:43:54.311" v="735" actId="478"/>
           <ac:picMkLst>
             <pc:docMk/>
             <pc:sldMk cId="1000118881" sldId="256"/>
@@ -276,7 +275,7 @@
           </ac:picMkLst>
         </pc:picChg>
         <pc:picChg chg="add del">
-          <ac:chgData name="Shahar Shalom" userId="c1657878-da89-43af-9535-4a8d3e59b096" providerId="ADAL" clId="{B1541A9E-69A3-4C64-B18D-7A7F88D200FD}" dt="2023-06-05T17:40:25.444" v="687" actId="478"/>
+          <ac:chgData name="Shahar Shalom" userId="c1657878-da89-43af-9535-4a8d3e59b096" providerId="ADAL" clId="{B1541A9E-69A3-4C64-B18D-7A7F88D200FD}" dt="2023-06-09T13:46:39.469" v="740" actId="478"/>
           <ac:picMkLst>
             <pc:docMk/>
             <pc:sldMk cId="1000118881" sldId="256"/>
@@ -364,17 +363,97 @@
         </pc:graphicFrameChg>
       </pc:sldChg>
       <pc:sldChg chg="addSp delSp modSp add mod setBg">
-        <pc:chgData name="Shahar Shalom" userId="c1657878-da89-43af-9535-4a8d3e59b096" providerId="ADAL" clId="{B1541A9E-69A3-4C64-B18D-7A7F88D200FD}" dt="2023-06-05T17:46:59.514" v="730" actId="478"/>
+        <pc:chgData name="Shahar Shalom" userId="c1657878-da89-43af-9535-4a8d3e59b096" providerId="ADAL" clId="{B1541A9E-69A3-4C64-B18D-7A7F88D200FD}" dt="2023-06-09T16:37:41.997" v="926" actId="1076"/>
         <pc:sldMkLst>
           <pc:docMk/>
           <pc:sldMk cId="3381761132" sldId="257"/>
         </pc:sldMkLst>
+        <pc:spChg chg="add del">
+          <ac:chgData name="Shahar Shalom" userId="c1657878-da89-43af-9535-4a8d3e59b096" providerId="ADAL" clId="{B1541A9E-69A3-4C64-B18D-7A7F88D200FD}" dt="2023-06-09T16:37:07.113" v="898" actId="22"/>
+          <ac:spMkLst>
+            <pc:docMk/>
+            <pc:sldMk cId="3381761132" sldId="257"/>
+            <ac:spMk id="9" creationId="{26FBB0A4-3E0B-7593-35BB-17AA23C6F697}"/>
+          </ac:spMkLst>
+        </pc:spChg>
+        <pc:spChg chg="add mod">
+          <ac:chgData name="Shahar Shalom" userId="c1657878-da89-43af-9535-4a8d3e59b096" providerId="ADAL" clId="{B1541A9E-69A3-4C64-B18D-7A7F88D200FD}" dt="2023-06-09T16:37:41.997" v="926" actId="1076"/>
+          <ac:spMkLst>
+            <pc:docMk/>
+            <pc:sldMk cId="3381761132" sldId="257"/>
+            <ac:spMk id="11" creationId="{5B2E3B24-2FD4-D155-947E-C24B67FC83A3}"/>
+          </ac:spMkLst>
+        </pc:spChg>
+        <pc:graphicFrameChg chg="mod modGraphic">
+          <ac:chgData name="Shahar Shalom" userId="c1657878-da89-43af-9535-4a8d3e59b096" providerId="ADAL" clId="{B1541A9E-69A3-4C64-B18D-7A7F88D200FD}" dt="2023-06-09T16:37:04.017" v="896"/>
+          <ac:graphicFrameMkLst>
+            <pc:docMk/>
+            <pc:sldMk cId="3381761132" sldId="257"/>
+            <ac:graphicFrameMk id="37" creationId="{5F827F28-C2F2-38B5-29FB-77D425C2B5E8}"/>
+          </ac:graphicFrameMkLst>
+        </pc:graphicFrameChg>
+        <pc:picChg chg="add mod">
+          <ac:chgData name="Shahar Shalom" userId="c1657878-da89-43af-9535-4a8d3e59b096" providerId="ADAL" clId="{B1541A9E-69A3-4C64-B18D-7A7F88D200FD}" dt="2023-06-09T16:33:58.572" v="884" actId="1076"/>
+          <ac:picMkLst>
+            <pc:docMk/>
+            <pc:sldMk cId="3381761132" sldId="257"/>
+            <ac:picMk id="2" creationId="{4D3DD8C6-A50E-FF6D-12A9-5619F05F9D6E}"/>
+          </ac:picMkLst>
+        </pc:picChg>
         <pc:picChg chg="add del mod">
           <ac:chgData name="Shahar Shalom" userId="c1657878-da89-43af-9535-4a8d3e59b096" providerId="ADAL" clId="{B1541A9E-69A3-4C64-B18D-7A7F88D200FD}" dt="2023-06-05T17:46:59.514" v="730" actId="478"/>
           <ac:picMkLst>
             <pc:docMk/>
             <pc:sldMk cId="3381761132" sldId="257"/>
             <ac:picMk id="2" creationId="{D33EBBF8-6274-F417-5FDD-E6131869083F}"/>
+          </ac:picMkLst>
+        </pc:picChg>
+        <pc:picChg chg="add del mod">
+          <ac:chgData name="Shahar Shalom" userId="c1657878-da89-43af-9535-4a8d3e59b096" providerId="ADAL" clId="{B1541A9E-69A3-4C64-B18D-7A7F88D200FD}" dt="2023-06-09T16:34:43.812" v="888" actId="478"/>
+          <ac:picMkLst>
+            <pc:docMk/>
+            <pc:sldMk cId="3381761132" sldId="257"/>
+            <ac:picMk id="5" creationId="{9CD9A4D5-0574-FDD9-58F1-B1B35BD78770}"/>
+          </ac:picMkLst>
+        </pc:picChg>
+        <pc:picChg chg="add mod">
+          <ac:chgData name="Shahar Shalom" userId="c1657878-da89-43af-9535-4a8d3e59b096" providerId="ADAL" clId="{B1541A9E-69A3-4C64-B18D-7A7F88D200FD}" dt="2023-06-09T16:36:36.180" v="895" actId="1076"/>
+          <ac:picMkLst>
+            <pc:docMk/>
+            <pc:sldMk cId="3381761132" sldId="257"/>
+            <ac:picMk id="7" creationId="{EA535E9B-0EA1-B989-CA58-7A33EB9BB995}"/>
+          </ac:picMkLst>
+        </pc:picChg>
+        <pc:picChg chg="del">
+          <ac:chgData name="Shahar Shalom" userId="c1657878-da89-43af-9535-4a8d3e59b096" providerId="ADAL" clId="{B1541A9E-69A3-4C64-B18D-7A7F88D200FD}" dt="2023-06-09T13:46:50.422" v="743" actId="478"/>
+          <ac:picMkLst>
+            <pc:docMk/>
+            <pc:sldMk cId="3381761132" sldId="257"/>
+            <ac:picMk id="12" creationId="{64B92B50-C75F-DFD6-5C24-3116D80DA9FB}"/>
+          </ac:picMkLst>
+        </pc:picChg>
+        <pc:picChg chg="del">
+          <ac:chgData name="Shahar Shalom" userId="c1657878-da89-43af-9535-4a8d3e59b096" providerId="ADAL" clId="{B1541A9E-69A3-4C64-B18D-7A7F88D200FD}" dt="2023-06-09T13:46:50.422" v="743" actId="478"/>
+          <ac:picMkLst>
+            <pc:docMk/>
+            <pc:sldMk cId="3381761132" sldId="257"/>
+            <ac:picMk id="14" creationId="{76C44484-5FED-B635-14D0-FFCBD25AFD57}"/>
+          </ac:picMkLst>
+        </pc:picChg>
+        <pc:picChg chg="del">
+          <ac:chgData name="Shahar Shalom" userId="c1657878-da89-43af-9535-4a8d3e59b096" providerId="ADAL" clId="{B1541A9E-69A3-4C64-B18D-7A7F88D200FD}" dt="2023-06-09T13:46:50.422" v="743" actId="478"/>
+          <ac:picMkLst>
+            <pc:docMk/>
+            <pc:sldMk cId="3381761132" sldId="257"/>
+            <ac:picMk id="19" creationId="{1D90C954-C4BF-FD27-0BD1-0C1E40F43CC9}"/>
+          </ac:picMkLst>
+        </pc:picChg>
+        <pc:picChg chg="del">
+          <ac:chgData name="Shahar Shalom" userId="c1657878-da89-43af-9535-4a8d3e59b096" providerId="ADAL" clId="{B1541A9E-69A3-4C64-B18D-7A7F88D200FD}" dt="2023-06-09T13:46:50.422" v="743" actId="478"/>
+          <ac:picMkLst>
+            <pc:docMk/>
+            <pc:sldMk cId="3381761132" sldId="257"/>
+            <ac:picMk id="21" creationId="{59BA1690-E80A-9442-54D3-7167D9B60940}"/>
           </ac:picMkLst>
         </pc:picChg>
         <pc:picChg chg="del">
@@ -473,7 +552,7 @@
           <a:p>
             <a:fld id="{CFC00A23-1BFE-4A7E-A521-7B2182A093B7}" type="datetimeFigureOut">
               <a:rPr lang="he-IL" smtClean="0"/>
-              <a:t>י"ז/סיון/תשפ"ג</a:t>
+              <a:t>כ'/סיון/תשפ"ג</a:t>
             </a:fld>
             <a:endParaRPr lang="he-IL"/>
           </a:p>
@@ -872,7 +951,7 @@
           <a:p>
             <a:fld id="{449B0C55-391A-4BA7-BF59-0A370099757C}" type="datetimeFigureOut">
               <a:rPr lang="he-IL" smtClean="0"/>
-              <a:t>י"ז/סיון/תשפ"ג</a:t>
+              <a:t>כ'/סיון/תשפ"ג</a:t>
             </a:fld>
             <a:endParaRPr lang="he-IL"/>
           </a:p>
@@ -1042,7 +1121,7 @@
           <a:p>
             <a:fld id="{449B0C55-391A-4BA7-BF59-0A370099757C}" type="datetimeFigureOut">
               <a:rPr lang="he-IL" smtClean="0"/>
-              <a:t>י"ז/סיון/תשפ"ג</a:t>
+              <a:t>כ'/סיון/תשפ"ג</a:t>
             </a:fld>
             <a:endParaRPr lang="he-IL"/>
           </a:p>
@@ -1222,7 +1301,7 @@
           <a:p>
             <a:fld id="{449B0C55-391A-4BA7-BF59-0A370099757C}" type="datetimeFigureOut">
               <a:rPr lang="he-IL" smtClean="0"/>
-              <a:t>י"ז/סיון/תשפ"ג</a:t>
+              <a:t>כ'/סיון/תשפ"ג</a:t>
             </a:fld>
             <a:endParaRPr lang="he-IL"/>
           </a:p>
@@ -1392,7 +1471,7 @@
           <a:p>
             <a:fld id="{449B0C55-391A-4BA7-BF59-0A370099757C}" type="datetimeFigureOut">
               <a:rPr lang="he-IL" smtClean="0"/>
-              <a:t>י"ז/סיון/תשפ"ג</a:t>
+              <a:t>כ'/סיון/תשפ"ג</a:t>
             </a:fld>
             <a:endParaRPr lang="he-IL"/>
           </a:p>
@@ -1636,7 +1715,7 @@
           <a:p>
             <a:fld id="{449B0C55-391A-4BA7-BF59-0A370099757C}" type="datetimeFigureOut">
               <a:rPr lang="he-IL" smtClean="0"/>
-              <a:t>י"ז/סיון/תשפ"ג</a:t>
+              <a:t>כ'/סיון/תשפ"ג</a:t>
             </a:fld>
             <a:endParaRPr lang="he-IL"/>
           </a:p>
@@ -1868,7 +1947,7 @@
           <a:p>
             <a:fld id="{449B0C55-391A-4BA7-BF59-0A370099757C}" type="datetimeFigureOut">
               <a:rPr lang="he-IL" smtClean="0"/>
-              <a:t>י"ז/סיון/תשפ"ג</a:t>
+              <a:t>כ'/סיון/תשפ"ג</a:t>
             </a:fld>
             <a:endParaRPr lang="he-IL"/>
           </a:p>
@@ -2235,7 +2314,7 @@
           <a:p>
             <a:fld id="{449B0C55-391A-4BA7-BF59-0A370099757C}" type="datetimeFigureOut">
               <a:rPr lang="he-IL" smtClean="0"/>
-              <a:t>י"ז/סיון/תשפ"ג</a:t>
+              <a:t>כ'/סיון/תשפ"ג</a:t>
             </a:fld>
             <a:endParaRPr lang="he-IL"/>
           </a:p>
@@ -2353,7 +2432,7 @@
           <a:p>
             <a:fld id="{449B0C55-391A-4BA7-BF59-0A370099757C}" type="datetimeFigureOut">
               <a:rPr lang="he-IL" smtClean="0"/>
-              <a:t>י"ז/סיון/תשפ"ג</a:t>
+              <a:t>כ'/סיון/תשפ"ג</a:t>
             </a:fld>
             <a:endParaRPr lang="he-IL"/>
           </a:p>
@@ -2448,7 +2527,7 @@
           <a:p>
             <a:fld id="{449B0C55-391A-4BA7-BF59-0A370099757C}" type="datetimeFigureOut">
               <a:rPr lang="he-IL" smtClean="0"/>
-              <a:t>י"ז/סיון/תשפ"ג</a:t>
+              <a:t>כ'/סיון/תשפ"ג</a:t>
             </a:fld>
             <a:endParaRPr lang="he-IL"/>
           </a:p>
@@ -2725,7 +2804,7 @@
           <a:p>
             <a:fld id="{449B0C55-391A-4BA7-BF59-0A370099757C}" type="datetimeFigureOut">
               <a:rPr lang="he-IL" smtClean="0"/>
-              <a:t>י"ז/סיון/תשפ"ג</a:t>
+              <a:t>כ'/סיון/תשפ"ג</a:t>
             </a:fld>
             <a:endParaRPr lang="he-IL"/>
           </a:p>
@@ -2982,7 +3061,7 @@
           <a:p>
             <a:fld id="{449B0C55-391A-4BA7-BF59-0A370099757C}" type="datetimeFigureOut">
               <a:rPr lang="he-IL" smtClean="0"/>
-              <a:t>י"ז/סיון/תשפ"ג</a:t>
+              <a:t>כ'/סיון/תשפ"ג</a:t>
             </a:fld>
             <a:endParaRPr lang="he-IL"/>
           </a:p>
@@ -3195,7 +3274,7 @@
           <a:p>
             <a:fld id="{449B0C55-391A-4BA7-BF59-0A370099757C}" type="datetimeFigureOut">
               <a:rPr lang="he-IL" smtClean="0"/>
-              <a:t>י"ז/סיון/תשפ"ג</a:t>
+              <a:t>כ'/סיון/תשפ"ג</a:t>
             </a:fld>
             <a:endParaRPr lang="he-IL"/>
           </a:p>
@@ -3584,3485 +3663,6 @@
 </file>
 
 <file path=ppt/slides/slide1.xml><?xml version="1.0" encoding="utf-8"?>
-<p:sld xmlns:a="http://schemas.openxmlformats.org/drawingml/2006/main" xmlns:r="http://schemas.openxmlformats.org/officeDocument/2006/relationships" xmlns:p="http://schemas.openxmlformats.org/presentationml/2006/main">
-  <p:cSld>
-    <p:spTree>
-      <p:nvGrpSpPr>
-        <p:cNvPr id="1" name=""/>
-        <p:cNvGrpSpPr/>
-        <p:nvPr/>
-      </p:nvGrpSpPr>
-      <p:grpSpPr>
-        <a:xfrm>
-          <a:off x="0" y="0"/>
-          <a:ext cx="0" cy="0"/>
-          <a:chOff x="0" y="0"/>
-          <a:chExt cx="0" cy="0"/>
-        </a:xfrm>
-      </p:grpSpPr>
-      <p:pic>
-        <p:nvPicPr>
-          <p:cNvPr id="23" name="Picture 22" descr="A baby being fed by a spoon&#10;&#10;Description automatically generated with low confidence">
-            <a:extLst>
-              <a:ext uri="{FF2B5EF4-FFF2-40B4-BE49-F238E27FC236}">
-                <a16:creationId xmlns:a16="http://schemas.microsoft.com/office/drawing/2014/main" id="{C876177E-FB66-B35A-4A0E-0090808E5628}"/>
-              </a:ext>
-            </a:extLst>
-          </p:cNvPr>
-          <p:cNvPicPr>
-            <a:picLocks noChangeAspect="1"/>
-          </p:cNvPicPr>
-          <p:nvPr/>
-        </p:nvPicPr>
-        <p:blipFill rotWithShape="1">
-          <a:blip r:embed="rId2">
-            <a:alphaModFix amt="35000"/>
-            <a:duotone>
-              <a:schemeClr val="accent1">
-                <a:shade val="45000"/>
-                <a:satMod val="135000"/>
-              </a:schemeClr>
-              <a:prstClr val="white"/>
-            </a:duotone>
-            <a:extLst>
-              <a:ext uri="{28A0092B-C50C-407E-A947-70E740481C1C}">
-                <a14:useLocalDpi xmlns:a14="http://schemas.microsoft.com/office/drawing/2010/main" val="0"/>
-              </a:ext>
-            </a:extLst>
-          </a:blip>
-          <a:srcRect l="-1" r="43056"/>
-          <a:stretch/>
-        </p:blipFill>
-        <p:spPr>
-          <a:xfrm>
-            <a:off x="0" y="-1"/>
-            <a:ext cx="29519564" cy="34559875"/>
-          </a:xfrm>
-          <a:prstGeom prst="rect">
-            <a:avLst/>
-          </a:prstGeom>
-        </p:spPr>
-      </p:pic>
-      <p:pic>
-        <p:nvPicPr>
-          <p:cNvPr id="15" name="Picture 14" descr="A picture containing text, lighthouse, screenshot, design&#10;&#10;Description automatically generated">
-            <a:extLst>
-              <a:ext uri="{FF2B5EF4-FFF2-40B4-BE49-F238E27FC236}">
-                <a16:creationId xmlns:a16="http://schemas.microsoft.com/office/drawing/2014/main" id="{F548D39D-7CE9-BDAA-44D3-ABF53A3C1CC4}"/>
-              </a:ext>
-            </a:extLst>
-          </p:cNvPr>
-          <p:cNvPicPr>
-            <a:picLocks noChangeAspect="1"/>
-          </p:cNvPicPr>
-          <p:nvPr/>
-        </p:nvPicPr>
-        <p:blipFill>
-          <a:blip r:embed="rId3">
-            <a:duotone>
-              <a:schemeClr val="accent1">
-                <a:shade val="45000"/>
-                <a:satMod val="135000"/>
-              </a:schemeClr>
-              <a:prstClr val="white"/>
-            </a:duotone>
-            <a:extLst>
-              <a:ext uri="{BEBA8EAE-BF5A-486C-A8C5-ECC9F3942E4B}">
-                <a14:imgProps xmlns:a14="http://schemas.microsoft.com/office/drawing/2010/main">
-                  <a14:imgLayer r:embed="rId4">
-                    <a14:imgEffect>
-                      <a14:brightnessContrast bright="-40000" contrast="40000"/>
-                    </a14:imgEffect>
-                  </a14:imgLayer>
-                </a14:imgProps>
-              </a:ext>
-              <a:ext uri="{28A0092B-C50C-407E-A947-70E740481C1C}">
-                <a14:useLocalDpi xmlns:a14="http://schemas.microsoft.com/office/drawing/2010/main" val="0"/>
-              </a:ext>
-            </a:extLst>
-          </a:blip>
-          <a:stretch>
-            <a:fillRect/>
-          </a:stretch>
-        </p:blipFill>
-        <p:spPr>
-          <a:xfrm>
-            <a:off x="284728" y="228483"/>
-            <a:ext cx="2704641" cy="4339650"/>
-          </a:xfrm>
-          <a:prstGeom prst="rect">
-            <a:avLst/>
-          </a:prstGeom>
-        </p:spPr>
-      </p:pic>
-      <p:sp>
-        <p:nvSpPr>
-          <p:cNvPr id="16" name="TextBox 15">
-            <a:extLst>
-              <a:ext uri="{FF2B5EF4-FFF2-40B4-BE49-F238E27FC236}">
-                <a16:creationId xmlns:a16="http://schemas.microsoft.com/office/drawing/2014/main" id="{D98B7141-C41B-A5BE-701F-B9FA0C4CCF41}"/>
-              </a:ext>
-            </a:extLst>
-          </p:cNvPr>
-          <p:cNvSpPr txBox="1"/>
-          <p:nvPr/>
-        </p:nvSpPr>
-        <p:spPr>
-          <a:xfrm>
-            <a:off x="2362200" y="235974"/>
-            <a:ext cx="26810111" cy="4339650"/>
-          </a:xfrm>
-          <a:prstGeom prst="rect">
-            <a:avLst/>
-          </a:prstGeom>
-          <a:noFill/>
-        </p:spPr>
-        <p:txBody>
-          <a:bodyPr wrap="square" rtlCol="1">
-            <a:spAutoFit/>
-          </a:bodyPr>
-          <a:lstStyle/>
-          <a:p>
-            <a:pPr algn="ctr"/>
-            <a:r>
-              <a:rPr lang="en-US" sz="7200" b="1" dirty="0">
-                <a:solidFill>
-                  <a:schemeClr val="accent1">
-                    <a:lumMod val="50000"/>
-                  </a:schemeClr>
-                </a:solidFill>
-                <a:effectLst>
-                  <a:outerShdw blurRad="38100" dist="38100" dir="2700000" algn="tl">
-                    <a:srgbClr val="000000">
-                      <a:alpha val="43137"/>
-                    </a:srgbClr>
-                  </a:outerShdw>
-                </a:effectLst>
-                <a:latin typeface="+mj-lt"/>
-                <a:cs typeface="Arial" panose="020B0604020202020204" pitchFamily="34" charset="0"/>
-              </a:rPr>
-              <a:t>The Golden opportunity</a:t>
-            </a:r>
-            <a:br>
-              <a:rPr lang="en-US" sz="7200" b="1" dirty="0">
-                <a:solidFill>
-                  <a:schemeClr val="accent1">
-                    <a:lumMod val="50000"/>
-                  </a:schemeClr>
-                </a:solidFill>
-                <a:effectLst>
-                  <a:outerShdw blurRad="38100" dist="38100" dir="2700000" algn="tl">
-                    <a:srgbClr val="000000">
-                      <a:alpha val="43137"/>
-                    </a:srgbClr>
-                  </a:outerShdw>
-                </a:effectLst>
-                <a:latin typeface="+mj-lt"/>
-                <a:cs typeface="Arial" panose="020B0604020202020204" pitchFamily="34" charset="0"/>
-              </a:rPr>
-            </a:br>
-            <a:r>
-              <a:rPr lang="en-US" sz="7200" dirty="0">
-                <a:solidFill>
-                  <a:schemeClr val="accent1">
-                    <a:lumMod val="50000"/>
-                  </a:schemeClr>
-                </a:solidFill>
-                <a:effectLst>
-                  <a:outerShdw blurRad="38100" dist="38100" dir="2700000" algn="tl">
-                    <a:srgbClr val="000000">
-                      <a:alpha val="43137"/>
-                    </a:srgbClr>
-                  </a:outerShdw>
-                </a:effectLst>
-                <a:latin typeface="+mj-lt"/>
-                <a:cs typeface="Arial" panose="020B0604020202020204" pitchFamily="34" charset="0"/>
-              </a:rPr>
-              <a:t>Examining the effect of hygiene theory on utopian diseases in newborns</a:t>
-            </a:r>
-          </a:p>
-          <a:p>
-            <a:pPr algn="ctr"/>
-            <a:br>
-              <a:rPr lang="en-US" sz="4400" dirty="0">
-                <a:solidFill>
-                  <a:schemeClr val="accent1">
-                    <a:lumMod val="75000"/>
-                  </a:schemeClr>
-                </a:solidFill>
-                <a:latin typeface="+mj-lt"/>
-                <a:cs typeface="Arial" panose="020B0604020202020204" pitchFamily="34" charset="0"/>
-              </a:rPr>
-            </a:br>
-            <a:r>
-              <a:rPr lang="en-US" sz="4400" dirty="0">
-                <a:solidFill>
-                  <a:schemeClr val="accent1">
-                    <a:lumMod val="75000"/>
-                  </a:schemeClr>
-                </a:solidFill>
-                <a:latin typeface="+mj-lt"/>
-                <a:cs typeface="Arial" panose="020B0604020202020204" pitchFamily="34" charset="0"/>
-              </a:rPr>
-              <a:t>Shahar Shalom, Eden Anavim, Merav Pervil | Faculty Instructor: Prof. Micha Mandel</a:t>
-            </a:r>
-          </a:p>
-          <a:p>
-            <a:pPr algn="ctr"/>
-            <a:r>
-              <a:rPr lang="en-US" sz="4400" dirty="0">
-                <a:solidFill>
-                  <a:schemeClr val="accent1">
-                    <a:lumMod val="75000"/>
-                  </a:schemeClr>
-                </a:solidFill>
-                <a:latin typeface="+mj-lt"/>
-                <a:cs typeface="Arial" panose="020B0604020202020204" pitchFamily="34" charset="0"/>
-              </a:rPr>
-              <a:t>Counselee: Prof. Idit Lachover-Roth, Allergy &amp; Clinical Immunology Unit, Meir Medical Center, Israel</a:t>
-            </a:r>
-            <a:endParaRPr lang="he-IL" sz="4400" dirty="0">
-              <a:solidFill>
-                <a:schemeClr val="accent1">
-                  <a:lumMod val="75000"/>
-                </a:schemeClr>
-              </a:solidFill>
-              <a:latin typeface="+mj-lt"/>
-              <a:cs typeface="Arial" panose="020B0604020202020204" pitchFamily="34" charset="0"/>
-            </a:endParaRPr>
-          </a:p>
-        </p:txBody>
-      </p:sp>
-      <p:cxnSp>
-        <p:nvCxnSpPr>
-          <p:cNvPr id="18" name="Straight Connector 17">
-            <a:extLst>
-              <a:ext uri="{FF2B5EF4-FFF2-40B4-BE49-F238E27FC236}">
-                <a16:creationId xmlns:a16="http://schemas.microsoft.com/office/drawing/2014/main" id="{90E341BC-0408-73A7-ABEE-9364FC3EFFC0}"/>
-              </a:ext>
-            </a:extLst>
-          </p:cNvPr>
-          <p:cNvCxnSpPr/>
-          <p:nvPr/>
-        </p:nvCxnSpPr>
-        <p:spPr>
-          <a:xfrm flipV="1">
-            <a:off x="497914" y="4630517"/>
-            <a:ext cx="28674396" cy="7491"/>
-          </a:xfrm>
-          <a:prstGeom prst="line">
-            <a:avLst/>
-          </a:prstGeom>
-          <a:ln w="12700">
-            <a:solidFill>
-              <a:schemeClr val="bg1"/>
-            </a:solidFill>
-          </a:ln>
-          <a:effectLst>
-            <a:outerShdw blurRad="50800" dist="38100" dir="2700000" algn="tl" rotWithShape="0">
-              <a:prstClr val="black">
-                <a:alpha val="40000"/>
-              </a:prstClr>
-            </a:outerShdw>
-          </a:effectLst>
-        </p:spPr>
-        <p:style>
-          <a:lnRef idx="1">
-            <a:schemeClr val="dk1"/>
-          </a:lnRef>
-          <a:fillRef idx="0">
-            <a:schemeClr val="dk1"/>
-          </a:fillRef>
-          <a:effectRef idx="0">
-            <a:schemeClr val="dk1"/>
-          </a:effectRef>
-          <a:fontRef idx="minor">
-            <a:schemeClr val="tx1"/>
-          </a:fontRef>
-        </p:style>
-      </p:cxnSp>
-      <p:graphicFrame>
-        <p:nvGraphicFramePr>
-          <p:cNvPr id="29" name="Table 29">
-            <a:extLst>
-              <a:ext uri="{FF2B5EF4-FFF2-40B4-BE49-F238E27FC236}">
-                <a16:creationId xmlns:a16="http://schemas.microsoft.com/office/drawing/2014/main" id="{632DFCB4-1B29-05AE-D500-EF466CED6387}"/>
-              </a:ext>
-            </a:extLst>
-          </p:cNvPr>
-          <p:cNvGraphicFramePr>
-            <a:graphicFrameLocks noGrp="1"/>
-          </p:cNvGraphicFramePr>
-          <p:nvPr>
-            <p:extLst>
-              <p:ext uri="{D42A27DB-BD31-4B8C-83A1-F6EECF244321}">
-                <p14:modId xmlns:p14="http://schemas.microsoft.com/office/powerpoint/2010/main" val="1534244276"/>
-              </p:ext>
-            </p:extLst>
-          </p:nvPr>
-        </p:nvGraphicFramePr>
-        <p:xfrm>
-          <a:off x="-1" y="4952526"/>
-          <a:ext cx="14759781" cy="4252595"/>
-        </p:xfrm>
-        <a:graphic>
-          <a:graphicData uri="http://schemas.openxmlformats.org/drawingml/2006/table">
-            <a:tbl>
-              <a:tblPr rtl="1" firstRow="1" bandRow="1">
-                <a:tableStyleId>{F5AB1C69-6EDB-4FF4-983F-18BD219EF322}</a:tableStyleId>
-              </a:tblPr>
-              <a:tblGrid>
-                <a:gridCol w="14759781">
-                  <a:extLst>
-                    <a:ext uri="{9D8B030D-6E8A-4147-A177-3AD203B41FA5}">
-                      <a16:colId xmlns:a16="http://schemas.microsoft.com/office/drawing/2014/main" val="3747045786"/>
-                    </a:ext>
-                  </a:extLst>
-                </a:gridCol>
-              </a:tblGrid>
-              <a:tr h="0">
-                <a:tc>
-                  <a:txBody>
-                    <a:bodyPr/>
-                    <a:lstStyle/>
-                    <a:p>
-                      <a:pPr algn="ctr" rtl="0"/>
-                      <a:r>
-                        <a:rPr lang="en-US" sz="3200" dirty="0">
-                          <a:latin typeface="+mj-lt"/>
-                        </a:rPr>
-                        <a:t>Background</a:t>
-                      </a:r>
-                      <a:endParaRPr lang="he-IL" sz="3200" dirty="0">
-                        <a:latin typeface="+mj-lt"/>
-                      </a:endParaRPr>
-                    </a:p>
-                  </a:txBody>
-                  <a:tcPr anchor="ctr">
-                    <a:lnL w="38100" cap="flat" cmpd="sng" algn="ctr">
-                      <a:solidFill>
-                        <a:schemeClr val="bg1"/>
-                      </a:solidFill>
-                      <a:prstDash val="solid"/>
-                      <a:round/>
-                      <a:headEnd type="none" w="med" len="med"/>
-                      <a:tailEnd type="none" w="med" len="med"/>
-                    </a:lnL>
-                    <a:lnR w="38100" cap="flat" cmpd="sng" algn="ctr">
-                      <a:solidFill>
-                        <a:schemeClr val="bg1"/>
-                      </a:solidFill>
-                      <a:prstDash val="solid"/>
-                      <a:round/>
-                      <a:headEnd type="none" w="med" len="med"/>
-                      <a:tailEnd type="none" w="med" len="med"/>
-                    </a:lnR>
-                    <a:lnT w="38100" cap="flat" cmpd="sng" algn="ctr">
-                      <a:solidFill>
-                        <a:schemeClr val="bg1"/>
-                      </a:solidFill>
-                      <a:prstDash val="solid"/>
-                      <a:round/>
-                      <a:headEnd type="none" w="med" len="med"/>
-                      <a:tailEnd type="none" w="med" len="med"/>
-                    </a:lnT>
-                    <a:lnB w="38100" cap="flat" cmpd="sng" algn="ctr">
-                      <a:solidFill>
-                        <a:schemeClr val="bg1"/>
-                      </a:solidFill>
-                      <a:prstDash val="solid"/>
-                      <a:round/>
-                      <a:headEnd type="none" w="med" len="med"/>
-                      <a:tailEnd type="none" w="med" len="med"/>
-                    </a:lnB>
-                  </a:tcPr>
-                </a:tc>
-                <a:extLst>
-                  <a:ext uri="{0D108BD9-81ED-4DB2-BD59-A6C34878D82A}">
-                    <a16:rowId xmlns:a16="http://schemas.microsoft.com/office/drawing/2014/main" val="1815053329"/>
-                  </a:ext>
-                </a:extLst>
-              </a:tr>
-              <a:tr h="1984992">
-                <a:tc>
-                  <a:txBody>
-                    <a:bodyPr/>
-                    <a:lstStyle/>
-                    <a:p>
-                      <a:pPr marL="0" indent="0" algn="l" rtl="0">
-                        <a:lnSpc>
-                          <a:spcPct val="150000"/>
-                        </a:lnSpc>
-                        <a:buFont typeface="Arial" panose="020B0604020202020204" pitchFamily="34" charset="0"/>
-                        <a:buNone/>
-                      </a:pPr>
-                      <a:r>
-                        <a:rPr lang="en-US" sz="3200" dirty="0">
-                          <a:latin typeface="+mj-lt"/>
-                        </a:rPr>
-                        <a:t>COVID-19 had increased hygiene awareness. </a:t>
-                      </a:r>
-                      <a:br>
-                        <a:rPr lang="en-US" sz="3200" dirty="0">
-                          <a:latin typeface="+mj-lt"/>
-                        </a:rPr>
-                      </a:br>
-                      <a:r>
-                        <a:rPr lang="en-US" sz="3200" dirty="0">
-                          <a:latin typeface="+mj-lt"/>
-                        </a:rPr>
-                        <a:t>Following the pandemic, several studies led to the following findings:</a:t>
-                      </a:r>
-                    </a:p>
-                    <a:p>
-                      <a:pPr marL="457200" indent="-457200" algn="l" rtl="0">
-                        <a:lnSpc>
-                          <a:spcPct val="150000"/>
-                        </a:lnSpc>
-                        <a:buFont typeface="Arial" panose="020B0604020202020204" pitchFamily="34" charset="0"/>
-                        <a:buChar char="•"/>
-                      </a:pPr>
-                      <a:r>
-                        <a:rPr lang="en-US" sz="3200" dirty="0">
-                          <a:latin typeface="+mj-lt"/>
-                        </a:rPr>
-                        <a:t>Social distancing reduced the prevalence of pediatric non-COVID-19 infections.</a:t>
-                      </a:r>
-                    </a:p>
-                    <a:p>
-                      <a:pPr marL="457200" indent="-457200" algn="l" rtl="0">
-                        <a:lnSpc>
-                          <a:spcPct val="150000"/>
-                        </a:lnSpc>
-                        <a:buFont typeface="Arial" panose="020B0604020202020204" pitchFamily="34" charset="0"/>
-                        <a:buChar char="•"/>
-                      </a:pPr>
-                      <a:r>
-                        <a:rPr lang="en-US" sz="3200" dirty="0">
-                          <a:latin typeface="+mj-lt"/>
-                        </a:rPr>
-                        <a:t>Infants born in the first peek had significantly less respiratory morbidity in first year.</a:t>
-                      </a:r>
-                    </a:p>
-                    <a:p>
-                      <a:pPr marL="457200" indent="-457200" algn="l" rtl="0">
-                        <a:lnSpc>
-                          <a:spcPct val="150000"/>
-                        </a:lnSpc>
-                        <a:buFont typeface="Arial" panose="020B0604020202020204" pitchFamily="34" charset="0"/>
-                        <a:buChar char="•"/>
-                      </a:pPr>
-                      <a:r>
-                        <a:rPr lang="en-US" sz="3200" dirty="0">
-                          <a:latin typeface="+mj-lt"/>
-                        </a:rPr>
-                        <a:t>Increased pediatric viral infections following the first and second lockdowns.</a:t>
-                      </a:r>
-                    </a:p>
-                  </a:txBody>
-                  <a:tcPr>
-                    <a:lnL w="38100" cap="flat" cmpd="sng" algn="ctr">
-                      <a:solidFill>
-                        <a:schemeClr val="bg1"/>
-                      </a:solidFill>
-                      <a:prstDash val="solid"/>
-                      <a:round/>
-                      <a:headEnd type="none" w="med" len="med"/>
-                      <a:tailEnd type="none" w="med" len="med"/>
-                    </a:lnL>
-                    <a:lnR w="38100" cap="flat" cmpd="sng" algn="ctr">
-                      <a:solidFill>
-                        <a:schemeClr val="bg1"/>
-                      </a:solidFill>
-                      <a:prstDash val="solid"/>
-                      <a:round/>
-                      <a:headEnd type="none" w="med" len="med"/>
-                      <a:tailEnd type="none" w="med" len="med"/>
-                    </a:lnR>
-                    <a:lnT w="38100" cap="flat" cmpd="sng" algn="ctr">
-                      <a:solidFill>
-                        <a:schemeClr val="bg1"/>
-                      </a:solidFill>
-                      <a:prstDash val="solid"/>
-                      <a:round/>
-                      <a:headEnd type="none" w="med" len="med"/>
-                      <a:tailEnd type="none" w="med" len="med"/>
-                    </a:lnT>
-                    <a:lnB w="38100" cap="flat" cmpd="sng" algn="ctr">
-                      <a:solidFill>
-                        <a:schemeClr val="bg1"/>
-                      </a:solidFill>
-                      <a:prstDash val="solid"/>
-                      <a:round/>
-                      <a:headEnd type="none" w="med" len="med"/>
-                      <a:tailEnd type="none" w="med" len="med"/>
-                    </a:lnB>
-                    <a:lnTlToBr w="12700" cmpd="sng">
-                      <a:noFill/>
-                      <a:prstDash val="solid"/>
-                    </a:lnTlToBr>
-                    <a:lnBlToTr w="12700" cmpd="sng">
-                      <a:noFill/>
-                      <a:prstDash val="solid"/>
-                    </a:lnBlToTr>
-                    <a:noFill/>
-                  </a:tcPr>
-                </a:tc>
-                <a:extLst>
-                  <a:ext uri="{0D108BD9-81ED-4DB2-BD59-A6C34878D82A}">
-                    <a16:rowId xmlns:a16="http://schemas.microsoft.com/office/drawing/2014/main" val="1509631762"/>
-                  </a:ext>
-                </a:extLst>
-              </a:tr>
-            </a:tbl>
-          </a:graphicData>
-        </a:graphic>
-      </p:graphicFrame>
-      <p:graphicFrame>
-        <p:nvGraphicFramePr>
-          <p:cNvPr id="36" name="Table 29">
-            <a:extLst>
-              <a:ext uri="{FF2B5EF4-FFF2-40B4-BE49-F238E27FC236}">
-                <a16:creationId xmlns:a16="http://schemas.microsoft.com/office/drawing/2014/main" id="{B7C1B329-22CD-BFC1-156D-6264B8ED551F}"/>
-              </a:ext>
-            </a:extLst>
-          </p:cNvPr>
-          <p:cNvGraphicFramePr>
-            <a:graphicFrameLocks noGrp="1"/>
-          </p:cNvGraphicFramePr>
-          <p:nvPr>
-            <p:extLst>
-              <p:ext uri="{D42A27DB-BD31-4B8C-83A1-F6EECF244321}">
-                <p14:modId xmlns:p14="http://schemas.microsoft.com/office/powerpoint/2010/main" val="2190141626"/>
-              </p:ext>
-            </p:extLst>
-          </p:nvPr>
-        </p:nvGraphicFramePr>
-        <p:xfrm>
-          <a:off x="-2" y="9187259"/>
-          <a:ext cx="14759780" cy="2234917"/>
-        </p:xfrm>
-        <a:graphic>
-          <a:graphicData uri="http://schemas.openxmlformats.org/drawingml/2006/table">
-            <a:tbl>
-              <a:tblPr rtl="1" firstRow="1" bandRow="1">
-                <a:tableStyleId>{F5AB1C69-6EDB-4FF4-983F-18BD219EF322}</a:tableStyleId>
-              </a:tblPr>
-              <a:tblGrid>
-                <a:gridCol w="14759780">
-                  <a:extLst>
-                    <a:ext uri="{9D8B030D-6E8A-4147-A177-3AD203B41FA5}">
-                      <a16:colId xmlns:a16="http://schemas.microsoft.com/office/drawing/2014/main" val="3747045786"/>
-                    </a:ext>
-                  </a:extLst>
-                </a:gridCol>
-              </a:tblGrid>
-              <a:tr h="483077">
-                <a:tc>
-                  <a:txBody>
-                    <a:bodyPr/>
-                    <a:lstStyle/>
-                    <a:p>
-                      <a:pPr algn="ctr" rtl="0"/>
-                      <a:r>
-                        <a:rPr lang="en-US" sz="3200" dirty="0">
-                          <a:latin typeface="+mj-lt"/>
-                        </a:rPr>
-                        <a:t>Research Objective</a:t>
-                      </a:r>
-                      <a:endParaRPr lang="he-IL" sz="3200" dirty="0">
-                        <a:latin typeface="+mj-lt"/>
-                      </a:endParaRPr>
-                    </a:p>
-                  </a:txBody>
-                  <a:tcPr anchor="ctr">
-                    <a:lnL w="38100" cap="flat" cmpd="sng" algn="ctr">
-                      <a:solidFill>
-                        <a:schemeClr val="bg1"/>
-                      </a:solidFill>
-                      <a:prstDash val="solid"/>
-                      <a:round/>
-                      <a:headEnd type="none" w="med" len="med"/>
-                      <a:tailEnd type="none" w="med" len="med"/>
-                    </a:lnL>
-                    <a:lnR w="38100" cap="flat" cmpd="sng" algn="ctr">
-                      <a:solidFill>
-                        <a:schemeClr val="bg1"/>
-                      </a:solidFill>
-                      <a:prstDash val="solid"/>
-                      <a:round/>
-                      <a:headEnd type="none" w="med" len="med"/>
-                      <a:tailEnd type="none" w="med" len="med"/>
-                    </a:lnR>
-                    <a:lnT w="38100" cap="flat" cmpd="sng" algn="ctr">
-                      <a:solidFill>
-                        <a:schemeClr val="bg1"/>
-                      </a:solidFill>
-                      <a:prstDash val="solid"/>
-                      <a:round/>
-                      <a:headEnd type="none" w="med" len="med"/>
-                      <a:tailEnd type="none" w="med" len="med"/>
-                    </a:lnT>
-                    <a:lnB w="38100" cap="flat" cmpd="sng" algn="ctr">
-                      <a:solidFill>
-                        <a:schemeClr val="bg1"/>
-                      </a:solidFill>
-                      <a:prstDash val="solid"/>
-                      <a:round/>
-                      <a:headEnd type="none" w="med" len="med"/>
-                      <a:tailEnd type="none" w="med" len="med"/>
-                    </a:lnB>
-                  </a:tcPr>
-                </a:tc>
-                <a:extLst>
-                  <a:ext uri="{0D108BD9-81ED-4DB2-BD59-A6C34878D82A}">
-                    <a16:rowId xmlns:a16="http://schemas.microsoft.com/office/drawing/2014/main" val="1815053329"/>
-                  </a:ext>
-                </a:extLst>
-              </a:tr>
-              <a:tr h="1655797">
-                <a:tc>
-                  <a:txBody>
-                    <a:bodyPr/>
-                    <a:lstStyle/>
-                    <a:p>
-                      <a:pPr marL="0" indent="0" algn="l" rtl="0">
-                        <a:lnSpc>
-                          <a:spcPct val="150000"/>
-                        </a:lnSpc>
-                        <a:buFont typeface="Arial" panose="020B0604020202020204" pitchFamily="34" charset="0"/>
-                        <a:buNone/>
-                      </a:pPr>
-                      <a:r>
-                        <a:rPr lang="en-US" sz="3200" kern="1200" dirty="0">
-                          <a:solidFill>
-                            <a:schemeClr val="dk1"/>
-                          </a:solidFill>
-                          <a:latin typeface="+mj-lt"/>
-                          <a:ea typeface="+mn-ea"/>
-                          <a:cs typeface="+mn-cs"/>
-                        </a:rPr>
-                        <a:t>It was therefore a golden opportunity to assess the influence of a highly hygienic environment on atopic comorbidities in infants.</a:t>
-                      </a:r>
-                    </a:p>
-                  </a:txBody>
-                  <a:tcPr>
-                    <a:lnL w="38100" cap="flat" cmpd="sng" algn="ctr">
-                      <a:solidFill>
-                        <a:schemeClr val="bg1"/>
-                      </a:solidFill>
-                      <a:prstDash val="solid"/>
-                      <a:round/>
-                      <a:headEnd type="none" w="med" len="med"/>
-                      <a:tailEnd type="none" w="med" len="med"/>
-                    </a:lnL>
-                    <a:lnR w="38100" cap="flat" cmpd="sng" algn="ctr">
-                      <a:solidFill>
-                        <a:schemeClr val="bg1"/>
-                      </a:solidFill>
-                      <a:prstDash val="solid"/>
-                      <a:round/>
-                      <a:headEnd type="none" w="med" len="med"/>
-                      <a:tailEnd type="none" w="med" len="med"/>
-                    </a:lnR>
-                    <a:lnT w="38100" cap="flat" cmpd="sng" algn="ctr">
-                      <a:solidFill>
-                        <a:schemeClr val="bg1"/>
-                      </a:solidFill>
-                      <a:prstDash val="solid"/>
-                      <a:round/>
-                      <a:headEnd type="none" w="med" len="med"/>
-                      <a:tailEnd type="none" w="med" len="med"/>
-                    </a:lnT>
-                    <a:lnB w="38100" cap="flat" cmpd="sng" algn="ctr">
-                      <a:solidFill>
-                        <a:schemeClr val="bg1"/>
-                      </a:solidFill>
-                      <a:prstDash val="solid"/>
-                      <a:round/>
-                      <a:headEnd type="none" w="med" len="med"/>
-                      <a:tailEnd type="none" w="med" len="med"/>
-                    </a:lnB>
-                    <a:lnTlToBr w="12700" cmpd="sng">
-                      <a:noFill/>
-                      <a:prstDash val="solid"/>
-                    </a:lnTlToBr>
-                    <a:lnBlToTr w="12700" cmpd="sng">
-                      <a:noFill/>
-                      <a:prstDash val="solid"/>
-                    </a:lnBlToTr>
-                    <a:noFill/>
-                  </a:tcPr>
-                </a:tc>
-                <a:extLst>
-                  <a:ext uri="{0D108BD9-81ED-4DB2-BD59-A6C34878D82A}">
-                    <a16:rowId xmlns:a16="http://schemas.microsoft.com/office/drawing/2014/main" val="1509631762"/>
-                  </a:ext>
-                </a:extLst>
-              </a:tr>
-            </a:tbl>
-          </a:graphicData>
-        </a:graphic>
-      </p:graphicFrame>
-      <p:graphicFrame>
-        <p:nvGraphicFramePr>
-          <p:cNvPr id="37" name="Table 29">
-            <a:extLst>
-              <a:ext uri="{FF2B5EF4-FFF2-40B4-BE49-F238E27FC236}">
-                <a16:creationId xmlns:a16="http://schemas.microsoft.com/office/drawing/2014/main" id="{5F827F28-C2F2-38B5-29FB-77D425C2B5E8}"/>
-              </a:ext>
-            </a:extLst>
-          </p:cNvPr>
-          <p:cNvGraphicFramePr>
-            <a:graphicFrameLocks noGrp="1"/>
-          </p:cNvGraphicFramePr>
-          <p:nvPr>
-            <p:extLst>
-              <p:ext uri="{D42A27DB-BD31-4B8C-83A1-F6EECF244321}">
-                <p14:modId xmlns:p14="http://schemas.microsoft.com/office/powerpoint/2010/main" val="2082814579"/>
-              </p:ext>
-            </p:extLst>
-          </p:nvPr>
-        </p:nvGraphicFramePr>
-        <p:xfrm>
-          <a:off x="15011670" y="4952526"/>
-          <a:ext cx="14423929" cy="24976832"/>
-        </p:xfrm>
-        <a:graphic>
-          <a:graphicData uri="http://schemas.openxmlformats.org/drawingml/2006/table">
-            <a:tbl>
-              <a:tblPr rtl="1" firstRow="1" bandRow="1">
-                <a:tableStyleId>{F5AB1C69-6EDB-4FF4-983F-18BD219EF322}</a:tableStyleId>
-              </a:tblPr>
-              <a:tblGrid>
-                <a:gridCol w="14423929">
-                  <a:extLst>
-                    <a:ext uri="{9D8B030D-6E8A-4147-A177-3AD203B41FA5}">
-                      <a16:colId xmlns:a16="http://schemas.microsoft.com/office/drawing/2014/main" val="3747045786"/>
-                    </a:ext>
-                  </a:extLst>
-                </a:gridCol>
-              </a:tblGrid>
-              <a:tr h="616459">
-                <a:tc>
-                  <a:txBody>
-                    <a:bodyPr/>
-                    <a:lstStyle/>
-                    <a:p>
-                      <a:pPr algn="ctr" rtl="0"/>
-                      <a:r>
-                        <a:rPr lang="en-US" sz="3200" dirty="0">
-                          <a:latin typeface="+mj-lt"/>
-                        </a:rPr>
-                        <a:t>Results</a:t>
-                      </a:r>
-                      <a:endParaRPr lang="he-IL" sz="3200" dirty="0">
-                        <a:latin typeface="+mj-lt"/>
-                      </a:endParaRPr>
-                    </a:p>
-                  </a:txBody>
-                  <a:tcPr anchor="ctr">
-                    <a:lnL w="38100" cap="flat" cmpd="sng" algn="ctr">
-                      <a:solidFill>
-                        <a:schemeClr val="bg1"/>
-                      </a:solidFill>
-                      <a:prstDash val="solid"/>
-                      <a:round/>
-                      <a:headEnd type="none" w="med" len="med"/>
-                      <a:tailEnd type="none" w="med" len="med"/>
-                    </a:lnL>
-                    <a:lnR w="38100" cap="flat" cmpd="sng" algn="ctr">
-                      <a:solidFill>
-                        <a:schemeClr val="bg1"/>
-                      </a:solidFill>
-                      <a:prstDash val="solid"/>
-                      <a:round/>
-                      <a:headEnd type="none" w="med" len="med"/>
-                      <a:tailEnd type="none" w="med" len="med"/>
-                    </a:lnR>
-                    <a:lnT w="38100" cap="flat" cmpd="sng" algn="ctr">
-                      <a:solidFill>
-                        <a:schemeClr val="bg1"/>
-                      </a:solidFill>
-                      <a:prstDash val="solid"/>
-                      <a:round/>
-                      <a:headEnd type="none" w="med" len="med"/>
-                      <a:tailEnd type="none" w="med" len="med"/>
-                    </a:lnT>
-                    <a:lnB w="38100" cap="flat" cmpd="sng" algn="ctr">
-                      <a:solidFill>
-                        <a:schemeClr val="bg1"/>
-                      </a:solidFill>
-                      <a:prstDash val="solid"/>
-                      <a:round/>
-                      <a:headEnd type="none" w="med" len="med"/>
-                      <a:tailEnd type="none" w="med" len="med"/>
-                    </a:lnB>
-                  </a:tcPr>
-                </a:tc>
-                <a:extLst>
-                  <a:ext uri="{0D108BD9-81ED-4DB2-BD59-A6C34878D82A}">
-                    <a16:rowId xmlns:a16="http://schemas.microsoft.com/office/drawing/2014/main" val="1815053329"/>
-                  </a:ext>
-                </a:extLst>
-              </a:tr>
-              <a:tr h="24360373">
-                <a:tc>
-                  <a:txBody>
-                    <a:bodyPr/>
-                    <a:lstStyle/>
-                    <a:p>
-                      <a:pPr marL="457200" indent="-457200" algn="l" rtl="0">
-                        <a:lnSpc>
-                          <a:spcPct val="150000"/>
-                        </a:lnSpc>
-                        <a:buFont typeface="Arial" panose="020B0604020202020204" pitchFamily="34" charset="0"/>
-                        <a:buChar char="•"/>
-                      </a:pPr>
-                      <a:endParaRPr lang="en-US" sz="3200" kern="1200" dirty="0">
-                        <a:solidFill>
-                          <a:schemeClr val="dk1"/>
-                        </a:solidFill>
-                        <a:latin typeface="+mn-lt"/>
-                        <a:ea typeface="+mn-ea"/>
-                        <a:cs typeface="+mn-cs"/>
-                      </a:endParaRPr>
-                    </a:p>
-                    <a:p>
-                      <a:pPr marL="457200" indent="-457200" algn="l" rtl="0">
-                        <a:lnSpc>
-                          <a:spcPct val="150000"/>
-                        </a:lnSpc>
-                        <a:buFont typeface="Arial" panose="020B0604020202020204" pitchFamily="34" charset="0"/>
-                        <a:buChar char="•"/>
-                      </a:pPr>
-                      <a:endParaRPr lang="en-US" sz="3200" kern="1200" dirty="0">
-                        <a:solidFill>
-                          <a:schemeClr val="dk1"/>
-                        </a:solidFill>
-                        <a:latin typeface="+mn-lt"/>
-                        <a:ea typeface="+mn-ea"/>
-                        <a:cs typeface="+mn-cs"/>
-                      </a:endParaRPr>
-                    </a:p>
-                    <a:p>
-                      <a:pPr marL="457200" indent="-457200" algn="l" rtl="0">
-                        <a:lnSpc>
-                          <a:spcPct val="150000"/>
-                        </a:lnSpc>
-                        <a:buFont typeface="Arial" panose="020B0604020202020204" pitchFamily="34" charset="0"/>
-                        <a:buChar char="•"/>
-                      </a:pPr>
-                      <a:endParaRPr lang="en-US" sz="3200" kern="1200" dirty="0">
-                        <a:solidFill>
-                          <a:schemeClr val="dk1"/>
-                        </a:solidFill>
-                        <a:latin typeface="+mn-lt"/>
-                        <a:ea typeface="+mn-ea"/>
-                        <a:cs typeface="+mn-cs"/>
-                      </a:endParaRPr>
-                    </a:p>
-                    <a:p>
-                      <a:pPr marL="457200" indent="-457200" algn="l" rtl="0">
-                        <a:lnSpc>
-                          <a:spcPct val="150000"/>
-                        </a:lnSpc>
-                        <a:buFont typeface="Arial" panose="020B0604020202020204" pitchFamily="34" charset="0"/>
-                        <a:buChar char="•"/>
-                      </a:pPr>
-                      <a:endParaRPr lang="en-US" sz="3200" kern="1200" dirty="0">
-                        <a:solidFill>
-                          <a:schemeClr val="dk1"/>
-                        </a:solidFill>
-                        <a:latin typeface="+mn-lt"/>
-                        <a:ea typeface="+mn-ea"/>
-                        <a:cs typeface="+mn-cs"/>
-                      </a:endParaRPr>
-                    </a:p>
-                    <a:p>
-                      <a:pPr marL="457200" indent="-457200" algn="l" rtl="0">
-                        <a:lnSpc>
-                          <a:spcPct val="150000"/>
-                        </a:lnSpc>
-                        <a:buFont typeface="Arial" panose="020B0604020202020204" pitchFamily="34" charset="0"/>
-                        <a:buChar char="•"/>
-                      </a:pPr>
-                      <a:endParaRPr lang="en-US" sz="3200" kern="1200" dirty="0">
-                        <a:solidFill>
-                          <a:schemeClr val="dk1"/>
-                        </a:solidFill>
-                        <a:latin typeface="+mn-lt"/>
-                        <a:ea typeface="+mn-ea"/>
-                        <a:cs typeface="+mn-cs"/>
-                      </a:endParaRPr>
-                    </a:p>
-                    <a:p>
-                      <a:pPr marL="457200" indent="-457200" algn="l" rtl="0">
-                        <a:lnSpc>
-                          <a:spcPct val="150000"/>
-                        </a:lnSpc>
-                        <a:buFont typeface="Arial" panose="020B0604020202020204" pitchFamily="34" charset="0"/>
-                        <a:buChar char="•"/>
-                      </a:pPr>
-                      <a:endParaRPr lang="en-US" sz="3200" kern="1200" dirty="0">
-                        <a:solidFill>
-                          <a:schemeClr val="dk1"/>
-                        </a:solidFill>
-                        <a:latin typeface="+mn-lt"/>
-                        <a:ea typeface="+mn-ea"/>
-                        <a:cs typeface="+mn-cs"/>
-                      </a:endParaRPr>
-                    </a:p>
-                    <a:p>
-                      <a:pPr marL="457200" indent="-457200" algn="l" rtl="0">
-                        <a:lnSpc>
-                          <a:spcPct val="150000"/>
-                        </a:lnSpc>
-                        <a:buFont typeface="Arial" panose="020B0604020202020204" pitchFamily="34" charset="0"/>
-                        <a:buChar char="•"/>
-                      </a:pPr>
-                      <a:endParaRPr lang="en-US" sz="3200" kern="1200" dirty="0">
-                        <a:solidFill>
-                          <a:schemeClr val="dk1"/>
-                        </a:solidFill>
-                        <a:latin typeface="+mn-lt"/>
-                        <a:ea typeface="+mn-ea"/>
-                        <a:cs typeface="+mn-cs"/>
-                      </a:endParaRPr>
-                    </a:p>
-                    <a:p>
-                      <a:pPr marL="457200" indent="-457200" algn="l" rtl="0">
-                        <a:lnSpc>
-                          <a:spcPct val="150000"/>
-                        </a:lnSpc>
-                        <a:buFont typeface="Arial" panose="020B0604020202020204" pitchFamily="34" charset="0"/>
-                        <a:buChar char="•"/>
-                      </a:pPr>
-                      <a:endParaRPr lang="en-US" sz="3200" kern="1200" dirty="0">
-                        <a:solidFill>
-                          <a:schemeClr val="dk1"/>
-                        </a:solidFill>
-                        <a:latin typeface="+mn-lt"/>
-                        <a:ea typeface="+mn-ea"/>
-                        <a:cs typeface="+mn-cs"/>
-                      </a:endParaRPr>
-                    </a:p>
-                    <a:p>
-                      <a:pPr marL="457200" indent="-457200" algn="l" rtl="0">
-                        <a:lnSpc>
-                          <a:spcPct val="150000"/>
-                        </a:lnSpc>
-                        <a:buFont typeface="Arial" panose="020B0604020202020204" pitchFamily="34" charset="0"/>
-                        <a:buChar char="•"/>
-                      </a:pPr>
-                      <a:endParaRPr lang="en-US" sz="3200" kern="1200" dirty="0">
-                        <a:solidFill>
-                          <a:schemeClr val="dk1"/>
-                        </a:solidFill>
-                        <a:latin typeface="+mn-lt"/>
-                        <a:ea typeface="+mn-ea"/>
-                        <a:cs typeface="+mn-cs"/>
-                      </a:endParaRPr>
-                    </a:p>
-                    <a:p>
-                      <a:pPr marL="457200" indent="-457200" algn="l" rtl="0">
-                        <a:lnSpc>
-                          <a:spcPct val="150000"/>
-                        </a:lnSpc>
-                        <a:buFont typeface="Arial" panose="020B0604020202020204" pitchFamily="34" charset="0"/>
-                        <a:buChar char="•"/>
-                      </a:pPr>
-                      <a:endParaRPr lang="en-US" sz="3200" kern="1200" dirty="0">
-                        <a:solidFill>
-                          <a:schemeClr val="dk1"/>
-                        </a:solidFill>
-                        <a:latin typeface="+mn-lt"/>
-                        <a:ea typeface="+mn-ea"/>
-                        <a:cs typeface="+mn-cs"/>
-                      </a:endParaRPr>
-                    </a:p>
-                    <a:p>
-                      <a:pPr marL="457200" indent="-457200" algn="l" rtl="0">
-                        <a:lnSpc>
-                          <a:spcPct val="150000"/>
-                        </a:lnSpc>
-                        <a:buFont typeface="Arial" panose="020B0604020202020204" pitchFamily="34" charset="0"/>
-                        <a:buChar char="•"/>
-                      </a:pPr>
-                      <a:endParaRPr lang="en-US" sz="3200" kern="1200" dirty="0">
-                        <a:solidFill>
-                          <a:schemeClr val="dk1"/>
-                        </a:solidFill>
-                        <a:latin typeface="+mn-lt"/>
-                        <a:ea typeface="+mn-ea"/>
-                        <a:cs typeface="+mn-cs"/>
-                      </a:endParaRPr>
-                    </a:p>
-                    <a:p>
-                      <a:pPr marL="457200" indent="-457200" algn="l" rtl="0">
-                        <a:lnSpc>
-                          <a:spcPct val="150000"/>
-                        </a:lnSpc>
-                        <a:buFont typeface="Arial" panose="020B0604020202020204" pitchFamily="34" charset="0"/>
-                        <a:buChar char="•"/>
-                      </a:pPr>
-                      <a:endParaRPr lang="en-US" sz="3200" kern="1200" dirty="0">
-                        <a:solidFill>
-                          <a:schemeClr val="dk1"/>
-                        </a:solidFill>
-                        <a:latin typeface="+mn-lt"/>
-                        <a:ea typeface="+mn-ea"/>
-                        <a:cs typeface="+mn-cs"/>
-                      </a:endParaRPr>
-                    </a:p>
-                    <a:p>
-                      <a:pPr marL="457200" indent="-457200" algn="l" rtl="0">
-                        <a:lnSpc>
-                          <a:spcPct val="150000"/>
-                        </a:lnSpc>
-                        <a:buFont typeface="Arial" panose="020B0604020202020204" pitchFamily="34" charset="0"/>
-                        <a:buChar char="•"/>
-                      </a:pPr>
-                      <a:endParaRPr lang="en-US" sz="3200" kern="1200" dirty="0">
-                        <a:solidFill>
-                          <a:schemeClr val="dk1"/>
-                        </a:solidFill>
-                        <a:latin typeface="+mn-lt"/>
-                        <a:ea typeface="+mn-ea"/>
-                        <a:cs typeface="+mn-cs"/>
-                      </a:endParaRPr>
-                    </a:p>
-                    <a:p>
-                      <a:pPr marL="457200" indent="-457200" algn="l" rtl="0">
-                        <a:lnSpc>
-                          <a:spcPct val="150000"/>
-                        </a:lnSpc>
-                        <a:buFont typeface="Arial" panose="020B0604020202020204" pitchFamily="34" charset="0"/>
-                        <a:buChar char="•"/>
-                      </a:pPr>
-                      <a:endParaRPr lang="en-US" sz="3200" kern="1200" dirty="0">
-                        <a:solidFill>
-                          <a:schemeClr val="dk1"/>
-                        </a:solidFill>
-                        <a:latin typeface="+mn-lt"/>
-                        <a:ea typeface="+mn-ea"/>
-                        <a:cs typeface="+mn-cs"/>
-                      </a:endParaRPr>
-                    </a:p>
-                    <a:p>
-                      <a:pPr marL="457200" indent="-457200" algn="l" rtl="0">
-                        <a:lnSpc>
-                          <a:spcPct val="150000"/>
-                        </a:lnSpc>
-                        <a:buFont typeface="Arial" panose="020B0604020202020204" pitchFamily="34" charset="0"/>
-                        <a:buChar char="•"/>
-                      </a:pPr>
-                      <a:endParaRPr lang="en-US" sz="3200" kern="1200" dirty="0">
-                        <a:solidFill>
-                          <a:schemeClr val="dk1"/>
-                        </a:solidFill>
-                        <a:latin typeface="+mn-lt"/>
-                        <a:ea typeface="+mn-ea"/>
-                        <a:cs typeface="+mn-cs"/>
-                      </a:endParaRPr>
-                    </a:p>
-                    <a:p>
-                      <a:pPr marL="457200" indent="-457200" algn="l" rtl="0">
-                        <a:lnSpc>
-                          <a:spcPct val="150000"/>
-                        </a:lnSpc>
-                        <a:buFont typeface="Arial" panose="020B0604020202020204" pitchFamily="34" charset="0"/>
-                        <a:buChar char="•"/>
-                      </a:pPr>
-                      <a:endParaRPr lang="en-US" sz="3200" kern="1200" dirty="0">
-                        <a:solidFill>
-                          <a:schemeClr val="dk1"/>
-                        </a:solidFill>
-                        <a:latin typeface="+mn-lt"/>
-                        <a:ea typeface="+mn-ea"/>
-                        <a:cs typeface="+mn-cs"/>
-                      </a:endParaRPr>
-                    </a:p>
-                    <a:p>
-                      <a:pPr marL="457200" indent="-457200" algn="l" rtl="0">
-                        <a:lnSpc>
-                          <a:spcPct val="150000"/>
-                        </a:lnSpc>
-                        <a:buFont typeface="Arial" panose="020B0604020202020204" pitchFamily="34" charset="0"/>
-                        <a:buChar char="•"/>
-                      </a:pPr>
-                      <a:endParaRPr lang="en-US" sz="3200" kern="1200" dirty="0">
-                        <a:solidFill>
-                          <a:schemeClr val="dk1"/>
-                        </a:solidFill>
-                        <a:latin typeface="+mn-lt"/>
-                        <a:ea typeface="+mn-ea"/>
-                        <a:cs typeface="+mn-cs"/>
-                      </a:endParaRPr>
-                    </a:p>
-                    <a:p>
-                      <a:pPr marL="457200" indent="-457200" algn="l" rtl="0">
-                        <a:lnSpc>
-                          <a:spcPct val="150000"/>
-                        </a:lnSpc>
-                        <a:buFont typeface="Arial" panose="020B0604020202020204" pitchFamily="34" charset="0"/>
-                        <a:buChar char="•"/>
-                      </a:pPr>
-                      <a:endParaRPr lang="en-US" sz="3200" kern="1200" dirty="0">
-                        <a:solidFill>
-                          <a:schemeClr val="dk1"/>
-                        </a:solidFill>
-                        <a:latin typeface="+mn-lt"/>
-                        <a:ea typeface="+mn-ea"/>
-                        <a:cs typeface="+mn-cs"/>
-                      </a:endParaRPr>
-                    </a:p>
-                    <a:p>
-                      <a:pPr marL="0" indent="0" algn="l" rtl="0">
-                        <a:lnSpc>
-                          <a:spcPct val="150000"/>
-                        </a:lnSpc>
-                        <a:buFont typeface="Arial" panose="020B0604020202020204" pitchFamily="34" charset="0"/>
-                        <a:buNone/>
-                      </a:pPr>
-                      <a:endParaRPr lang="en-US" sz="3200" kern="1200" dirty="0">
-                        <a:solidFill>
-                          <a:schemeClr val="dk1"/>
-                        </a:solidFill>
-                        <a:latin typeface="+mn-lt"/>
-                        <a:ea typeface="+mn-ea"/>
-                        <a:cs typeface="+mn-cs"/>
-                      </a:endParaRPr>
-                    </a:p>
-                  </a:txBody>
-                  <a:tcPr>
-                    <a:lnL w="38100" cap="flat" cmpd="sng" algn="ctr">
-                      <a:solidFill>
-                        <a:schemeClr val="bg1"/>
-                      </a:solidFill>
-                      <a:prstDash val="solid"/>
-                      <a:round/>
-                      <a:headEnd type="none" w="med" len="med"/>
-                      <a:tailEnd type="none" w="med" len="med"/>
-                    </a:lnL>
-                    <a:lnR w="38100" cap="flat" cmpd="sng" algn="ctr">
-                      <a:solidFill>
-                        <a:schemeClr val="bg1"/>
-                      </a:solidFill>
-                      <a:prstDash val="solid"/>
-                      <a:round/>
-                      <a:headEnd type="none" w="med" len="med"/>
-                      <a:tailEnd type="none" w="med" len="med"/>
-                    </a:lnR>
-                    <a:lnT w="38100" cap="flat" cmpd="sng" algn="ctr">
-                      <a:solidFill>
-                        <a:schemeClr val="bg1"/>
-                      </a:solidFill>
-                      <a:prstDash val="solid"/>
-                      <a:round/>
-                      <a:headEnd type="none" w="med" len="med"/>
-                      <a:tailEnd type="none" w="med" len="med"/>
-                    </a:lnT>
-                    <a:lnB w="38100" cap="flat" cmpd="sng" algn="ctr">
-                      <a:solidFill>
-                        <a:schemeClr val="bg1"/>
-                      </a:solidFill>
-                      <a:prstDash val="solid"/>
-                      <a:round/>
-                      <a:headEnd type="none" w="med" len="med"/>
-                      <a:tailEnd type="none" w="med" len="med"/>
-                    </a:lnB>
-                    <a:lnTlToBr w="12700" cmpd="sng">
-                      <a:noFill/>
-                      <a:prstDash val="solid"/>
-                    </a:lnTlToBr>
-                    <a:lnBlToTr w="12700" cmpd="sng">
-                      <a:noFill/>
-                      <a:prstDash val="solid"/>
-                    </a:lnBlToTr>
-                    <a:noFill/>
-                  </a:tcPr>
-                </a:tc>
-                <a:extLst>
-                  <a:ext uri="{0D108BD9-81ED-4DB2-BD59-A6C34878D82A}">
-                    <a16:rowId xmlns:a16="http://schemas.microsoft.com/office/drawing/2014/main" val="1509631762"/>
-                  </a:ext>
-                </a:extLst>
-              </a:tr>
-            </a:tbl>
-          </a:graphicData>
-        </a:graphic>
-      </p:graphicFrame>
-      <p:graphicFrame>
-        <p:nvGraphicFramePr>
-          <p:cNvPr id="38" name="Table 29">
-            <a:extLst>
-              <a:ext uri="{FF2B5EF4-FFF2-40B4-BE49-F238E27FC236}">
-                <a16:creationId xmlns:a16="http://schemas.microsoft.com/office/drawing/2014/main" id="{D427151E-66F0-FCB6-3D6D-D9E7DF69BFDA}"/>
-              </a:ext>
-            </a:extLst>
-          </p:cNvPr>
-          <p:cNvGraphicFramePr>
-            <a:graphicFrameLocks noGrp="1"/>
-          </p:cNvGraphicFramePr>
-          <p:nvPr>
-            <p:extLst>
-              <p:ext uri="{D42A27DB-BD31-4B8C-83A1-F6EECF244321}">
-                <p14:modId xmlns:p14="http://schemas.microsoft.com/office/powerpoint/2010/main" val="3326242090"/>
-              </p:ext>
-            </p:extLst>
-          </p:nvPr>
-        </p:nvGraphicFramePr>
-        <p:xfrm>
-          <a:off x="0" y="11422176"/>
-          <a:ext cx="14759780" cy="10320760"/>
-        </p:xfrm>
-        <a:graphic>
-          <a:graphicData uri="http://schemas.openxmlformats.org/drawingml/2006/table">
-            <a:tbl>
-              <a:tblPr rtl="1" firstRow="1" bandRow="1">
-                <a:tableStyleId>{F5AB1C69-6EDB-4FF4-983F-18BD219EF322}</a:tableStyleId>
-              </a:tblPr>
-              <a:tblGrid>
-                <a:gridCol w="14759780">
-                  <a:extLst>
-                    <a:ext uri="{9D8B030D-6E8A-4147-A177-3AD203B41FA5}">
-                      <a16:colId xmlns:a16="http://schemas.microsoft.com/office/drawing/2014/main" val="3747045786"/>
-                    </a:ext>
-                  </a:extLst>
-                </a:gridCol>
-              </a:tblGrid>
-              <a:tr h="795125">
-                <a:tc>
-                  <a:txBody>
-                    <a:bodyPr/>
-                    <a:lstStyle/>
-                    <a:p>
-                      <a:pPr marL="0" indent="0" algn="ctr" rtl="0">
-                        <a:lnSpc>
-                          <a:spcPct val="150000"/>
-                        </a:lnSpc>
-                        <a:buFont typeface="Arial" panose="020B0604020202020204" pitchFamily="34" charset="0"/>
-                        <a:buNone/>
-                      </a:pPr>
-                      <a:r>
-                        <a:rPr lang="en-US" sz="3200" dirty="0">
-                          <a:latin typeface="+mj-lt"/>
-                        </a:rPr>
-                        <a:t>Data and its collection</a:t>
-                      </a:r>
-                      <a:endParaRPr lang="en-US" sz="3200" kern="1200" dirty="0">
-                        <a:solidFill>
-                          <a:schemeClr val="dk1"/>
-                        </a:solidFill>
-                        <a:latin typeface="+mj-lt"/>
-                        <a:ea typeface="+mn-ea"/>
-                        <a:cs typeface="+mn-cs"/>
-                      </a:endParaRPr>
-                    </a:p>
-                  </a:txBody>
-                  <a:tcPr anchor="ctr">
-                    <a:lnL w="38100" cap="flat" cmpd="sng" algn="ctr">
-                      <a:solidFill>
-                        <a:schemeClr val="bg1"/>
-                      </a:solidFill>
-                      <a:prstDash val="solid"/>
-                      <a:round/>
-                      <a:headEnd type="none" w="med" len="med"/>
-                      <a:tailEnd type="none" w="med" len="med"/>
-                    </a:lnL>
-                    <a:lnR w="38100" cap="flat" cmpd="sng" algn="ctr">
-                      <a:solidFill>
-                        <a:schemeClr val="bg1"/>
-                      </a:solidFill>
-                      <a:prstDash val="solid"/>
-                      <a:round/>
-                      <a:headEnd type="none" w="med" len="med"/>
-                      <a:tailEnd type="none" w="med" len="med"/>
-                    </a:lnR>
-                    <a:lnT w="38100" cap="flat" cmpd="sng" algn="ctr">
-                      <a:solidFill>
-                        <a:schemeClr val="bg1"/>
-                      </a:solidFill>
-                      <a:prstDash val="solid"/>
-                      <a:round/>
-                      <a:headEnd type="none" w="med" len="med"/>
-                      <a:tailEnd type="none" w="med" len="med"/>
-                    </a:lnT>
-                    <a:lnB w="38100" cap="flat" cmpd="sng" algn="ctr">
-                      <a:solidFill>
-                        <a:schemeClr val="bg1"/>
-                      </a:solidFill>
-                      <a:prstDash val="solid"/>
-                      <a:round/>
-                      <a:headEnd type="none" w="med" len="med"/>
-                      <a:tailEnd type="none" w="med" len="med"/>
-                    </a:lnB>
-                  </a:tcPr>
-                </a:tc>
-                <a:extLst>
-                  <a:ext uri="{0D108BD9-81ED-4DB2-BD59-A6C34878D82A}">
-                    <a16:rowId xmlns:a16="http://schemas.microsoft.com/office/drawing/2014/main" val="1815053329"/>
-                  </a:ext>
-                </a:extLst>
-              </a:tr>
-              <a:tr h="8847325">
-                <a:tc>
-                  <a:txBody>
-                    <a:bodyPr/>
-                    <a:lstStyle/>
-                    <a:p>
-                      <a:pPr marL="457200" indent="-457200" algn="l" rtl="0">
-                        <a:lnSpc>
-                          <a:spcPct val="150000"/>
-                        </a:lnSpc>
-                        <a:buFont typeface="Arial" panose="020B0604020202020204" pitchFamily="34" charset="0"/>
-                        <a:buChar char="•"/>
-                      </a:pPr>
-                      <a:r>
-                        <a:rPr lang="en-US" sz="3200" kern="1200" dirty="0">
-                          <a:solidFill>
-                            <a:schemeClr val="dk1"/>
-                          </a:solidFill>
-                          <a:latin typeface="+mj-lt"/>
-                          <a:ea typeface="+mn-ea"/>
-                          <a:cs typeface="+mn-cs"/>
-                        </a:rPr>
-                        <a:t>Data was collected starting from November 2018. </a:t>
-                      </a:r>
-                    </a:p>
-                    <a:p>
-                      <a:pPr marL="457200" indent="-457200" algn="l" rtl="0">
-                        <a:lnSpc>
-                          <a:spcPct val="150000"/>
-                        </a:lnSpc>
-                        <a:buFont typeface="Arial" panose="020B0604020202020204" pitchFamily="34" charset="0"/>
-                        <a:buChar char="•"/>
-                      </a:pPr>
-                      <a:r>
-                        <a:rPr lang="en-US" sz="3200" strike="noStrike" kern="1200" dirty="0">
-                          <a:solidFill>
-                            <a:schemeClr val="dk1"/>
-                          </a:solidFill>
-                          <a:latin typeface="+mj-lt"/>
-                          <a:ea typeface="+mn-ea"/>
-                          <a:cs typeface="+mn-cs"/>
-                        </a:rPr>
-                        <a:t>Experiment participants: Hebrew speaking parents from all sectors, close to due date with normal birth weight and no defects. </a:t>
-                      </a:r>
-                    </a:p>
-                    <a:p>
-                      <a:pPr marL="457200" indent="-457200" algn="l" rtl="0">
-                        <a:lnSpc>
-                          <a:spcPct val="150000"/>
-                        </a:lnSpc>
-                        <a:buFont typeface="Arial" panose="020B0604020202020204" pitchFamily="34" charset="0"/>
-                        <a:buChar char="•"/>
-                      </a:pPr>
-                      <a:r>
-                        <a:rPr lang="en-US" sz="3200" strike="noStrike" kern="1200" dirty="0">
-                          <a:solidFill>
-                            <a:schemeClr val="dk1"/>
-                          </a:solidFill>
-                          <a:latin typeface="+mj-lt"/>
-                          <a:ea typeface="+mn-ea"/>
-                          <a:cs typeface="+mn-cs"/>
-                        </a:rPr>
-                        <a:t>At predetermined intervals, parents were sent questionnaires to collect data.</a:t>
-                      </a:r>
-                    </a:p>
-                    <a:p>
-                      <a:pPr marL="457200" indent="-457200" algn="l" rtl="0">
-                        <a:lnSpc>
-                          <a:spcPct val="150000"/>
-                        </a:lnSpc>
-                        <a:buFont typeface="Arial" panose="020B0604020202020204" pitchFamily="34" charset="0"/>
-                        <a:buChar char="•"/>
-                      </a:pPr>
-                      <a:r>
-                        <a:rPr lang="en-US" sz="3200" strike="noStrike" kern="1200" dirty="0">
-                          <a:solidFill>
-                            <a:schemeClr val="dk1"/>
-                          </a:solidFill>
-                          <a:latin typeface="+mj-lt"/>
-                          <a:ea typeface="+mn-ea"/>
-                          <a:cs typeface="+mn-cs"/>
-                        </a:rPr>
-                        <a:t>Characteristics of the babies, their families, and their environment were collected.</a:t>
-                      </a:r>
-                      <a:br>
-                        <a:rPr lang="en-US" sz="3200" strike="noStrike" kern="1200" dirty="0">
-                          <a:solidFill>
-                            <a:schemeClr val="dk1"/>
-                          </a:solidFill>
-                          <a:latin typeface="+mj-lt"/>
-                          <a:ea typeface="+mn-ea"/>
-                          <a:cs typeface="+mn-cs"/>
-                        </a:rPr>
-                      </a:br>
-                      <a:r>
-                        <a:rPr lang="en-US" sz="3200" strike="noStrike" kern="1200" dirty="0">
-                          <a:solidFill>
-                            <a:schemeClr val="dk1"/>
-                          </a:solidFill>
-                          <a:latin typeface="+mj-lt"/>
-                          <a:ea typeface="+mn-ea"/>
-                          <a:cs typeface="+mn-cs"/>
-                        </a:rPr>
-                        <a:t>Development of utopian diseases among babies was examined during experiment. </a:t>
-                      </a:r>
-                    </a:p>
-                    <a:p>
-                      <a:pPr marL="457200" marR="0" lvl="0" indent="-457200" algn="l" defTabSz="2951958" rtl="0" eaLnBrk="1" fontAlgn="auto" latinLnBrk="0" hangingPunct="1">
-                        <a:lnSpc>
-                          <a:spcPct val="150000"/>
-                        </a:lnSpc>
-                        <a:spcBef>
-                          <a:spcPts val="0"/>
-                        </a:spcBef>
-                        <a:spcAft>
-                          <a:spcPts val="0"/>
-                        </a:spcAft>
-                        <a:buClrTx/>
-                        <a:buSzTx/>
-                        <a:buFont typeface="Arial" panose="020B0604020202020204" pitchFamily="34" charset="0"/>
-                        <a:buChar char="•"/>
-                        <a:tabLst/>
-                        <a:defRPr/>
-                      </a:pPr>
-                      <a:r>
-                        <a:rPr lang="en-US" sz="3200" b="0" kern="1200" dirty="0">
-                          <a:solidFill>
-                            <a:schemeClr val="dk1"/>
-                          </a:solidFill>
-                          <a:latin typeface="+mj-lt"/>
-                          <a:ea typeface="+mn-ea"/>
-                          <a:cs typeface="+mn-cs"/>
-                        </a:rPr>
-                        <a:t>The babies were divided into 4 groups according to the date of birth and main landmarks during the pandemic.</a:t>
-                      </a:r>
-                      <a:endParaRPr lang="he-IL" sz="3200" b="0" kern="1200" dirty="0">
-                        <a:solidFill>
-                          <a:schemeClr val="dk1"/>
-                        </a:solidFill>
-                        <a:latin typeface="+mj-lt"/>
-                        <a:ea typeface="+mn-ea"/>
-                        <a:cs typeface="+mn-cs"/>
-                      </a:endParaRPr>
-                    </a:p>
-                    <a:p>
-                      <a:pPr marL="0" indent="0" algn="l" rtl="0">
-                        <a:lnSpc>
-                          <a:spcPct val="150000"/>
-                        </a:lnSpc>
-                        <a:buFont typeface="Arial" panose="020B0604020202020204" pitchFamily="34" charset="0"/>
-                        <a:buNone/>
-                      </a:pPr>
-                      <a:endParaRPr lang="en-US" sz="3200" kern="1200" dirty="0">
-                        <a:solidFill>
-                          <a:schemeClr val="dk1"/>
-                        </a:solidFill>
-                        <a:latin typeface="+mj-lt"/>
-                        <a:ea typeface="+mn-ea"/>
-                        <a:cs typeface="+mn-cs"/>
-                      </a:endParaRPr>
-                    </a:p>
-                    <a:p>
-                      <a:pPr marL="457200" indent="-457200" algn="l" rtl="0">
-                        <a:lnSpc>
-                          <a:spcPct val="150000"/>
-                        </a:lnSpc>
-                        <a:buFont typeface="Arial" panose="020B0604020202020204" pitchFamily="34" charset="0"/>
-                        <a:buChar char="•"/>
-                      </a:pPr>
-                      <a:endParaRPr lang="en-US" sz="3200" kern="1200" dirty="0">
-                        <a:solidFill>
-                          <a:schemeClr val="dk1"/>
-                        </a:solidFill>
-                        <a:latin typeface="+mj-lt"/>
-                        <a:ea typeface="+mn-ea"/>
-                        <a:cs typeface="+mn-cs"/>
-                      </a:endParaRPr>
-                    </a:p>
-                    <a:p>
-                      <a:pPr marL="457200" indent="-457200" algn="l" rtl="0">
-                        <a:lnSpc>
-                          <a:spcPct val="150000"/>
-                        </a:lnSpc>
-                        <a:buFont typeface="Arial" panose="020B0604020202020204" pitchFamily="34" charset="0"/>
-                        <a:buChar char="•"/>
-                      </a:pPr>
-                      <a:endParaRPr lang="en-US" sz="3200" kern="1200" dirty="0">
-                        <a:solidFill>
-                          <a:schemeClr val="dk1"/>
-                        </a:solidFill>
-                        <a:latin typeface="+mj-lt"/>
-                        <a:ea typeface="+mn-ea"/>
-                        <a:cs typeface="+mn-cs"/>
-                      </a:endParaRPr>
-                    </a:p>
-                    <a:p>
-                      <a:pPr marL="457200" indent="-457200" algn="l" rtl="0">
-                        <a:lnSpc>
-                          <a:spcPct val="150000"/>
-                        </a:lnSpc>
-                        <a:buFont typeface="Arial" panose="020B0604020202020204" pitchFamily="34" charset="0"/>
-                        <a:buChar char="•"/>
-                      </a:pPr>
-                      <a:r>
-                        <a:rPr lang="he-IL" sz="3200" kern="1200" dirty="0">
-                          <a:solidFill>
-                            <a:schemeClr val="dk1"/>
-                          </a:solidFill>
-                          <a:latin typeface="+mj-lt"/>
-                          <a:ea typeface="+mn-ea"/>
-                          <a:cs typeface="+mn-cs"/>
-                        </a:rPr>
-                        <a:t>???</a:t>
-                      </a:r>
-                      <a:endParaRPr lang="en-US" sz="3200" kern="1200" dirty="0">
-                        <a:solidFill>
-                          <a:schemeClr val="dk1"/>
-                        </a:solidFill>
-                        <a:latin typeface="+mj-lt"/>
-                        <a:ea typeface="+mn-ea"/>
-                        <a:cs typeface="+mn-cs"/>
-                      </a:endParaRPr>
-                    </a:p>
-                    <a:p>
-                      <a:pPr marL="457200" indent="-457200" algn="l" rtl="0">
-                        <a:lnSpc>
-                          <a:spcPct val="150000"/>
-                        </a:lnSpc>
-                        <a:buFont typeface="Arial" panose="020B0604020202020204" pitchFamily="34" charset="0"/>
-                        <a:buChar char="•"/>
-                      </a:pPr>
-                      <a:endParaRPr lang="en-US" sz="3200" kern="1200" dirty="0">
-                        <a:solidFill>
-                          <a:schemeClr val="dk1"/>
-                        </a:solidFill>
-                        <a:latin typeface="+mj-lt"/>
-                        <a:ea typeface="+mn-ea"/>
-                        <a:cs typeface="+mn-cs"/>
-                      </a:endParaRPr>
-                    </a:p>
-                  </a:txBody>
-                  <a:tcPr>
-                    <a:lnL w="38100" cap="flat" cmpd="sng" algn="ctr">
-                      <a:solidFill>
-                        <a:schemeClr val="bg1"/>
-                      </a:solidFill>
-                      <a:prstDash val="solid"/>
-                      <a:round/>
-                      <a:headEnd type="none" w="med" len="med"/>
-                      <a:tailEnd type="none" w="med" len="med"/>
-                    </a:lnL>
-                    <a:lnR w="38100" cap="flat" cmpd="sng" algn="ctr">
-                      <a:solidFill>
-                        <a:schemeClr val="bg1"/>
-                      </a:solidFill>
-                      <a:prstDash val="solid"/>
-                      <a:round/>
-                      <a:headEnd type="none" w="med" len="med"/>
-                      <a:tailEnd type="none" w="med" len="med"/>
-                    </a:lnR>
-                    <a:lnT w="38100" cap="flat" cmpd="sng" algn="ctr">
-                      <a:solidFill>
-                        <a:schemeClr val="bg1"/>
-                      </a:solidFill>
-                      <a:prstDash val="solid"/>
-                      <a:round/>
-                      <a:headEnd type="none" w="med" len="med"/>
-                      <a:tailEnd type="none" w="med" len="med"/>
-                    </a:lnT>
-                    <a:lnB w="38100" cap="flat" cmpd="sng" algn="ctr">
-                      <a:solidFill>
-                        <a:schemeClr val="bg1"/>
-                      </a:solidFill>
-                      <a:prstDash val="solid"/>
-                      <a:round/>
-                      <a:headEnd type="none" w="med" len="med"/>
-                      <a:tailEnd type="none" w="med" len="med"/>
-                    </a:lnB>
-                    <a:lnTlToBr w="12700" cmpd="sng">
-                      <a:noFill/>
-                      <a:prstDash val="solid"/>
-                    </a:lnTlToBr>
-                    <a:lnBlToTr w="12700" cmpd="sng">
-                      <a:noFill/>
-                      <a:prstDash val="solid"/>
-                    </a:lnBlToTr>
-                    <a:noFill/>
-                  </a:tcPr>
-                </a:tc>
-                <a:extLst>
-                  <a:ext uri="{0D108BD9-81ED-4DB2-BD59-A6C34878D82A}">
-                    <a16:rowId xmlns:a16="http://schemas.microsoft.com/office/drawing/2014/main" val="1509631762"/>
-                  </a:ext>
-                </a:extLst>
-              </a:tr>
-            </a:tbl>
-          </a:graphicData>
-        </a:graphic>
-      </p:graphicFrame>
-      <p:graphicFrame>
-        <p:nvGraphicFramePr>
-          <p:cNvPr id="41" name="Table 29">
-            <a:extLst>
-              <a:ext uri="{FF2B5EF4-FFF2-40B4-BE49-F238E27FC236}">
-                <a16:creationId xmlns:a16="http://schemas.microsoft.com/office/drawing/2014/main" id="{87C34A28-1550-8A00-8213-E8C2029623E4}"/>
-              </a:ext>
-            </a:extLst>
-          </p:cNvPr>
-          <p:cNvGraphicFramePr>
-            <a:graphicFrameLocks noGrp="1"/>
-          </p:cNvGraphicFramePr>
-          <p:nvPr>
-            <p:extLst>
-              <p:ext uri="{D42A27DB-BD31-4B8C-83A1-F6EECF244321}">
-                <p14:modId xmlns:p14="http://schemas.microsoft.com/office/powerpoint/2010/main" val="1854480621"/>
-              </p:ext>
-            </p:extLst>
-          </p:nvPr>
-        </p:nvGraphicFramePr>
-        <p:xfrm>
-          <a:off x="-2" y="21648818"/>
-          <a:ext cx="14759780" cy="13423890"/>
-        </p:xfrm>
-        <a:graphic>
-          <a:graphicData uri="http://schemas.openxmlformats.org/drawingml/2006/table">
-            <a:tbl>
-              <a:tblPr rtl="1" firstRow="1" bandRow="1">
-                <a:tableStyleId>{F5AB1C69-6EDB-4FF4-983F-18BD219EF322}</a:tableStyleId>
-              </a:tblPr>
-              <a:tblGrid>
-                <a:gridCol w="14759780">
-                  <a:extLst>
-                    <a:ext uri="{9D8B030D-6E8A-4147-A177-3AD203B41FA5}">
-                      <a16:colId xmlns:a16="http://schemas.microsoft.com/office/drawing/2014/main" val="3747045786"/>
-                    </a:ext>
-                  </a:extLst>
-                </a:gridCol>
-              </a:tblGrid>
-              <a:tr h="0">
-                <a:tc>
-                  <a:txBody>
-                    <a:bodyPr/>
-                    <a:lstStyle/>
-                    <a:p>
-                      <a:pPr marL="0" indent="0" algn="ctr" rtl="0">
-                        <a:lnSpc>
-                          <a:spcPct val="150000"/>
-                        </a:lnSpc>
-                        <a:buFont typeface="Arial" panose="020B0604020202020204" pitchFamily="34" charset="0"/>
-                        <a:buNone/>
-                      </a:pPr>
-                      <a:r>
-                        <a:rPr lang="en-US" sz="2800" dirty="0">
-                          <a:latin typeface="+mj-lt"/>
-                        </a:rPr>
-                        <a:t>Experimental Design</a:t>
-                      </a:r>
-                      <a:endParaRPr lang="en-US" sz="2800" kern="1200" dirty="0">
-                        <a:solidFill>
-                          <a:schemeClr val="dk1"/>
-                        </a:solidFill>
-                        <a:latin typeface="+mj-lt"/>
-                        <a:ea typeface="+mn-ea"/>
-                        <a:cs typeface="+mn-cs"/>
-                      </a:endParaRPr>
-                    </a:p>
-                  </a:txBody>
-                  <a:tcPr anchor="ctr">
-                    <a:lnL w="38100" cap="flat" cmpd="sng" algn="ctr">
-                      <a:solidFill>
-                        <a:schemeClr val="bg1"/>
-                      </a:solidFill>
-                      <a:prstDash val="solid"/>
-                      <a:round/>
-                      <a:headEnd type="none" w="med" len="med"/>
-                      <a:tailEnd type="none" w="med" len="med"/>
-                    </a:lnL>
-                    <a:lnR w="38100" cap="flat" cmpd="sng" algn="ctr">
-                      <a:solidFill>
-                        <a:schemeClr val="bg1"/>
-                      </a:solidFill>
-                      <a:prstDash val="solid"/>
-                      <a:round/>
-                      <a:headEnd type="none" w="med" len="med"/>
-                      <a:tailEnd type="none" w="med" len="med"/>
-                    </a:lnR>
-                    <a:lnT w="38100" cap="flat" cmpd="sng" algn="ctr">
-                      <a:solidFill>
-                        <a:schemeClr val="bg1"/>
-                      </a:solidFill>
-                      <a:prstDash val="solid"/>
-                      <a:round/>
-                      <a:headEnd type="none" w="med" len="med"/>
-                      <a:tailEnd type="none" w="med" len="med"/>
-                    </a:lnT>
-                    <a:lnB w="38100" cap="flat" cmpd="sng" algn="ctr">
-                      <a:solidFill>
-                        <a:schemeClr val="bg1"/>
-                      </a:solidFill>
-                      <a:prstDash val="solid"/>
-                      <a:round/>
-                      <a:headEnd type="none" w="med" len="med"/>
-                      <a:tailEnd type="none" w="med" len="med"/>
-                    </a:lnB>
-                  </a:tcPr>
-                </a:tc>
-                <a:extLst>
-                  <a:ext uri="{0D108BD9-81ED-4DB2-BD59-A6C34878D82A}">
-                    <a16:rowId xmlns:a16="http://schemas.microsoft.com/office/drawing/2014/main" val="1815053329"/>
-                  </a:ext>
-                </a:extLst>
-              </a:tr>
-              <a:tr h="12758537">
-                <a:tc>
-                  <a:txBody>
-                    <a:bodyPr/>
-                    <a:lstStyle/>
-                    <a:p>
-                      <a:pPr marL="457200" indent="-457200" algn="l" rtl="0">
-                        <a:lnSpc>
-                          <a:spcPct val="150000"/>
-                        </a:lnSpc>
-                        <a:buFont typeface="Arial" panose="020B0604020202020204" pitchFamily="34" charset="0"/>
-                        <a:buChar char="•"/>
-                      </a:pPr>
-                      <a:r>
-                        <a:rPr lang="en-US" sz="2800" b="1" kern="1200" dirty="0">
-                          <a:solidFill>
-                            <a:schemeClr val="dk1"/>
-                          </a:solidFill>
-                          <a:latin typeface="+mj-lt"/>
-                          <a:ea typeface="+mn-ea"/>
-                          <a:cs typeface="+mn-cs"/>
-                        </a:rPr>
-                        <a:t>Logistic Regression Model </a:t>
-                      </a:r>
-                      <a:r>
-                        <a:rPr lang="en-US" sz="2800" kern="1200" dirty="0">
-                          <a:solidFill>
-                            <a:schemeClr val="dk1"/>
-                          </a:solidFill>
-                          <a:latin typeface="+mj-lt"/>
-                          <a:ea typeface="+mn-ea"/>
-                          <a:cs typeface="+mn-cs"/>
-                        </a:rPr>
-                        <a:t>was used to test the effect of explanatory characteristics on the probability of having an atopic disease using birth date group as the categorical variable.</a:t>
-                      </a:r>
-                    </a:p>
-                    <a:p>
-                      <a:pPr marL="0" indent="0" algn="l" rtl="0">
-                        <a:lnSpc>
-                          <a:spcPct val="150000"/>
-                        </a:lnSpc>
-                        <a:buFont typeface="Arial" panose="020B0604020202020204" pitchFamily="34" charset="0"/>
-                        <a:buNone/>
-                      </a:pPr>
-                      <a:endParaRPr lang="en-US" sz="2800" kern="1200" dirty="0">
-                        <a:solidFill>
-                          <a:schemeClr val="dk1"/>
-                        </a:solidFill>
-                        <a:latin typeface="+mj-lt"/>
-                        <a:ea typeface="+mn-ea"/>
-                        <a:cs typeface="+mn-cs"/>
-                      </a:endParaRPr>
-                    </a:p>
-                    <a:p>
-                      <a:pPr marL="0" indent="0" algn="l" rtl="0">
-                        <a:lnSpc>
-                          <a:spcPct val="150000"/>
-                        </a:lnSpc>
-                        <a:buFont typeface="Arial" panose="020B0604020202020204" pitchFamily="34" charset="0"/>
-                        <a:buNone/>
-                      </a:pPr>
-                      <a:endParaRPr lang="en-US" sz="2800" kern="1200" dirty="0">
-                        <a:solidFill>
-                          <a:schemeClr val="dk1"/>
-                        </a:solidFill>
-                        <a:latin typeface="+mj-lt"/>
-                        <a:ea typeface="+mn-ea"/>
-                        <a:cs typeface="+mn-cs"/>
-                      </a:endParaRPr>
-                    </a:p>
-                    <a:p>
-                      <a:pPr marL="0" indent="0" algn="l" rtl="0">
-                        <a:lnSpc>
-                          <a:spcPct val="150000"/>
-                        </a:lnSpc>
-                        <a:buFont typeface="Arial" panose="020B0604020202020204" pitchFamily="34" charset="0"/>
-                        <a:buNone/>
-                      </a:pPr>
-                      <a:endParaRPr lang="en-US" sz="2800" kern="1200" dirty="0">
-                        <a:solidFill>
-                          <a:schemeClr val="dk1"/>
-                        </a:solidFill>
-                        <a:latin typeface="+mj-lt"/>
-                        <a:ea typeface="+mn-ea"/>
-                        <a:cs typeface="+mn-cs"/>
-                      </a:endParaRPr>
-                    </a:p>
-                    <a:p>
-                      <a:pPr marL="0" indent="0" algn="l" rtl="0">
-                        <a:lnSpc>
-                          <a:spcPct val="150000"/>
-                        </a:lnSpc>
-                        <a:buFont typeface="Arial" panose="020B0604020202020204" pitchFamily="34" charset="0"/>
-                        <a:buNone/>
-                      </a:pPr>
-                      <a:endParaRPr lang="en-US" sz="2800" kern="1200" dirty="0">
-                        <a:solidFill>
-                          <a:schemeClr val="dk1"/>
-                        </a:solidFill>
-                        <a:latin typeface="+mj-lt"/>
-                        <a:ea typeface="+mn-ea"/>
-                        <a:cs typeface="+mn-cs"/>
-                      </a:endParaRPr>
-                    </a:p>
-                    <a:p>
-                      <a:pPr marL="457200" indent="-457200" algn="l" rtl="0">
-                        <a:lnSpc>
-                          <a:spcPct val="150000"/>
-                        </a:lnSpc>
-                        <a:buFont typeface="Arial" panose="020B0604020202020204" pitchFamily="34" charset="0"/>
-                        <a:buChar char="•"/>
-                      </a:pPr>
-                      <a:r>
-                        <a:rPr lang="en-US" sz="2800" b="1" kern="1200" dirty="0">
-                          <a:solidFill>
-                            <a:schemeClr val="dk1"/>
-                          </a:solidFill>
-                          <a:highlight>
-                            <a:srgbClr val="FFFF00"/>
-                          </a:highlight>
-                          <a:latin typeface="+mj-lt"/>
-                          <a:ea typeface="+mn-ea"/>
-                          <a:cs typeface="+mn-cs"/>
-                        </a:rPr>
-                        <a:t>Generalized Additive Model: </a:t>
-                      </a:r>
-                      <a:r>
-                        <a:rPr lang="en-US" sz="2800" b="0" kern="1200" dirty="0">
-                          <a:solidFill>
-                            <a:schemeClr val="dk1"/>
-                          </a:solidFill>
-                          <a:latin typeface="+mj-lt"/>
-                          <a:ea typeface="+mn-ea"/>
-                          <a:cs typeface="+mn-cs"/>
-                        </a:rPr>
-                        <a:t>Gam model </a:t>
-                      </a:r>
-                      <a:r>
-                        <a:rPr lang="en-US" sz="2800" kern="1200" dirty="0">
-                          <a:solidFill>
-                            <a:schemeClr val="dk1"/>
-                          </a:solidFill>
-                          <a:latin typeface="+mj-lt"/>
-                          <a:ea typeface="+mn-ea"/>
-                          <a:cs typeface="+mn-cs"/>
-                        </a:rPr>
-                        <a:t>provides us with an alternative to dividing the birth date into groups, instead of the date of birth acting as a categorical variable we made it continuous (every day is a category). We used a non-linear combination of variables, which create a smooth function. By connecting these smooth functions, we examined how the probability of a baby getting a atopic disease changes:</a:t>
-                      </a:r>
-                    </a:p>
-                  </a:txBody>
-                  <a:tcPr>
-                    <a:lnL w="38100" cap="flat" cmpd="sng" algn="ctr">
-                      <a:solidFill>
-                        <a:schemeClr val="bg1"/>
-                      </a:solidFill>
-                      <a:prstDash val="solid"/>
-                      <a:round/>
-                      <a:headEnd type="none" w="med" len="med"/>
-                      <a:tailEnd type="none" w="med" len="med"/>
-                    </a:lnL>
-                    <a:lnR w="38100" cap="flat" cmpd="sng" algn="ctr">
-                      <a:solidFill>
-                        <a:schemeClr val="bg1"/>
-                      </a:solidFill>
-                      <a:prstDash val="solid"/>
-                      <a:round/>
-                      <a:headEnd type="none" w="med" len="med"/>
-                      <a:tailEnd type="none" w="med" len="med"/>
-                    </a:lnR>
-                    <a:lnT w="38100" cap="flat" cmpd="sng" algn="ctr">
-                      <a:solidFill>
-                        <a:schemeClr val="bg1"/>
-                      </a:solidFill>
-                      <a:prstDash val="solid"/>
-                      <a:round/>
-                      <a:headEnd type="none" w="med" len="med"/>
-                      <a:tailEnd type="none" w="med" len="med"/>
-                    </a:lnT>
-                    <a:lnB w="38100" cap="flat" cmpd="sng" algn="ctr">
-                      <a:solidFill>
-                        <a:schemeClr val="bg1"/>
-                      </a:solidFill>
-                      <a:prstDash val="solid"/>
-                      <a:round/>
-                      <a:headEnd type="none" w="med" len="med"/>
-                      <a:tailEnd type="none" w="med" len="med"/>
-                    </a:lnB>
-                    <a:lnTlToBr w="12700" cmpd="sng">
-                      <a:noFill/>
-                      <a:prstDash val="solid"/>
-                    </a:lnTlToBr>
-                    <a:lnBlToTr w="12700" cmpd="sng">
-                      <a:noFill/>
-                      <a:prstDash val="solid"/>
-                    </a:lnBlToTr>
-                    <a:noFill/>
-                  </a:tcPr>
-                </a:tc>
-                <a:extLst>
-                  <a:ext uri="{0D108BD9-81ED-4DB2-BD59-A6C34878D82A}">
-                    <a16:rowId xmlns:a16="http://schemas.microsoft.com/office/drawing/2014/main" val="1509631762"/>
-                  </a:ext>
-                </a:extLst>
-              </a:tr>
-            </a:tbl>
-          </a:graphicData>
-        </a:graphic>
-      </p:graphicFrame>
-      <p:graphicFrame>
-        <p:nvGraphicFramePr>
-          <p:cNvPr id="42" name="Table 29">
-            <a:extLst>
-              <a:ext uri="{FF2B5EF4-FFF2-40B4-BE49-F238E27FC236}">
-                <a16:creationId xmlns:a16="http://schemas.microsoft.com/office/drawing/2014/main" id="{5F353C99-9559-5FFC-9840-C01B90960996}"/>
-              </a:ext>
-            </a:extLst>
-          </p:cNvPr>
-          <p:cNvGraphicFramePr>
-            <a:graphicFrameLocks noGrp="1"/>
-          </p:cNvGraphicFramePr>
-          <p:nvPr>
-            <p:extLst>
-              <p:ext uri="{D42A27DB-BD31-4B8C-83A1-F6EECF244321}">
-                <p14:modId xmlns:p14="http://schemas.microsoft.com/office/powerpoint/2010/main" val="1258356627"/>
-              </p:ext>
-            </p:extLst>
-          </p:nvPr>
-        </p:nvGraphicFramePr>
-        <p:xfrm>
-          <a:off x="15095634" y="29929358"/>
-          <a:ext cx="14423929" cy="4594837"/>
-        </p:xfrm>
-        <a:graphic>
-          <a:graphicData uri="http://schemas.openxmlformats.org/drawingml/2006/table">
-            <a:tbl>
-              <a:tblPr rtl="1" firstRow="1" bandRow="1">
-                <a:tableStyleId>{F5AB1C69-6EDB-4FF4-983F-18BD219EF322}</a:tableStyleId>
-              </a:tblPr>
-              <a:tblGrid>
-                <a:gridCol w="14423929">
-                  <a:extLst>
-                    <a:ext uri="{9D8B030D-6E8A-4147-A177-3AD203B41FA5}">
-                      <a16:colId xmlns:a16="http://schemas.microsoft.com/office/drawing/2014/main" val="3747045786"/>
-                    </a:ext>
-                  </a:extLst>
-                </a:gridCol>
-              </a:tblGrid>
-              <a:tr h="679788">
-                <a:tc>
-                  <a:txBody>
-                    <a:bodyPr/>
-                    <a:lstStyle/>
-                    <a:p>
-                      <a:pPr algn="ctr" rtl="0"/>
-                      <a:r>
-                        <a:rPr lang="en-US" sz="3200" dirty="0">
-                          <a:latin typeface="+mj-lt"/>
-                        </a:rPr>
-                        <a:t>Conclusions</a:t>
-                      </a:r>
-                      <a:endParaRPr lang="he-IL" sz="3200" dirty="0">
-                        <a:latin typeface="+mj-lt"/>
-                      </a:endParaRPr>
-                    </a:p>
-                  </a:txBody>
-                  <a:tcPr anchor="ctr">
-                    <a:lnL w="38100" cap="flat" cmpd="sng" algn="ctr">
-                      <a:solidFill>
-                        <a:schemeClr val="bg1"/>
-                      </a:solidFill>
-                      <a:prstDash val="solid"/>
-                      <a:round/>
-                      <a:headEnd type="none" w="med" len="med"/>
-                      <a:tailEnd type="none" w="med" len="med"/>
-                    </a:lnL>
-                    <a:lnR w="38100" cap="flat" cmpd="sng" algn="ctr">
-                      <a:solidFill>
-                        <a:schemeClr val="bg1"/>
-                      </a:solidFill>
-                      <a:prstDash val="solid"/>
-                      <a:round/>
-                      <a:headEnd type="none" w="med" len="med"/>
-                      <a:tailEnd type="none" w="med" len="med"/>
-                    </a:lnR>
-                    <a:lnT w="38100" cap="flat" cmpd="sng" algn="ctr">
-                      <a:solidFill>
-                        <a:schemeClr val="bg1"/>
-                      </a:solidFill>
-                      <a:prstDash val="solid"/>
-                      <a:round/>
-                      <a:headEnd type="none" w="med" len="med"/>
-                      <a:tailEnd type="none" w="med" len="med"/>
-                    </a:lnT>
-                    <a:lnB w="38100" cap="flat" cmpd="sng" algn="ctr">
-                      <a:solidFill>
-                        <a:schemeClr val="bg1"/>
-                      </a:solidFill>
-                      <a:prstDash val="solid"/>
-                      <a:round/>
-                      <a:headEnd type="none" w="med" len="med"/>
-                      <a:tailEnd type="none" w="med" len="med"/>
-                    </a:lnB>
-                  </a:tcPr>
-                </a:tc>
-                <a:extLst>
-                  <a:ext uri="{0D108BD9-81ED-4DB2-BD59-A6C34878D82A}">
-                    <a16:rowId xmlns:a16="http://schemas.microsoft.com/office/drawing/2014/main" val="1815053329"/>
-                  </a:ext>
-                </a:extLst>
-              </a:tr>
-              <a:tr h="3915049">
-                <a:tc>
-                  <a:txBody>
-                    <a:bodyPr/>
-                    <a:lstStyle/>
-                    <a:p>
-                      <a:pPr marL="457200" indent="-457200" algn="l" rtl="0">
-                        <a:lnSpc>
-                          <a:spcPct val="150000"/>
-                        </a:lnSpc>
-                        <a:buFont typeface="Arial" panose="020B0604020202020204" pitchFamily="34" charset="0"/>
-                        <a:buChar char="•"/>
-                      </a:pPr>
-                      <a:endParaRPr lang="en-US" sz="3200" kern="1200" dirty="0">
-                        <a:solidFill>
-                          <a:schemeClr val="dk1"/>
-                        </a:solidFill>
-                        <a:latin typeface="+mn-lt"/>
-                        <a:ea typeface="+mn-ea"/>
-                        <a:cs typeface="+mn-cs"/>
-                      </a:endParaRPr>
-                    </a:p>
-                  </a:txBody>
-                  <a:tcPr>
-                    <a:lnL w="38100" cap="flat" cmpd="sng" algn="ctr">
-                      <a:solidFill>
-                        <a:schemeClr val="bg1"/>
-                      </a:solidFill>
-                      <a:prstDash val="solid"/>
-                      <a:round/>
-                      <a:headEnd type="none" w="med" len="med"/>
-                      <a:tailEnd type="none" w="med" len="med"/>
-                    </a:lnL>
-                    <a:lnR w="38100" cap="flat" cmpd="sng" algn="ctr">
-                      <a:solidFill>
-                        <a:schemeClr val="bg1"/>
-                      </a:solidFill>
-                      <a:prstDash val="solid"/>
-                      <a:round/>
-                      <a:headEnd type="none" w="med" len="med"/>
-                      <a:tailEnd type="none" w="med" len="med"/>
-                    </a:lnR>
-                    <a:lnT w="38100" cap="flat" cmpd="sng" algn="ctr">
-                      <a:solidFill>
-                        <a:schemeClr val="bg1"/>
-                      </a:solidFill>
-                      <a:prstDash val="solid"/>
-                      <a:round/>
-                      <a:headEnd type="none" w="med" len="med"/>
-                      <a:tailEnd type="none" w="med" len="med"/>
-                    </a:lnT>
-                    <a:lnB w="38100" cap="flat" cmpd="sng" algn="ctr">
-                      <a:solidFill>
-                        <a:schemeClr val="bg1"/>
-                      </a:solidFill>
-                      <a:prstDash val="solid"/>
-                      <a:round/>
-                      <a:headEnd type="none" w="med" len="med"/>
-                      <a:tailEnd type="none" w="med" len="med"/>
-                    </a:lnB>
-                    <a:lnTlToBr w="12700" cmpd="sng">
-                      <a:noFill/>
-                      <a:prstDash val="solid"/>
-                    </a:lnTlToBr>
-                    <a:lnBlToTr w="12700" cmpd="sng">
-                      <a:noFill/>
-                      <a:prstDash val="solid"/>
-                    </a:lnBlToTr>
-                    <a:noFill/>
-                  </a:tcPr>
-                </a:tc>
-                <a:extLst>
-                  <a:ext uri="{0D108BD9-81ED-4DB2-BD59-A6C34878D82A}">
-                    <a16:rowId xmlns:a16="http://schemas.microsoft.com/office/drawing/2014/main" val="1509631762"/>
-                  </a:ext>
-                </a:extLst>
-              </a:tr>
-            </a:tbl>
-          </a:graphicData>
-        </a:graphic>
-      </p:graphicFrame>
-      <mc:AlternateContent xmlns:mc="http://schemas.openxmlformats.org/markup-compatibility/2006" xmlns:a14="http://schemas.microsoft.com/office/drawing/2010/main">
-        <mc:Choice Requires="a14">
-          <p:sp>
-            <p:nvSpPr>
-              <p:cNvPr id="4" name="TextBox 3">
-                <a:extLst>
-                  <a:ext uri="{FF2B5EF4-FFF2-40B4-BE49-F238E27FC236}">
-                    <a16:creationId xmlns:a16="http://schemas.microsoft.com/office/drawing/2014/main" id="{902ED1D7-E996-EF69-829B-593F4BE2D5F1}"/>
-                  </a:ext>
-                </a:extLst>
-              </p:cNvPr>
-              <p:cNvSpPr txBox="1"/>
-              <p:nvPr/>
-            </p:nvSpPr>
-            <p:spPr>
-              <a:xfrm>
-                <a:off x="2853834" y="17992750"/>
-                <a:ext cx="12409726" cy="1781000"/>
-              </a:xfrm>
-              <a:prstGeom prst="rect">
-                <a:avLst/>
-              </a:prstGeom>
-              <a:noFill/>
-            </p:spPr>
-            <p:txBody>
-              <a:bodyPr wrap="square">
-                <a:spAutoFit/>
-              </a:bodyPr>
-              <a:lstStyle/>
-              <a:p>
-                <a:pPr/>
-                <a14:m>
-                  <m:oMathPara xmlns:m="http://schemas.openxmlformats.org/officeDocument/2006/math">
-                    <m:oMathParaPr>
-                      <m:jc m:val="centerGroup"/>
-                    </m:oMathParaPr>
-                    <m:oMath xmlns:m="http://schemas.openxmlformats.org/officeDocument/2006/math">
-                      <m:r>
-                        <m:rPr>
-                          <m:sty m:val="p"/>
-                        </m:rPr>
-                        <a:rPr lang="en-US" sz="2800" i="0" smtClean="0">
-                          <a:latin typeface="Cambria Math" panose="02040503050406030204" pitchFamily="18" charset="0"/>
-                        </a:rPr>
-                        <m:t>covid</m:t>
-                      </m:r>
-                      <m:r>
-                        <a:rPr lang="en-US" sz="2800" b="0" i="0" smtClean="0">
-                          <a:latin typeface="Cambria Math" panose="02040503050406030204" pitchFamily="18" charset="0"/>
-                        </a:rPr>
-                        <m:t> </m:t>
-                      </m:r>
-                      <m:r>
-                        <m:rPr>
-                          <m:sty m:val="p"/>
-                        </m:rPr>
-                        <a:rPr lang="en-US" sz="2800" i="0">
-                          <a:latin typeface="Cambria Math" panose="02040503050406030204" pitchFamily="18" charset="0"/>
-                        </a:rPr>
-                        <m:t>group</m:t>
-                      </m:r>
-                      <m:r>
-                        <a:rPr lang="en-US" sz="2800" i="0">
-                          <a:latin typeface="Cambria Math" panose="02040503050406030204" pitchFamily="18" charset="0"/>
-                        </a:rPr>
-                        <m:t>= </m:t>
-                      </m:r>
-                      <m:d>
-                        <m:dPr>
-                          <m:begChr m:val="{"/>
-                          <m:endChr m:val=""/>
-                          <m:ctrlPr>
-                            <a:rPr lang="en-US" sz="2800" i="1">
-                              <a:solidFill>
-                                <a:srgbClr val="836967"/>
-                              </a:solidFill>
-                              <a:latin typeface="Cambria Math" panose="02040503050406030204" pitchFamily="18" charset="0"/>
-                            </a:rPr>
-                          </m:ctrlPr>
-                        </m:dPr>
-                        <m:e>
-                          <m:eqArr>
-                            <m:eqArrPr>
-                              <m:ctrlPr>
-                                <a:rPr lang="en-US" sz="2800" i="1">
-                                  <a:solidFill>
-                                    <a:srgbClr val="836967"/>
-                                  </a:solidFill>
-                                  <a:latin typeface="Cambria Math" panose="02040503050406030204" pitchFamily="18" charset="0"/>
-                                </a:rPr>
-                              </m:ctrlPr>
-                            </m:eqArrPr>
-                            <m:e>
-                              <m:r>
-                                <a:rPr lang="en-US" sz="2800" i="0">
-                                  <a:latin typeface="Cambria Math" panose="02040503050406030204" pitchFamily="18" charset="0"/>
-                                </a:rPr>
-                                <m:t>&amp;</m:t>
-                              </m:r>
-                              <m:r>
-                                <a:rPr lang="en-US" sz="2800" i="0">
-                                  <a:latin typeface="Cambria Math" panose="02040503050406030204" pitchFamily="18" charset="0"/>
-                                </a:rPr>
-                                <m:t>1</m:t>
-                              </m:r>
-                              <m:r>
-                                <a:rPr lang="en-US" sz="2800" i="0">
-                                  <a:latin typeface="Cambria Math" panose="02040503050406030204" pitchFamily="18" charset="0"/>
-                                </a:rPr>
-                                <m:t>                                            </m:t>
-                              </m:r>
-                              <m:r>
-                                <m:rPr>
-                                  <m:sty m:val="p"/>
-                                </m:rPr>
-                                <a:rPr lang="en-US" sz="2800" b="0" i="0" smtClean="0">
-                                  <a:latin typeface="Cambria Math" panose="02040503050406030204" pitchFamily="18" charset="0"/>
-                                </a:rPr>
-                                <m:t>Birth</m:t>
-                              </m:r>
-                              <m:r>
-                                <a:rPr lang="en-US" sz="2800" b="0" i="0" smtClean="0">
-                                  <a:latin typeface="Cambria Math" panose="02040503050406030204" pitchFamily="18" charset="0"/>
-                                </a:rPr>
-                                <m:t> </m:t>
-                              </m:r>
-                              <m:r>
-                                <m:rPr>
-                                  <m:sty m:val="p"/>
-                                </m:rPr>
-                                <a:rPr lang="en-US" sz="2800" b="0" i="0" smtClean="0">
-                                  <a:latin typeface="Cambria Math" panose="02040503050406030204" pitchFamily="18" charset="0"/>
-                                </a:rPr>
-                                <m:t>date</m:t>
-                              </m:r>
-                              <m:r>
-                                <a:rPr lang="en-US" sz="2800" i="0">
-                                  <a:latin typeface="Cambria Math" panose="02040503050406030204" pitchFamily="18" charset="0"/>
-                                </a:rPr>
-                                <m:t> &lt;</m:t>
-                              </m:r>
-                              <m:r>
-                                <m:rPr>
-                                  <m:sty m:val="p"/>
-                                </m:rPr>
-                                <a:rPr lang="en-US" sz="2800" i="0">
-                                  <a:latin typeface="Cambria Math" panose="02040503050406030204" pitchFamily="18" charset="0"/>
-                                </a:rPr>
-                                <m:t>March</m:t>
-                              </m:r>
-                              <m:r>
-                                <a:rPr lang="en-US" sz="2800" i="0">
-                                  <a:latin typeface="Cambria Math" panose="02040503050406030204" pitchFamily="18" charset="0"/>
-                                </a:rPr>
-                                <m:t> </m:t>
-                              </m:r>
-                              <m:r>
-                                <a:rPr lang="en-US" sz="2800" i="0">
-                                  <a:latin typeface="Cambria Math" panose="02040503050406030204" pitchFamily="18" charset="0"/>
-                                </a:rPr>
-                                <m:t>1</m:t>
-                              </m:r>
-                              <m:r>
-                                <a:rPr lang="en-US" sz="2800" i="0">
-                                  <a:latin typeface="Cambria Math" panose="02040503050406030204" pitchFamily="18" charset="0"/>
-                                </a:rPr>
-                                <m:t>, </m:t>
-                              </m:r>
-                              <m:r>
-                                <a:rPr lang="en-US" sz="2800" i="0">
-                                  <a:latin typeface="Cambria Math" panose="02040503050406030204" pitchFamily="18" charset="0"/>
-                                </a:rPr>
-                                <m:t>2019</m:t>
-                              </m:r>
-                              <m:r>
-                                <a:rPr lang="en-US" sz="2800" i="0">
-                                  <a:latin typeface="Cambria Math" panose="02040503050406030204" pitchFamily="18" charset="0"/>
-                                </a:rPr>
-                                <m:t> </m:t>
-                              </m:r>
-                            </m:e>
-                            <m:e>
-                              <m:r>
-                                <a:rPr lang="en-US" sz="2800" i="0">
-                                  <a:latin typeface="Cambria Math" panose="02040503050406030204" pitchFamily="18" charset="0"/>
-                                </a:rPr>
-                                <m:t>&amp;</m:t>
-                              </m:r>
-                              <m:r>
-                                <a:rPr lang="en-US" sz="2800" i="0">
-                                  <a:latin typeface="Cambria Math" panose="02040503050406030204" pitchFamily="18" charset="0"/>
-                                </a:rPr>
-                                <m:t>2</m:t>
-                              </m:r>
-                              <m:r>
-                                <a:rPr lang="en-US" sz="2800" i="0">
-                                  <a:latin typeface="Cambria Math" panose="02040503050406030204" pitchFamily="18" charset="0"/>
-                                </a:rPr>
-                                <m:t>       </m:t>
-                              </m:r>
-                              <m:r>
-                                <m:rPr>
-                                  <m:sty m:val="p"/>
-                                </m:rPr>
-                                <a:rPr lang="en-US" sz="2800" i="0">
-                                  <a:latin typeface="Cambria Math" panose="02040503050406030204" pitchFamily="18" charset="0"/>
-                                </a:rPr>
-                                <m:t>March</m:t>
-                              </m:r>
-                              <m:r>
-                                <a:rPr lang="en-US" sz="2800" i="0">
-                                  <a:latin typeface="Cambria Math" panose="02040503050406030204" pitchFamily="18" charset="0"/>
-                                </a:rPr>
-                                <m:t> </m:t>
-                              </m:r>
-                              <m:r>
-                                <a:rPr lang="en-US" sz="2800" i="0">
-                                  <a:latin typeface="Cambria Math" panose="02040503050406030204" pitchFamily="18" charset="0"/>
-                                </a:rPr>
-                                <m:t>1</m:t>
-                              </m:r>
-                              <m:r>
-                                <a:rPr lang="en-US" sz="2800" i="0">
-                                  <a:latin typeface="Cambria Math" panose="02040503050406030204" pitchFamily="18" charset="0"/>
-                                </a:rPr>
-                                <m:t>, </m:t>
-                              </m:r>
-                              <m:r>
-                                <a:rPr lang="en-US" sz="2800" i="0">
-                                  <a:latin typeface="Cambria Math" panose="02040503050406030204" pitchFamily="18" charset="0"/>
-                                </a:rPr>
-                                <m:t>2019</m:t>
-                              </m:r>
-                              <m:r>
-                                <a:rPr lang="en-US" sz="2800" i="0">
-                                  <a:latin typeface="Cambria Math" panose="02040503050406030204" pitchFamily="18" charset="0"/>
-                                </a:rPr>
-                                <m:t>≤</m:t>
-                              </m:r>
-                              <m:r>
-                                <m:rPr>
-                                  <m:sty m:val="p"/>
-                                </m:rPr>
-                                <a:rPr lang="en-US" sz="2800" i="0">
-                                  <a:latin typeface="Cambria Math" panose="02040503050406030204" pitchFamily="18" charset="0"/>
-                                </a:rPr>
-                                <m:t>Birth</m:t>
-                              </m:r>
-                              <m:r>
-                                <a:rPr lang="en-US" sz="2800" i="0">
-                                  <a:latin typeface="Cambria Math" panose="02040503050406030204" pitchFamily="18" charset="0"/>
-                                </a:rPr>
-                                <m:t> </m:t>
-                              </m:r>
-                              <m:r>
-                                <m:rPr>
-                                  <m:sty m:val="p"/>
-                                </m:rPr>
-                                <a:rPr lang="en-US" sz="2800" i="0">
-                                  <a:latin typeface="Cambria Math" panose="02040503050406030204" pitchFamily="18" charset="0"/>
-                                </a:rPr>
-                                <m:t>date</m:t>
-                              </m:r>
-                              <m:r>
-                                <a:rPr lang="en-US" sz="2800" i="0">
-                                  <a:latin typeface="Cambria Math" panose="02040503050406030204" pitchFamily="18" charset="0"/>
-                                </a:rPr>
-                                <m:t>&lt; </m:t>
-                              </m:r>
-                              <m:r>
-                                <m:rPr>
-                                  <m:sty m:val="p"/>
-                                </m:rPr>
-                                <a:rPr lang="en-US" sz="2800" i="0">
-                                  <a:latin typeface="Cambria Math" panose="02040503050406030204" pitchFamily="18" charset="0"/>
-                                </a:rPr>
-                                <m:t>March</m:t>
-                              </m:r>
-                              <m:r>
-                                <a:rPr lang="en-US" sz="2800" i="0">
-                                  <a:latin typeface="Cambria Math" panose="02040503050406030204" pitchFamily="18" charset="0"/>
-                                </a:rPr>
-                                <m:t> </m:t>
-                              </m:r>
-                              <m:r>
-                                <a:rPr lang="en-US" sz="2800" i="0">
-                                  <a:latin typeface="Cambria Math" panose="02040503050406030204" pitchFamily="18" charset="0"/>
-                                </a:rPr>
-                                <m:t>11</m:t>
-                              </m:r>
-                              <m:r>
-                                <a:rPr lang="en-US" sz="2800" i="0">
-                                  <a:latin typeface="Cambria Math" panose="02040503050406030204" pitchFamily="18" charset="0"/>
-                                </a:rPr>
-                                <m:t>, </m:t>
-                              </m:r>
-                              <m:r>
-                                <a:rPr lang="en-US" sz="2800" i="0">
-                                  <a:latin typeface="Cambria Math" panose="02040503050406030204" pitchFamily="18" charset="0"/>
-                                </a:rPr>
-                                <m:t>2019</m:t>
-                              </m:r>
-                            </m:e>
-                            <m:e>
-                              <m:r>
-                                <a:rPr lang="en-US" sz="2800" i="0">
-                                  <a:latin typeface="Cambria Math" panose="02040503050406030204" pitchFamily="18" charset="0"/>
-                                </a:rPr>
-                                <m:t>&amp;</m:t>
-                              </m:r>
-                              <m:r>
-                                <a:rPr lang="en-US" sz="2800" i="0">
-                                  <a:latin typeface="Cambria Math" panose="02040503050406030204" pitchFamily="18" charset="0"/>
-                                </a:rPr>
-                                <m:t>3</m:t>
-                              </m:r>
-                              <m:r>
-                                <a:rPr lang="en-US" sz="2800" i="0">
-                                  <a:latin typeface="Cambria Math" panose="02040503050406030204" pitchFamily="18" charset="0"/>
-                                </a:rPr>
-                                <m:t>             </m:t>
-                              </m:r>
-                              <m:r>
-                                <m:rPr>
-                                  <m:sty m:val="p"/>
-                                </m:rPr>
-                                <a:rPr lang="en-US" sz="2800" i="0">
-                                  <a:latin typeface="Cambria Math" panose="02040503050406030204" pitchFamily="18" charset="0"/>
-                                </a:rPr>
-                                <m:t>March</m:t>
-                              </m:r>
-                              <m:r>
-                                <a:rPr lang="en-US" sz="2800" i="0">
-                                  <a:latin typeface="Cambria Math" panose="02040503050406030204" pitchFamily="18" charset="0"/>
-                                </a:rPr>
-                                <m:t> </m:t>
-                              </m:r>
-                              <m:r>
-                                <a:rPr lang="en-US" sz="2800" i="0">
-                                  <a:latin typeface="Cambria Math" panose="02040503050406030204" pitchFamily="18" charset="0"/>
-                                </a:rPr>
-                                <m:t>11</m:t>
-                              </m:r>
-                              <m:r>
-                                <a:rPr lang="en-US" sz="2800" i="0">
-                                  <a:latin typeface="Cambria Math" panose="02040503050406030204" pitchFamily="18" charset="0"/>
-                                </a:rPr>
-                                <m:t>, </m:t>
-                              </m:r>
-                              <m:r>
-                                <a:rPr lang="en-US" sz="2800" i="0">
-                                  <a:latin typeface="Cambria Math" panose="02040503050406030204" pitchFamily="18" charset="0"/>
-                                </a:rPr>
-                                <m:t>2019</m:t>
-                              </m:r>
-                              <m:r>
-                                <a:rPr lang="en-US" sz="2800" i="0">
-                                  <a:latin typeface="Cambria Math" panose="02040503050406030204" pitchFamily="18" charset="0"/>
-                                </a:rPr>
-                                <m:t>≤</m:t>
-                              </m:r>
-                              <m:r>
-                                <m:rPr>
-                                  <m:sty m:val="p"/>
-                                </m:rPr>
-                                <a:rPr lang="en-US" sz="2800" i="0">
-                                  <a:latin typeface="Cambria Math" panose="02040503050406030204" pitchFamily="18" charset="0"/>
-                                </a:rPr>
-                                <m:t>Birth</m:t>
-                              </m:r>
-                              <m:r>
-                                <a:rPr lang="en-US" sz="2800" i="0">
-                                  <a:latin typeface="Cambria Math" panose="02040503050406030204" pitchFamily="18" charset="0"/>
-                                </a:rPr>
-                                <m:t> </m:t>
-                              </m:r>
-                              <m:r>
-                                <m:rPr>
-                                  <m:sty m:val="p"/>
-                                </m:rPr>
-                                <a:rPr lang="en-US" sz="2800" i="0">
-                                  <a:latin typeface="Cambria Math" panose="02040503050406030204" pitchFamily="18" charset="0"/>
-                                </a:rPr>
-                                <m:t>date</m:t>
-                              </m:r>
-                              <m:r>
-                                <a:rPr lang="en-US" sz="2800" i="0">
-                                  <a:latin typeface="Cambria Math" panose="02040503050406030204" pitchFamily="18" charset="0"/>
-                                </a:rPr>
-                                <m:t>&lt;</m:t>
-                              </m:r>
-                              <m:r>
-                                <m:rPr>
-                                  <m:sty m:val="p"/>
-                                </m:rPr>
-                                <a:rPr lang="en-US" sz="2800" i="0">
-                                  <a:latin typeface="Cambria Math" panose="02040503050406030204" pitchFamily="18" charset="0"/>
-                                </a:rPr>
-                                <m:t>Feb</m:t>
-                              </m:r>
-                              <m:r>
-                                <a:rPr lang="en-US" sz="2800" i="0">
-                                  <a:latin typeface="Cambria Math" panose="02040503050406030204" pitchFamily="18" charset="0"/>
-                                </a:rPr>
-                                <m:t> </m:t>
-                              </m:r>
-                              <m:r>
-                                <a:rPr lang="en-US" sz="2800" i="0">
-                                  <a:latin typeface="Cambria Math" panose="02040503050406030204" pitchFamily="18" charset="0"/>
-                                </a:rPr>
-                                <m:t>7</m:t>
-                              </m:r>
-                              <m:r>
-                                <a:rPr lang="en-US" sz="2800" i="0">
-                                  <a:latin typeface="Cambria Math" panose="02040503050406030204" pitchFamily="18" charset="0"/>
-                                </a:rPr>
-                                <m:t>, </m:t>
-                              </m:r>
-                              <m:r>
-                                <a:rPr lang="en-US" sz="2800" i="0">
-                                  <a:latin typeface="Cambria Math" panose="02040503050406030204" pitchFamily="18" charset="0"/>
-                                </a:rPr>
-                                <m:t>2021</m:t>
-                              </m:r>
-                            </m:e>
-                            <m:e>
-                              <m:r>
-                                <a:rPr lang="en-US" sz="2800" i="0">
-                                  <a:latin typeface="Cambria Math" panose="02040503050406030204" pitchFamily="18" charset="0"/>
-                                </a:rPr>
-                                <m:t>&amp;</m:t>
-                              </m:r>
-                              <m:r>
-                                <a:rPr lang="en-US" sz="2800" i="0">
-                                  <a:latin typeface="Cambria Math" panose="02040503050406030204" pitchFamily="18" charset="0"/>
-                                </a:rPr>
-                                <m:t>4</m:t>
-                              </m:r>
-                              <m:r>
-                                <a:rPr lang="en-US" sz="2800" b="0" i="0" smtClean="0">
-                                  <a:latin typeface="Cambria Math" panose="02040503050406030204" pitchFamily="18" charset="0"/>
-                                </a:rPr>
-                                <m:t>                                                  </m:t>
-                              </m:r>
-                              <m:r>
-                                <m:rPr>
-                                  <m:sty m:val="p"/>
-                                </m:rPr>
-                                <a:rPr lang="en-US" sz="2800" i="0">
-                                  <a:latin typeface="Cambria Math" panose="02040503050406030204" pitchFamily="18" charset="0"/>
-                                </a:rPr>
-                                <m:t>Birth</m:t>
-                              </m:r>
-                              <m:r>
-                                <a:rPr lang="en-US" sz="2800" i="0">
-                                  <a:latin typeface="Cambria Math" panose="02040503050406030204" pitchFamily="18" charset="0"/>
-                                </a:rPr>
-                                <m:t> </m:t>
-                              </m:r>
-                              <m:r>
-                                <m:rPr>
-                                  <m:sty m:val="p"/>
-                                </m:rPr>
-                                <a:rPr lang="en-US" sz="2800" i="0">
-                                  <a:latin typeface="Cambria Math" panose="02040503050406030204" pitchFamily="18" charset="0"/>
-                                </a:rPr>
-                                <m:t>date</m:t>
-                              </m:r>
-                              <m:r>
-                                <a:rPr lang="en-US" sz="2800" i="0">
-                                  <a:latin typeface="Cambria Math" panose="02040503050406030204" pitchFamily="18" charset="0"/>
-                                </a:rPr>
-                                <m:t>≥ </m:t>
-                              </m:r>
-                              <m:r>
-                                <m:rPr>
-                                  <m:sty m:val="p"/>
-                                </m:rPr>
-                                <a:rPr lang="en-US" sz="2800" i="0">
-                                  <a:latin typeface="Cambria Math" panose="02040503050406030204" pitchFamily="18" charset="0"/>
-                                </a:rPr>
-                                <m:t>Feb</m:t>
-                              </m:r>
-                              <m:r>
-                                <a:rPr lang="en-US" sz="2800" i="0">
-                                  <a:latin typeface="Cambria Math" panose="02040503050406030204" pitchFamily="18" charset="0"/>
-                                </a:rPr>
-                                <m:t> </m:t>
-                              </m:r>
-                              <m:r>
-                                <a:rPr lang="en-US" sz="2800" i="0">
-                                  <a:latin typeface="Cambria Math" panose="02040503050406030204" pitchFamily="18" charset="0"/>
-                                </a:rPr>
-                                <m:t>7</m:t>
-                              </m:r>
-                              <m:r>
-                                <a:rPr lang="en-US" sz="2800" i="0">
-                                  <a:latin typeface="Cambria Math" panose="02040503050406030204" pitchFamily="18" charset="0"/>
-                                </a:rPr>
-                                <m:t>, </m:t>
-                              </m:r>
-                              <m:r>
-                                <a:rPr lang="en-US" sz="2800" i="0">
-                                  <a:latin typeface="Cambria Math" panose="02040503050406030204" pitchFamily="18" charset="0"/>
-                                </a:rPr>
-                                <m:t>2021</m:t>
-                              </m:r>
-                            </m:e>
-                          </m:eqArr>
-                        </m:e>
-                      </m:d>
-                    </m:oMath>
-                  </m:oMathPara>
-                </a14:m>
-                <a:endParaRPr lang="en-US" sz="2800" dirty="0"/>
-              </a:p>
-            </p:txBody>
-          </p:sp>
-        </mc:Choice>
-        <mc:Fallback xmlns="">
-          <p:sp>
-            <p:nvSpPr>
-              <p:cNvPr id="4" name="TextBox 3">
-                <a:extLst>
-                  <a:ext uri="{FF2B5EF4-FFF2-40B4-BE49-F238E27FC236}">
-                    <a16:creationId xmlns:a16="http://schemas.microsoft.com/office/drawing/2014/main" id="{902ED1D7-E996-EF69-829B-593F4BE2D5F1}"/>
-                  </a:ext>
-                </a:extLst>
-              </p:cNvPr>
-              <p:cNvSpPr txBox="1">
-                <a:spLocks noRot="1" noChangeAspect="1" noMove="1" noResize="1" noEditPoints="1" noAdjustHandles="1" noChangeArrowheads="1" noChangeShapeType="1" noTextEdit="1"/>
-              </p:cNvSpPr>
-              <p:nvPr/>
-            </p:nvSpPr>
-            <p:spPr>
-              <a:xfrm>
-                <a:off x="2853834" y="17992750"/>
-                <a:ext cx="12409726" cy="1781000"/>
-              </a:xfrm>
-              <a:prstGeom prst="rect">
-                <a:avLst/>
-              </a:prstGeom>
-              <a:blipFill>
-                <a:blip r:embed="rId5"/>
-                <a:stretch>
-                  <a:fillRect/>
-                </a:stretch>
-              </a:blipFill>
-            </p:spPr>
-            <p:txBody>
-              <a:bodyPr/>
-              <a:lstStyle/>
-              <a:p>
-                <a:r>
-                  <a:rPr lang="en-US">
-                    <a:noFill/>
-                  </a:rPr>
-                  <a:t> </a:t>
-                </a:r>
-              </a:p>
-            </p:txBody>
-          </p:sp>
-        </mc:Fallback>
-      </mc:AlternateContent>
-      <p:pic>
-        <p:nvPicPr>
-          <p:cNvPr id="12" name="Picture 11" descr="A picture containing text, diagram, plot, line&#10;&#10;Description automatically generated">
-            <a:extLst>
-              <a:ext uri="{FF2B5EF4-FFF2-40B4-BE49-F238E27FC236}">
-                <a16:creationId xmlns:a16="http://schemas.microsoft.com/office/drawing/2014/main" id="{64B92B50-C75F-DFD6-5C24-3116D80DA9FB}"/>
-              </a:ext>
-            </a:extLst>
-          </p:cNvPr>
-          <p:cNvPicPr>
-            <a:picLocks noChangeAspect="1"/>
-          </p:cNvPicPr>
-          <p:nvPr/>
-        </p:nvPicPr>
-        <p:blipFill>
-          <a:blip r:embed="rId6">
-            <a:extLst>
-              <a:ext uri="{28A0092B-C50C-407E-A947-70E740481C1C}">
-                <a14:useLocalDpi xmlns:a14="http://schemas.microsoft.com/office/drawing/2010/main" val="0"/>
-              </a:ext>
-            </a:extLst>
-          </a:blip>
-          <a:stretch>
-            <a:fillRect/>
-          </a:stretch>
-        </p:blipFill>
-        <p:spPr>
-          <a:xfrm>
-            <a:off x="15456310" y="6007816"/>
-            <a:ext cx="9144000" cy="5486400"/>
-          </a:xfrm>
-          <a:prstGeom prst="rect">
-            <a:avLst/>
-          </a:prstGeom>
-        </p:spPr>
-      </p:pic>
-      <p:pic>
-        <p:nvPicPr>
-          <p:cNvPr id="14" name="Picture 13" descr="A picture containing text, line, plot, diagram&#10;&#10;Description automatically generated">
-            <a:extLst>
-              <a:ext uri="{FF2B5EF4-FFF2-40B4-BE49-F238E27FC236}">
-                <a16:creationId xmlns:a16="http://schemas.microsoft.com/office/drawing/2014/main" id="{76C44484-5FED-B635-14D0-FFCBD25AFD57}"/>
-              </a:ext>
-            </a:extLst>
-          </p:cNvPr>
-          <p:cNvPicPr>
-            <a:picLocks noChangeAspect="1"/>
-          </p:cNvPicPr>
-          <p:nvPr/>
-        </p:nvPicPr>
-        <p:blipFill>
-          <a:blip r:embed="rId7">
-            <a:extLst>
-              <a:ext uri="{28A0092B-C50C-407E-A947-70E740481C1C}">
-                <a14:useLocalDpi xmlns:a14="http://schemas.microsoft.com/office/drawing/2010/main" val="0"/>
-              </a:ext>
-            </a:extLst>
-          </a:blip>
-          <a:stretch>
-            <a:fillRect/>
-          </a:stretch>
-        </p:blipFill>
-        <p:spPr>
-          <a:xfrm>
-            <a:off x="20028310" y="18595162"/>
-            <a:ext cx="9144000" cy="5486400"/>
-          </a:xfrm>
-          <a:prstGeom prst="rect">
-            <a:avLst/>
-          </a:prstGeom>
-        </p:spPr>
-      </p:pic>
-      <p:pic>
-        <p:nvPicPr>
-          <p:cNvPr id="19" name="Picture 18" descr="A picture containing text, diagram, plot, line&#10;&#10;Description automatically generated">
-            <a:extLst>
-              <a:ext uri="{FF2B5EF4-FFF2-40B4-BE49-F238E27FC236}">
-                <a16:creationId xmlns:a16="http://schemas.microsoft.com/office/drawing/2014/main" id="{1D90C954-C4BF-FD27-0BD1-0C1E40F43CC9}"/>
-              </a:ext>
-            </a:extLst>
-          </p:cNvPr>
-          <p:cNvPicPr>
-            <a:picLocks noChangeAspect="1"/>
-          </p:cNvPicPr>
-          <p:nvPr/>
-        </p:nvPicPr>
-        <p:blipFill>
-          <a:blip r:embed="rId8">
-            <a:extLst>
-              <a:ext uri="{28A0092B-C50C-407E-A947-70E740481C1C}">
-                <a14:useLocalDpi xmlns:a14="http://schemas.microsoft.com/office/drawing/2010/main" val="0"/>
-              </a:ext>
-            </a:extLst>
-          </a:blip>
-          <a:stretch>
-            <a:fillRect/>
-          </a:stretch>
-        </p:blipFill>
-        <p:spPr>
-          <a:xfrm>
-            <a:off x="15456310" y="11871118"/>
-            <a:ext cx="9144000" cy="5486400"/>
-          </a:xfrm>
-          <a:prstGeom prst="rect">
-            <a:avLst/>
-          </a:prstGeom>
-        </p:spPr>
-      </p:pic>
-      <p:pic>
-        <p:nvPicPr>
-          <p:cNvPr id="21" name="Picture 20" descr="A picture containing text, diagram, line, plot&#10;&#10;Description automatically generated">
-            <a:extLst>
-              <a:ext uri="{FF2B5EF4-FFF2-40B4-BE49-F238E27FC236}">
-                <a16:creationId xmlns:a16="http://schemas.microsoft.com/office/drawing/2014/main" id="{59BA1690-E80A-9442-54D3-7167D9B60940}"/>
-              </a:ext>
-            </a:extLst>
-          </p:cNvPr>
-          <p:cNvPicPr>
-            <a:picLocks noChangeAspect="1"/>
-          </p:cNvPicPr>
-          <p:nvPr/>
-        </p:nvPicPr>
-        <p:blipFill>
-          <a:blip r:embed="rId9">
-            <a:extLst>
-              <a:ext uri="{28A0092B-C50C-407E-A947-70E740481C1C}">
-                <a14:useLocalDpi xmlns:a14="http://schemas.microsoft.com/office/drawing/2010/main" val="0"/>
-              </a:ext>
-            </a:extLst>
-          </a:blip>
-          <a:stretch>
-            <a:fillRect/>
-          </a:stretch>
-        </p:blipFill>
-        <p:spPr>
-          <a:xfrm>
-            <a:off x="20028310" y="24202027"/>
-            <a:ext cx="9144000" cy="5486400"/>
-          </a:xfrm>
-          <a:prstGeom prst="rect">
-            <a:avLst/>
-          </a:prstGeom>
-        </p:spPr>
-      </p:pic>
-      <p:graphicFrame>
-        <p:nvGraphicFramePr>
-          <p:cNvPr id="25" name="Table 24">
-            <a:extLst>
-              <a:ext uri="{FF2B5EF4-FFF2-40B4-BE49-F238E27FC236}">
-                <a16:creationId xmlns:a16="http://schemas.microsoft.com/office/drawing/2014/main" id="{1C7C5583-4E92-42BA-CDC5-332F860C9B86}"/>
-              </a:ext>
-            </a:extLst>
-          </p:cNvPr>
-          <p:cNvGraphicFramePr>
-            <a:graphicFrameLocks noGrp="1"/>
-          </p:cNvGraphicFramePr>
-          <p:nvPr>
-            <p:extLst>
-              <p:ext uri="{D42A27DB-BD31-4B8C-83A1-F6EECF244321}">
-                <p14:modId xmlns:p14="http://schemas.microsoft.com/office/powerpoint/2010/main" val="1384839691"/>
-              </p:ext>
-            </p:extLst>
-          </p:nvPr>
-        </p:nvGraphicFramePr>
-        <p:xfrm>
-          <a:off x="-7521012" y="17584325"/>
-          <a:ext cx="6832600" cy="2597849"/>
-        </p:xfrm>
-        <a:graphic>
-          <a:graphicData uri="http://schemas.openxmlformats.org/drawingml/2006/table">
-            <a:tbl>
-              <a:tblPr firstRow="1" firstCol="1" bandRow="1">
-                <a:tableStyleId>{2D5ABB26-0587-4C30-8999-92F81FD0307C}</a:tableStyleId>
-              </a:tblPr>
-              <a:tblGrid>
-                <a:gridCol w="1118870">
-                  <a:extLst>
-                    <a:ext uri="{9D8B030D-6E8A-4147-A177-3AD203B41FA5}">
-                      <a16:colId xmlns:a16="http://schemas.microsoft.com/office/drawing/2014/main" val="694928811"/>
-                    </a:ext>
-                  </a:extLst>
-                </a:gridCol>
-                <a:gridCol w="2856865">
-                  <a:extLst>
-                    <a:ext uri="{9D8B030D-6E8A-4147-A177-3AD203B41FA5}">
-                      <a16:colId xmlns:a16="http://schemas.microsoft.com/office/drawing/2014/main" val="3035277709"/>
-                    </a:ext>
-                  </a:extLst>
-                </a:gridCol>
-                <a:gridCol w="2856865">
-                  <a:extLst>
-                    <a:ext uri="{9D8B030D-6E8A-4147-A177-3AD203B41FA5}">
-                      <a16:colId xmlns:a16="http://schemas.microsoft.com/office/drawing/2014/main" val="2707887154"/>
-                    </a:ext>
-                  </a:extLst>
-                </a:gridCol>
-              </a:tblGrid>
-              <a:tr h="904685">
-                <a:tc>
-                  <a:txBody>
-                    <a:bodyPr/>
-                    <a:lstStyle/>
-                    <a:p>
-                      <a:pPr marL="0" marR="0" algn="ctr" rtl="0">
-                        <a:lnSpc>
-                          <a:spcPct val="107000"/>
-                        </a:lnSpc>
-                        <a:spcBef>
-                          <a:spcPts val="0"/>
-                        </a:spcBef>
-                        <a:spcAft>
-                          <a:spcPts val="0"/>
-                        </a:spcAft>
-                      </a:pPr>
-                      <a:r>
-                        <a:rPr lang="en-US" sz="2800" kern="100" dirty="0">
-                          <a:effectLst/>
-                          <a:latin typeface="Cambria Math" panose="02040503050406030204" pitchFamily="18" charset="0"/>
-                          <a:ea typeface="Cambria Math" panose="02040503050406030204" pitchFamily="18" charset="0"/>
-                        </a:rPr>
-                        <a:t>Group</a:t>
-                      </a:r>
-                      <a:endParaRPr lang="en-US" sz="2800" kern="100" dirty="0">
-                        <a:effectLst/>
-                        <a:latin typeface="Cambria Math" panose="02040503050406030204" pitchFamily="18" charset="0"/>
-                        <a:ea typeface="Cambria Math" panose="02040503050406030204" pitchFamily="18" charset="0"/>
-                        <a:cs typeface="Arial" panose="020B0604020202020204" pitchFamily="34" charset="0"/>
-                      </a:endParaRPr>
-                    </a:p>
-                  </a:txBody>
-                  <a:tcPr marL="68580" marR="68580" marT="0" marB="0" anchor="ctr"/>
-                </a:tc>
-                <a:tc>
-                  <a:txBody>
-                    <a:bodyPr/>
-                    <a:lstStyle/>
-                    <a:p>
-                      <a:pPr marL="0" marR="0" algn="ctr" rtl="0">
-                        <a:lnSpc>
-                          <a:spcPct val="107000"/>
-                        </a:lnSpc>
-                        <a:spcBef>
-                          <a:spcPts val="0"/>
-                        </a:spcBef>
-                        <a:spcAft>
-                          <a:spcPts val="0"/>
-                        </a:spcAft>
-                      </a:pPr>
-                      <a:r>
-                        <a:rPr lang="en-US" sz="2800" kern="100" dirty="0">
-                          <a:effectLst/>
-                          <a:latin typeface="Cambria Math" panose="02040503050406030204" pitchFamily="18" charset="0"/>
-                          <a:ea typeface="Cambria Math" panose="02040503050406030204" pitchFamily="18" charset="0"/>
-                        </a:rPr>
-                        <a:t>First-year </a:t>
-                      </a:r>
-                      <a:br>
-                        <a:rPr lang="en-US" sz="2800" kern="100" dirty="0">
-                          <a:effectLst/>
-                          <a:latin typeface="Cambria Math" panose="02040503050406030204" pitchFamily="18" charset="0"/>
-                          <a:ea typeface="Cambria Math" panose="02040503050406030204" pitchFamily="18" charset="0"/>
-                        </a:rPr>
-                      </a:br>
-                      <a:r>
-                        <a:rPr lang="en-US" sz="2800" kern="100" dirty="0">
-                          <a:effectLst/>
-                          <a:latin typeface="Cambria Math" panose="02040503050406030204" pitchFamily="18" charset="0"/>
-                          <a:ea typeface="Cambria Math" panose="02040503050406030204" pitchFamily="18" charset="0"/>
-                        </a:rPr>
-                        <a:t>sickness rate (%)</a:t>
-                      </a:r>
-                      <a:endParaRPr lang="en-US" sz="2800" kern="100" dirty="0">
-                        <a:effectLst/>
-                        <a:latin typeface="Cambria Math" panose="02040503050406030204" pitchFamily="18" charset="0"/>
-                        <a:ea typeface="Cambria Math" panose="02040503050406030204" pitchFamily="18" charset="0"/>
-                        <a:cs typeface="Arial" panose="020B0604020202020204" pitchFamily="34" charset="0"/>
-                      </a:endParaRPr>
-                    </a:p>
-                  </a:txBody>
-                  <a:tcPr marL="68580" marR="68580" marT="0" marB="0" anchor="ctr"/>
-                </a:tc>
-                <a:tc>
-                  <a:txBody>
-                    <a:bodyPr/>
-                    <a:lstStyle/>
-                    <a:p>
-                      <a:pPr marL="0" marR="0" algn="ctr" rtl="0">
-                        <a:lnSpc>
-                          <a:spcPct val="107000"/>
-                        </a:lnSpc>
-                        <a:spcBef>
-                          <a:spcPts val="0"/>
-                        </a:spcBef>
-                        <a:spcAft>
-                          <a:spcPts val="0"/>
-                        </a:spcAft>
-                      </a:pPr>
-                      <a:r>
-                        <a:rPr lang="en-US" sz="2800" kern="100" dirty="0">
-                          <a:effectLst/>
-                          <a:latin typeface="Cambria Math" panose="02040503050406030204" pitchFamily="18" charset="0"/>
-                          <a:ea typeface="Cambria Math" panose="02040503050406030204" pitchFamily="18" charset="0"/>
-                        </a:rPr>
-                        <a:t>Second-year </a:t>
-                      </a:r>
-                      <a:br>
-                        <a:rPr lang="en-US" sz="2800" kern="100" dirty="0">
-                          <a:effectLst/>
-                          <a:latin typeface="Cambria Math" panose="02040503050406030204" pitchFamily="18" charset="0"/>
-                          <a:ea typeface="Cambria Math" panose="02040503050406030204" pitchFamily="18" charset="0"/>
-                        </a:rPr>
-                      </a:br>
-                      <a:r>
-                        <a:rPr lang="en-US" sz="2800" kern="100" dirty="0">
-                          <a:effectLst/>
-                          <a:latin typeface="Cambria Math" panose="02040503050406030204" pitchFamily="18" charset="0"/>
-                          <a:ea typeface="Cambria Math" panose="02040503050406030204" pitchFamily="18" charset="0"/>
-                        </a:rPr>
-                        <a:t>sickness rate (%)</a:t>
-                      </a:r>
-                      <a:endParaRPr lang="en-US" sz="2800" kern="100" dirty="0">
-                        <a:effectLst/>
-                        <a:latin typeface="Cambria Math" panose="02040503050406030204" pitchFamily="18" charset="0"/>
-                        <a:ea typeface="Cambria Math" panose="02040503050406030204" pitchFamily="18" charset="0"/>
-                        <a:cs typeface="Arial" panose="020B0604020202020204" pitchFamily="34" charset="0"/>
-                      </a:endParaRPr>
-                    </a:p>
-                  </a:txBody>
-                  <a:tcPr marL="68580" marR="68580" marT="0" marB="0" anchor="ctr"/>
-                </a:tc>
-                <a:extLst>
-                  <a:ext uri="{0D108BD9-81ED-4DB2-BD59-A6C34878D82A}">
-                    <a16:rowId xmlns:a16="http://schemas.microsoft.com/office/drawing/2014/main" val="2009120744"/>
-                  </a:ext>
-                </a:extLst>
-              </a:tr>
-              <a:tr h="416839">
-                <a:tc>
-                  <a:txBody>
-                    <a:bodyPr/>
-                    <a:lstStyle/>
-                    <a:p>
-                      <a:pPr marL="0" marR="0" algn="ctr" rtl="0">
-                        <a:lnSpc>
-                          <a:spcPct val="107000"/>
-                        </a:lnSpc>
-                        <a:spcBef>
-                          <a:spcPts val="0"/>
-                        </a:spcBef>
-                        <a:spcAft>
-                          <a:spcPts val="0"/>
-                        </a:spcAft>
-                      </a:pPr>
-                      <a:r>
-                        <a:rPr lang="en-US" sz="2800" kern="100">
-                          <a:effectLst/>
-                          <a:latin typeface="Cambria Math" panose="02040503050406030204" pitchFamily="18" charset="0"/>
-                          <a:ea typeface="Cambria Math" panose="02040503050406030204" pitchFamily="18" charset="0"/>
-                        </a:rPr>
-                        <a:t>1</a:t>
-                      </a:r>
-                      <a:endParaRPr lang="en-US" sz="2800" kern="100">
-                        <a:effectLst/>
-                        <a:latin typeface="Cambria Math" panose="02040503050406030204" pitchFamily="18" charset="0"/>
-                        <a:ea typeface="Cambria Math" panose="02040503050406030204" pitchFamily="18" charset="0"/>
-                        <a:cs typeface="Arial" panose="020B0604020202020204" pitchFamily="34" charset="0"/>
-                      </a:endParaRPr>
-                    </a:p>
-                  </a:txBody>
-                  <a:tcPr marL="68580" marR="68580" marT="0" marB="0" anchor="ctr"/>
-                </a:tc>
-                <a:tc>
-                  <a:txBody>
-                    <a:bodyPr/>
-                    <a:lstStyle/>
-                    <a:p>
-                      <a:pPr marL="0" marR="0" algn="ctr" rtl="0">
-                        <a:lnSpc>
-                          <a:spcPct val="107000"/>
-                        </a:lnSpc>
-                        <a:spcBef>
-                          <a:spcPts val="0"/>
-                        </a:spcBef>
-                        <a:spcAft>
-                          <a:spcPts val="0"/>
-                        </a:spcAft>
-                      </a:pPr>
-                      <a:r>
-                        <a:rPr lang="en-US" sz="2800" kern="100" dirty="0">
-                          <a:effectLst/>
-                          <a:latin typeface="Cambria Math" panose="02040503050406030204" pitchFamily="18" charset="0"/>
-                          <a:ea typeface="Cambria Math" panose="02040503050406030204" pitchFamily="18" charset="0"/>
-                        </a:rPr>
-                        <a:t>77</a:t>
-                      </a:r>
-                      <a:endParaRPr lang="en-US" sz="2800" kern="100" dirty="0">
-                        <a:effectLst/>
-                        <a:latin typeface="Cambria Math" panose="02040503050406030204" pitchFamily="18" charset="0"/>
-                        <a:ea typeface="Cambria Math" panose="02040503050406030204" pitchFamily="18" charset="0"/>
-                        <a:cs typeface="Arial" panose="020B0604020202020204" pitchFamily="34" charset="0"/>
-                      </a:endParaRPr>
-                    </a:p>
-                  </a:txBody>
-                  <a:tcPr marL="68580" marR="68580" marT="0" marB="0" anchor="ctr"/>
-                </a:tc>
-                <a:tc>
-                  <a:txBody>
-                    <a:bodyPr/>
-                    <a:lstStyle/>
-                    <a:p>
-                      <a:pPr marL="0" marR="0" algn="ctr" rtl="0">
-                        <a:lnSpc>
-                          <a:spcPct val="107000"/>
-                        </a:lnSpc>
-                        <a:spcBef>
-                          <a:spcPts val="0"/>
-                        </a:spcBef>
-                        <a:spcAft>
-                          <a:spcPts val="0"/>
-                        </a:spcAft>
-                      </a:pPr>
-                      <a:r>
-                        <a:rPr lang="en-US" sz="2800" kern="100" dirty="0">
-                          <a:effectLst/>
-                          <a:latin typeface="Cambria Math" panose="02040503050406030204" pitchFamily="18" charset="0"/>
-                          <a:ea typeface="Cambria Math" panose="02040503050406030204" pitchFamily="18" charset="0"/>
-                        </a:rPr>
-                        <a:t>52</a:t>
-                      </a:r>
-                      <a:endParaRPr lang="en-US" sz="2800" kern="100" dirty="0">
-                        <a:effectLst/>
-                        <a:latin typeface="Cambria Math" panose="02040503050406030204" pitchFamily="18" charset="0"/>
-                        <a:ea typeface="Cambria Math" panose="02040503050406030204" pitchFamily="18" charset="0"/>
-                        <a:cs typeface="Arial" panose="020B0604020202020204" pitchFamily="34" charset="0"/>
-                      </a:endParaRPr>
-                    </a:p>
-                  </a:txBody>
-                  <a:tcPr marL="68580" marR="68580" marT="0" marB="0" anchor="ctr"/>
-                </a:tc>
-                <a:extLst>
-                  <a:ext uri="{0D108BD9-81ED-4DB2-BD59-A6C34878D82A}">
-                    <a16:rowId xmlns:a16="http://schemas.microsoft.com/office/drawing/2014/main" val="304544607"/>
-                  </a:ext>
-                </a:extLst>
-              </a:tr>
-              <a:tr h="416839">
-                <a:tc>
-                  <a:txBody>
-                    <a:bodyPr/>
-                    <a:lstStyle/>
-                    <a:p>
-                      <a:pPr marL="0" marR="0" algn="ctr" rtl="0">
-                        <a:lnSpc>
-                          <a:spcPct val="107000"/>
-                        </a:lnSpc>
-                        <a:spcBef>
-                          <a:spcPts val="0"/>
-                        </a:spcBef>
-                        <a:spcAft>
-                          <a:spcPts val="0"/>
-                        </a:spcAft>
-                      </a:pPr>
-                      <a:r>
-                        <a:rPr lang="en-US" sz="2800" kern="100">
-                          <a:effectLst/>
-                          <a:latin typeface="Cambria Math" panose="02040503050406030204" pitchFamily="18" charset="0"/>
-                          <a:ea typeface="Cambria Math" panose="02040503050406030204" pitchFamily="18" charset="0"/>
-                        </a:rPr>
-                        <a:t>2</a:t>
-                      </a:r>
-                      <a:endParaRPr lang="en-US" sz="2800" kern="100">
-                        <a:effectLst/>
-                        <a:latin typeface="Cambria Math" panose="02040503050406030204" pitchFamily="18" charset="0"/>
-                        <a:ea typeface="Cambria Math" panose="02040503050406030204" pitchFamily="18" charset="0"/>
-                        <a:cs typeface="Arial" panose="020B0604020202020204" pitchFamily="34" charset="0"/>
-                      </a:endParaRPr>
-                    </a:p>
-                  </a:txBody>
-                  <a:tcPr marL="68580" marR="68580" marT="0" marB="0" anchor="ctr"/>
-                </a:tc>
-                <a:tc>
-                  <a:txBody>
-                    <a:bodyPr/>
-                    <a:lstStyle/>
-                    <a:p>
-                      <a:pPr marL="0" marR="0" algn="ctr" rtl="0">
-                        <a:lnSpc>
-                          <a:spcPct val="107000"/>
-                        </a:lnSpc>
-                        <a:spcBef>
-                          <a:spcPts val="0"/>
-                        </a:spcBef>
-                        <a:spcAft>
-                          <a:spcPts val="0"/>
-                        </a:spcAft>
-                      </a:pPr>
-                      <a:r>
-                        <a:rPr lang="en-US" sz="2800" kern="100" dirty="0">
-                          <a:effectLst/>
-                          <a:latin typeface="Cambria Math" panose="02040503050406030204" pitchFamily="18" charset="0"/>
-                          <a:ea typeface="Cambria Math" panose="02040503050406030204" pitchFamily="18" charset="0"/>
-                        </a:rPr>
-                        <a:t>56</a:t>
-                      </a:r>
-                      <a:endParaRPr lang="en-US" sz="2800" kern="100" dirty="0">
-                        <a:effectLst/>
-                        <a:latin typeface="Cambria Math" panose="02040503050406030204" pitchFamily="18" charset="0"/>
-                        <a:ea typeface="Cambria Math" panose="02040503050406030204" pitchFamily="18" charset="0"/>
-                        <a:cs typeface="Arial" panose="020B0604020202020204" pitchFamily="34" charset="0"/>
-                      </a:endParaRPr>
-                    </a:p>
-                  </a:txBody>
-                  <a:tcPr marL="68580" marR="68580" marT="0" marB="0" anchor="ctr"/>
-                </a:tc>
-                <a:tc>
-                  <a:txBody>
-                    <a:bodyPr/>
-                    <a:lstStyle/>
-                    <a:p>
-                      <a:pPr marL="0" marR="0" algn="ctr" rtl="0">
-                        <a:lnSpc>
-                          <a:spcPct val="107000"/>
-                        </a:lnSpc>
-                        <a:spcBef>
-                          <a:spcPts val="0"/>
-                        </a:spcBef>
-                        <a:spcAft>
-                          <a:spcPts val="0"/>
-                        </a:spcAft>
-                      </a:pPr>
-                      <a:r>
-                        <a:rPr lang="en-US" sz="2800" kern="100" dirty="0">
-                          <a:effectLst/>
-                          <a:latin typeface="Cambria Math" panose="02040503050406030204" pitchFamily="18" charset="0"/>
-                          <a:ea typeface="Cambria Math" panose="02040503050406030204" pitchFamily="18" charset="0"/>
-                        </a:rPr>
-                        <a:t>59</a:t>
-                      </a:r>
-                      <a:endParaRPr lang="en-US" sz="2800" kern="100" dirty="0">
-                        <a:effectLst/>
-                        <a:latin typeface="Cambria Math" panose="02040503050406030204" pitchFamily="18" charset="0"/>
-                        <a:ea typeface="Cambria Math" panose="02040503050406030204" pitchFamily="18" charset="0"/>
-                        <a:cs typeface="Arial" panose="020B0604020202020204" pitchFamily="34" charset="0"/>
-                      </a:endParaRPr>
-                    </a:p>
-                  </a:txBody>
-                  <a:tcPr marL="68580" marR="68580" marT="0" marB="0" anchor="ctr"/>
-                </a:tc>
-                <a:extLst>
-                  <a:ext uri="{0D108BD9-81ED-4DB2-BD59-A6C34878D82A}">
-                    <a16:rowId xmlns:a16="http://schemas.microsoft.com/office/drawing/2014/main" val="545208140"/>
-                  </a:ext>
-                </a:extLst>
-              </a:tr>
-              <a:tr h="416839">
-                <a:tc>
-                  <a:txBody>
-                    <a:bodyPr/>
-                    <a:lstStyle/>
-                    <a:p>
-                      <a:pPr marL="0" marR="0" algn="ctr" rtl="0">
-                        <a:lnSpc>
-                          <a:spcPct val="107000"/>
-                        </a:lnSpc>
-                        <a:spcBef>
-                          <a:spcPts val="0"/>
-                        </a:spcBef>
-                        <a:spcAft>
-                          <a:spcPts val="0"/>
-                        </a:spcAft>
-                      </a:pPr>
-                      <a:r>
-                        <a:rPr lang="en-US" sz="2800" kern="100">
-                          <a:effectLst/>
-                          <a:latin typeface="Cambria Math" panose="02040503050406030204" pitchFamily="18" charset="0"/>
-                          <a:ea typeface="Cambria Math" panose="02040503050406030204" pitchFamily="18" charset="0"/>
-                        </a:rPr>
-                        <a:t>3</a:t>
-                      </a:r>
-                      <a:endParaRPr lang="en-US" sz="2800" kern="100">
-                        <a:effectLst/>
-                        <a:latin typeface="Cambria Math" panose="02040503050406030204" pitchFamily="18" charset="0"/>
-                        <a:ea typeface="Cambria Math" panose="02040503050406030204" pitchFamily="18" charset="0"/>
-                        <a:cs typeface="Arial" panose="020B0604020202020204" pitchFamily="34" charset="0"/>
-                      </a:endParaRPr>
-                    </a:p>
-                  </a:txBody>
-                  <a:tcPr marL="68580" marR="68580" marT="0" marB="0" anchor="ctr"/>
-                </a:tc>
-                <a:tc>
-                  <a:txBody>
-                    <a:bodyPr/>
-                    <a:lstStyle/>
-                    <a:p>
-                      <a:pPr marL="0" marR="0" algn="ctr" rtl="0">
-                        <a:lnSpc>
-                          <a:spcPct val="107000"/>
-                        </a:lnSpc>
-                        <a:spcBef>
-                          <a:spcPts val="0"/>
-                        </a:spcBef>
-                        <a:spcAft>
-                          <a:spcPts val="0"/>
-                        </a:spcAft>
-                      </a:pPr>
-                      <a:r>
-                        <a:rPr lang="en-US" sz="2800" kern="100" dirty="0">
-                          <a:effectLst/>
-                          <a:latin typeface="Cambria Math" panose="02040503050406030204" pitchFamily="18" charset="0"/>
-                          <a:ea typeface="Cambria Math" panose="02040503050406030204" pitchFamily="18" charset="0"/>
-                        </a:rPr>
-                        <a:t>71</a:t>
-                      </a:r>
-                      <a:endParaRPr lang="en-US" sz="2800" kern="100" dirty="0">
-                        <a:effectLst/>
-                        <a:latin typeface="Cambria Math" panose="02040503050406030204" pitchFamily="18" charset="0"/>
-                        <a:ea typeface="Cambria Math" panose="02040503050406030204" pitchFamily="18" charset="0"/>
-                        <a:cs typeface="Arial" panose="020B0604020202020204" pitchFamily="34" charset="0"/>
-                      </a:endParaRPr>
-                    </a:p>
-                  </a:txBody>
-                  <a:tcPr marL="68580" marR="68580" marT="0" marB="0" anchor="ctr"/>
-                </a:tc>
-                <a:tc>
-                  <a:txBody>
-                    <a:bodyPr/>
-                    <a:lstStyle/>
-                    <a:p>
-                      <a:pPr marL="0" marR="0" algn="ctr" rtl="0">
-                        <a:lnSpc>
-                          <a:spcPct val="107000"/>
-                        </a:lnSpc>
-                        <a:spcBef>
-                          <a:spcPts val="0"/>
-                        </a:spcBef>
-                        <a:spcAft>
-                          <a:spcPts val="0"/>
-                        </a:spcAft>
-                      </a:pPr>
-                      <a:r>
-                        <a:rPr lang="en-US" sz="2800" kern="100" dirty="0">
-                          <a:effectLst/>
-                          <a:latin typeface="Cambria Math" panose="02040503050406030204" pitchFamily="18" charset="0"/>
-                          <a:ea typeface="Cambria Math" panose="02040503050406030204" pitchFamily="18" charset="0"/>
-                        </a:rPr>
-                        <a:t>68</a:t>
-                      </a:r>
-                      <a:endParaRPr lang="en-US" sz="2800" kern="100" dirty="0">
-                        <a:effectLst/>
-                        <a:latin typeface="Cambria Math" panose="02040503050406030204" pitchFamily="18" charset="0"/>
-                        <a:ea typeface="Cambria Math" panose="02040503050406030204" pitchFamily="18" charset="0"/>
-                        <a:cs typeface="Arial" panose="020B0604020202020204" pitchFamily="34" charset="0"/>
-                      </a:endParaRPr>
-                    </a:p>
-                  </a:txBody>
-                  <a:tcPr marL="68580" marR="68580" marT="0" marB="0" anchor="ctr"/>
-                </a:tc>
-                <a:extLst>
-                  <a:ext uri="{0D108BD9-81ED-4DB2-BD59-A6C34878D82A}">
-                    <a16:rowId xmlns:a16="http://schemas.microsoft.com/office/drawing/2014/main" val="3799792934"/>
-                  </a:ext>
-                </a:extLst>
-              </a:tr>
-              <a:tr h="416839">
-                <a:tc>
-                  <a:txBody>
-                    <a:bodyPr/>
-                    <a:lstStyle/>
-                    <a:p>
-                      <a:pPr marL="0" marR="0" algn="ctr" rtl="0">
-                        <a:lnSpc>
-                          <a:spcPct val="107000"/>
-                        </a:lnSpc>
-                        <a:spcBef>
-                          <a:spcPts val="0"/>
-                        </a:spcBef>
-                        <a:spcAft>
-                          <a:spcPts val="0"/>
-                        </a:spcAft>
-                      </a:pPr>
-                      <a:r>
-                        <a:rPr lang="en-US" sz="2800" kern="100" dirty="0">
-                          <a:effectLst/>
-                          <a:latin typeface="Cambria Math" panose="02040503050406030204" pitchFamily="18" charset="0"/>
-                          <a:ea typeface="Cambria Math" panose="02040503050406030204" pitchFamily="18" charset="0"/>
-                        </a:rPr>
-                        <a:t>4</a:t>
-                      </a:r>
-                      <a:endParaRPr lang="en-US" sz="2800" kern="100" dirty="0">
-                        <a:effectLst/>
-                        <a:latin typeface="Cambria Math" panose="02040503050406030204" pitchFamily="18" charset="0"/>
-                        <a:ea typeface="Cambria Math" panose="02040503050406030204" pitchFamily="18" charset="0"/>
-                        <a:cs typeface="Arial" panose="020B0604020202020204" pitchFamily="34" charset="0"/>
-                      </a:endParaRPr>
-                    </a:p>
-                  </a:txBody>
-                  <a:tcPr marL="68580" marR="68580" marT="0" marB="0" anchor="ctr"/>
-                </a:tc>
-                <a:tc>
-                  <a:txBody>
-                    <a:bodyPr/>
-                    <a:lstStyle/>
-                    <a:p>
-                      <a:pPr marL="0" marR="0" algn="ctr" rtl="0">
-                        <a:lnSpc>
-                          <a:spcPct val="107000"/>
-                        </a:lnSpc>
-                        <a:spcBef>
-                          <a:spcPts val="0"/>
-                        </a:spcBef>
-                        <a:spcAft>
-                          <a:spcPts val="0"/>
-                        </a:spcAft>
-                      </a:pPr>
-                      <a:r>
-                        <a:rPr lang="en-US" sz="2800" kern="100" dirty="0">
-                          <a:effectLst/>
-                          <a:latin typeface="Cambria Math" panose="02040503050406030204" pitchFamily="18" charset="0"/>
-                          <a:ea typeface="Cambria Math" panose="02040503050406030204" pitchFamily="18" charset="0"/>
-                        </a:rPr>
-                        <a:t>78</a:t>
-                      </a:r>
-                      <a:endParaRPr lang="en-US" sz="2800" kern="100" dirty="0">
-                        <a:effectLst/>
-                        <a:latin typeface="Cambria Math" panose="02040503050406030204" pitchFamily="18" charset="0"/>
-                        <a:ea typeface="Cambria Math" panose="02040503050406030204" pitchFamily="18" charset="0"/>
-                        <a:cs typeface="Arial" panose="020B0604020202020204" pitchFamily="34" charset="0"/>
-                      </a:endParaRPr>
-                    </a:p>
-                  </a:txBody>
-                  <a:tcPr marL="68580" marR="68580" marT="0" marB="0" anchor="ctr"/>
-                </a:tc>
-                <a:tc>
-                  <a:txBody>
-                    <a:bodyPr/>
-                    <a:lstStyle/>
-                    <a:p>
-                      <a:pPr marL="0" marR="0" algn="ctr" rtl="0">
-                        <a:lnSpc>
-                          <a:spcPct val="107000"/>
-                        </a:lnSpc>
-                        <a:spcBef>
-                          <a:spcPts val="0"/>
-                        </a:spcBef>
-                        <a:spcAft>
-                          <a:spcPts val="0"/>
-                        </a:spcAft>
-                      </a:pPr>
-                      <a:r>
-                        <a:rPr lang="en-US" sz="2800" kern="100" dirty="0">
-                          <a:effectLst/>
-                          <a:latin typeface="Cambria Math" panose="02040503050406030204" pitchFamily="18" charset="0"/>
-                          <a:ea typeface="Cambria Math" panose="02040503050406030204" pitchFamily="18" charset="0"/>
-                        </a:rPr>
-                        <a:t>68</a:t>
-                      </a:r>
-                      <a:endParaRPr lang="en-US" sz="2800" kern="100" dirty="0">
-                        <a:effectLst/>
-                        <a:latin typeface="Cambria Math" panose="02040503050406030204" pitchFamily="18" charset="0"/>
-                        <a:ea typeface="Cambria Math" panose="02040503050406030204" pitchFamily="18" charset="0"/>
-                        <a:cs typeface="Arial" panose="020B0604020202020204" pitchFamily="34" charset="0"/>
-                      </a:endParaRPr>
-                    </a:p>
-                  </a:txBody>
-                  <a:tcPr marL="68580" marR="68580" marT="0" marB="0" anchor="ctr"/>
-                </a:tc>
-                <a:extLst>
-                  <a:ext uri="{0D108BD9-81ED-4DB2-BD59-A6C34878D82A}">
-                    <a16:rowId xmlns:a16="http://schemas.microsoft.com/office/drawing/2014/main" val="1790511498"/>
-                  </a:ext>
-                </a:extLst>
-              </a:tr>
-            </a:tbl>
-          </a:graphicData>
-        </a:graphic>
-      </p:graphicFrame>
-    </p:spTree>
-    <p:extLst>
-      <p:ext uri="{BB962C8B-B14F-4D97-AF65-F5344CB8AC3E}">
-        <p14:creationId xmlns:p14="http://schemas.microsoft.com/office/powerpoint/2010/main" val="1000118881"/>
-      </p:ext>
-    </p:extLst>
-  </p:cSld>
-  <p:clrMapOvr>
-    <a:masterClrMapping/>
-  </p:clrMapOvr>
-</p:sld>
-</file>
-
-<file path=ppt/slides/slide2.xml><?xml version="1.0" encoding="utf-8"?>
 <p:sld xmlns:a="http://schemas.openxmlformats.org/drawingml/2006/main" xmlns:r="http://schemas.openxmlformats.org/officeDocument/2006/relationships" xmlns:p="http://schemas.openxmlformats.org/presentationml/2006/main">
   <p:cSld>
     <p:bg>
@@ -7748,7 +4348,13 @@
           <p:cNvGraphicFramePr>
             <a:graphicFrameLocks noGrp="1"/>
           </p:cNvGraphicFramePr>
-          <p:nvPr/>
+          <p:nvPr>
+            <p:extLst>
+              <p:ext uri="{D42A27DB-BD31-4B8C-83A1-F6EECF244321}">
+                <p14:modId xmlns:p14="http://schemas.microsoft.com/office/powerpoint/2010/main" val="3736468401"/>
+              </p:ext>
+            </p:extLst>
+          </p:nvPr>
         </p:nvGraphicFramePr>
         <p:xfrm>
           <a:off x="15011670" y="4952526"/>
@@ -7838,21 +4444,24 @@
                     <a:bodyPr/>
                     <a:lstStyle/>
                     <a:p>
-                      <a:pPr marL="457200" indent="-457200" algn="l" rtl="0">
+                      <a:pPr marL="0" indent="0" algn="l" rtl="0">
                         <a:lnSpc>
                           <a:spcPct val="150000"/>
                         </a:lnSpc>
                         <a:buFont typeface="Arial" panose="020B0604020202020204" pitchFamily="34" charset="0"/>
-                        <a:buChar char="•"/>
+                        <a:buNone/>
                       </a:pPr>
-                      <a:endParaRPr lang="en-US" sz="3200" kern="1200" dirty="0">
-                        <a:solidFill>
-                          <a:schemeClr val="dk1"/>
-                        </a:solidFill>
-                        <a:latin typeface="+mn-lt"/>
-                        <a:ea typeface="+mn-ea"/>
-                        <a:cs typeface="+mn-cs"/>
-                      </a:endParaRPr>
+                      <a:r>
+                        <a:rPr lang="en-US" sz="3200" kern="1200" dirty="0">
+                          <a:solidFill>
+                            <a:schemeClr val="dk1"/>
+                          </a:solidFill>
+                          <a:latin typeface="+mn-lt"/>
+                          <a:ea typeface="+mn-ea"/>
+                          <a:cs typeface="+mn-cs"/>
+                        </a:rPr>
+                        <a:t> Results of the Second-year - Logistic regression Vs. GAM model :  </a:t>
+                      </a:r>
                     </a:p>
                     <a:p>
                       <a:pPr marL="457200" indent="-457200" algn="l" rtl="0">
@@ -9214,25 +5823,7 @@
                                 <a:rPr lang="en-US" sz="2800" i="0">
                                   <a:latin typeface="Cambria Math" panose="02040503050406030204" pitchFamily="18" charset="0"/>
                                 </a:rPr>
-                                <m:t>&amp;</m:t>
-                              </m:r>
-                              <m:r>
-                                <a:rPr lang="en-US" sz="2800" i="0">
-                                  <a:latin typeface="Cambria Math" panose="02040503050406030204" pitchFamily="18" charset="0"/>
-                                </a:rPr>
-                                <m:t>1</m:t>
-                              </m:r>
-                              <m:r>
-                                <a:rPr lang="en-US" sz="2800" i="0">
-                                  <a:latin typeface="Cambria Math" panose="02040503050406030204" pitchFamily="18" charset="0"/>
-                                </a:rPr>
-                                <m:t>                                           </m:t>
-                              </m:r>
-                              <m:r>
-                                <a:rPr lang="en-US" sz="2800" i="0">
-                                  <a:latin typeface="Cambria Math" panose="02040503050406030204" pitchFamily="18" charset="0"/>
-                                </a:rPr>
-                                <m:t> </m:t>
+                                <m:t>&amp;1                                            </m:t>
                               </m:r>
                               <m:r>
                                 <m:rPr>
@@ -9277,31 +5868,7 @@
                                 <a:rPr lang="en-US" sz="2800" i="0">
                                   <a:latin typeface="Cambria Math" panose="02040503050406030204" pitchFamily="18" charset="0"/>
                                 </a:rPr>
-                                <m:t> </m:t>
-                              </m:r>
-                              <m:r>
-                                <a:rPr lang="en-US" sz="2800" i="0">
-                                  <a:latin typeface="Cambria Math" panose="02040503050406030204" pitchFamily="18" charset="0"/>
-                                </a:rPr>
-                                <m:t>1</m:t>
-                              </m:r>
-                              <m:r>
-                                <a:rPr lang="en-US" sz="2800" i="0">
-                                  <a:latin typeface="Cambria Math" panose="02040503050406030204" pitchFamily="18" charset="0"/>
-                                </a:rPr>
-                                <m:t>, </m:t>
-                              </m:r>
-                              <m:r>
-                                <a:rPr lang="en-US" sz="2800" i="0">
-                                  <a:latin typeface="Cambria Math" panose="02040503050406030204" pitchFamily="18" charset="0"/>
-                                </a:rPr>
-                                <m:t>2019</m:t>
-                              </m:r>
-                              <m:r>
-                                <a:rPr lang="en-US" sz="2800" i="0">
-                                  <a:latin typeface="Cambria Math" panose="02040503050406030204" pitchFamily="18" charset="0"/>
-                                </a:rPr>
-                                <m:t> </m:t>
+                                <m:t> 1, 2019 </m:t>
                               </m:r>
                             </m:e>
                             <m:e>
@@ -9309,19 +5876,7 @@
                                 <a:rPr lang="en-US" sz="2800" i="0">
                                   <a:latin typeface="Cambria Math" panose="02040503050406030204" pitchFamily="18" charset="0"/>
                                 </a:rPr>
-                                <m:t>&amp;</m:t>
-                              </m:r>
-                              <m:r>
-                                <a:rPr lang="en-US" sz="2800" i="0">
-                                  <a:latin typeface="Cambria Math" panose="02040503050406030204" pitchFamily="18" charset="0"/>
-                                </a:rPr>
-                                <m:t>2</m:t>
-                              </m:r>
-                              <m:r>
-                                <a:rPr lang="en-US" sz="2800" i="0">
-                                  <a:latin typeface="Cambria Math" panose="02040503050406030204" pitchFamily="18" charset="0"/>
-                                </a:rPr>
-                                <m:t>       </m:t>
+                                <m:t>&amp;2       </m:t>
                               </m:r>
                               <m:r>
                                 <m:rPr>
@@ -9336,31 +5891,7 @@
                                 <a:rPr lang="en-US" sz="2800" i="0">
                                   <a:latin typeface="Cambria Math" panose="02040503050406030204" pitchFamily="18" charset="0"/>
                                 </a:rPr>
-                                <m:t> </m:t>
-                              </m:r>
-                              <m:r>
-                                <a:rPr lang="en-US" sz="2800" i="0">
-                                  <a:latin typeface="Cambria Math" panose="02040503050406030204" pitchFamily="18" charset="0"/>
-                                </a:rPr>
-                                <m:t>1</m:t>
-                              </m:r>
-                              <m:r>
-                                <a:rPr lang="en-US" sz="2800" i="0">
-                                  <a:latin typeface="Cambria Math" panose="02040503050406030204" pitchFamily="18" charset="0"/>
-                                </a:rPr>
-                                <m:t>, </m:t>
-                              </m:r>
-                              <m:r>
-                                <a:rPr lang="en-US" sz="2800" i="0">
-                                  <a:latin typeface="Cambria Math" panose="02040503050406030204" pitchFamily="18" charset="0"/>
-                                </a:rPr>
-                                <m:t>2019</m:t>
-                              </m:r>
-                              <m:r>
-                                <a:rPr lang="en-US" sz="2800" i="0">
-                                  <a:latin typeface="Cambria Math" panose="02040503050406030204" pitchFamily="18" charset="0"/>
-                                </a:rPr>
-                                <m:t>≤</m:t>
+                                <m:t> 1, 2019≤</m:t>
                               </m:r>
                               <m:r>
                                 <m:rPr>
@@ -9405,25 +5936,7 @@
                                 <a:rPr lang="en-US" sz="2800" i="0">
                                   <a:latin typeface="Cambria Math" panose="02040503050406030204" pitchFamily="18" charset="0"/>
                                 </a:rPr>
-                                <m:t> </m:t>
-                              </m:r>
-                              <m:r>
-                                <a:rPr lang="en-US" sz="2800" i="0">
-                                  <a:latin typeface="Cambria Math" panose="02040503050406030204" pitchFamily="18" charset="0"/>
-                                </a:rPr>
-                                <m:t>11</m:t>
-                              </m:r>
-                              <m:r>
-                                <a:rPr lang="en-US" sz="2800" i="0">
-                                  <a:latin typeface="Cambria Math" panose="02040503050406030204" pitchFamily="18" charset="0"/>
-                                </a:rPr>
-                                <m:t>, </m:t>
-                              </m:r>
-                              <m:r>
-                                <a:rPr lang="en-US" sz="2800" i="0">
-                                  <a:latin typeface="Cambria Math" panose="02040503050406030204" pitchFamily="18" charset="0"/>
-                                </a:rPr>
-                                <m:t>2019</m:t>
+                                <m:t> 11, 2019</m:t>
                               </m:r>
                             </m:e>
                             <m:e>
@@ -9431,19 +5944,7 @@
                                 <a:rPr lang="en-US" sz="2800" i="0">
                                   <a:latin typeface="Cambria Math" panose="02040503050406030204" pitchFamily="18" charset="0"/>
                                 </a:rPr>
-                                <m:t>&amp;</m:t>
-                              </m:r>
-                              <m:r>
-                                <a:rPr lang="en-US" sz="2800" i="0">
-                                  <a:latin typeface="Cambria Math" panose="02040503050406030204" pitchFamily="18" charset="0"/>
-                                </a:rPr>
-                                <m:t>3</m:t>
-                              </m:r>
-                              <m:r>
-                                <a:rPr lang="en-US" sz="2800" i="0">
-                                  <a:latin typeface="Cambria Math" panose="02040503050406030204" pitchFamily="18" charset="0"/>
-                                </a:rPr>
-                                <m:t>             </m:t>
+                                <m:t>&amp;3             </m:t>
                               </m:r>
                               <m:r>
                                 <m:rPr>
@@ -9458,31 +5959,7 @@
                                 <a:rPr lang="en-US" sz="2800" i="0">
                                   <a:latin typeface="Cambria Math" panose="02040503050406030204" pitchFamily="18" charset="0"/>
                                 </a:rPr>
-                                <m:t> </m:t>
-                              </m:r>
-                              <m:r>
-                                <a:rPr lang="en-US" sz="2800" i="0">
-                                  <a:latin typeface="Cambria Math" panose="02040503050406030204" pitchFamily="18" charset="0"/>
-                                </a:rPr>
-                                <m:t>11</m:t>
-                              </m:r>
-                              <m:r>
-                                <a:rPr lang="en-US" sz="2800" i="0">
-                                  <a:latin typeface="Cambria Math" panose="02040503050406030204" pitchFamily="18" charset="0"/>
-                                </a:rPr>
-                                <m:t>, </m:t>
-                              </m:r>
-                              <m:r>
-                                <a:rPr lang="en-US" sz="2800" i="0">
-                                  <a:latin typeface="Cambria Math" panose="02040503050406030204" pitchFamily="18" charset="0"/>
-                                </a:rPr>
-                                <m:t>2019</m:t>
-                              </m:r>
-                              <m:r>
-                                <a:rPr lang="en-US" sz="2800" i="0">
-                                  <a:latin typeface="Cambria Math" panose="02040503050406030204" pitchFamily="18" charset="0"/>
-                                </a:rPr>
-                                <m:t>≤</m:t>
+                                <m:t> 11, 2019≤</m:t>
                               </m:r>
                               <m:r>
                                 <m:rPr>
@@ -9527,25 +6004,7 @@
                                 <a:rPr lang="en-US" sz="2800" i="0">
                                   <a:latin typeface="Cambria Math" panose="02040503050406030204" pitchFamily="18" charset="0"/>
                                 </a:rPr>
-                                <m:t> </m:t>
-                              </m:r>
-                              <m:r>
-                                <a:rPr lang="en-US" sz="2800" i="0">
-                                  <a:latin typeface="Cambria Math" panose="02040503050406030204" pitchFamily="18" charset="0"/>
-                                </a:rPr>
-                                <m:t>7</m:t>
-                              </m:r>
-                              <m:r>
-                                <a:rPr lang="en-US" sz="2800" i="0">
-                                  <a:latin typeface="Cambria Math" panose="02040503050406030204" pitchFamily="18" charset="0"/>
-                                </a:rPr>
-                                <m:t>, </m:t>
-                              </m:r>
-                              <m:r>
-                                <a:rPr lang="en-US" sz="2800" i="0">
-                                  <a:latin typeface="Cambria Math" panose="02040503050406030204" pitchFamily="18" charset="0"/>
-                                </a:rPr>
-                                <m:t>2021</m:t>
+                                <m:t> 7, 2021</m:t>
                               </m:r>
                             </m:e>
                             <m:e>
@@ -9553,13 +6012,7 @@
                                 <a:rPr lang="en-US" sz="2800" i="0">
                                   <a:latin typeface="Cambria Math" panose="02040503050406030204" pitchFamily="18" charset="0"/>
                                 </a:rPr>
-                                <m:t>&amp;</m:t>
-                              </m:r>
-                              <m:r>
-                                <a:rPr lang="en-US" sz="2800" i="0">
-                                  <a:latin typeface="Cambria Math" panose="02040503050406030204" pitchFamily="18" charset="0"/>
-                                </a:rPr>
-                                <m:t>4</m:t>
+                                <m:t>&amp;4</m:t>
                               </m:r>
                               <m:r>
                                 <a:rPr lang="en-US" sz="2800" b="0" i="0" smtClean="0">
@@ -9610,25 +6063,7 @@
                                 <a:rPr lang="en-US" sz="2800" i="0">
                                   <a:latin typeface="Cambria Math" panose="02040503050406030204" pitchFamily="18" charset="0"/>
                                 </a:rPr>
-                                <m:t> </m:t>
-                              </m:r>
-                              <m:r>
-                                <a:rPr lang="en-US" sz="2800" i="0">
-                                  <a:latin typeface="Cambria Math" panose="02040503050406030204" pitchFamily="18" charset="0"/>
-                                </a:rPr>
-                                <m:t>7</m:t>
-                              </m:r>
-                              <m:r>
-                                <a:rPr lang="en-US" sz="2800" i="0">
-                                  <a:latin typeface="Cambria Math" panose="02040503050406030204" pitchFamily="18" charset="0"/>
-                                </a:rPr>
-                                <m:t>, </m:t>
-                              </m:r>
-                              <m:r>
-                                <a:rPr lang="en-US" sz="2800" i="0">
-                                  <a:latin typeface="Cambria Math" panose="02040503050406030204" pitchFamily="18" charset="0"/>
-                                </a:rPr>
-                                <m:t>2021</m:t>
+                                <m:t> 7, 2021</m:t>
                               </m:r>
                             </m:e>
                           </m:eqArr>
@@ -9687,150 +6122,6 @@
           </p:sp>
         </mc:Fallback>
       </mc:AlternateContent>
-      <p:pic>
-        <p:nvPicPr>
-          <p:cNvPr id="12" name="Picture 11" descr="A picture containing text, diagram, plot, line&#10;&#10;Description automatically generated">
-            <a:extLst>
-              <a:ext uri="{FF2B5EF4-FFF2-40B4-BE49-F238E27FC236}">
-                <a16:creationId xmlns:a16="http://schemas.microsoft.com/office/drawing/2014/main" id="{64B92B50-C75F-DFD6-5C24-3116D80DA9FB}"/>
-              </a:ext>
-            </a:extLst>
-          </p:cNvPr>
-          <p:cNvPicPr>
-            <a:picLocks noChangeAspect="1"/>
-          </p:cNvPicPr>
-          <p:nvPr/>
-        </p:nvPicPr>
-        <p:blipFill>
-          <a:blip r:embed="rId5">
-            <a:extLst>
-              <a:ext uri="{28A0092B-C50C-407E-A947-70E740481C1C}">
-                <a14:useLocalDpi xmlns:a14="http://schemas.microsoft.com/office/drawing/2010/main" val="0"/>
-              </a:ext>
-            </a:extLst>
-          </a:blip>
-          <a:stretch>
-            <a:fillRect/>
-          </a:stretch>
-        </p:blipFill>
-        <p:spPr>
-          <a:xfrm>
-            <a:off x="15456310" y="6007816"/>
-            <a:ext cx="9144000" cy="5486400"/>
-          </a:xfrm>
-          <a:prstGeom prst="rect">
-            <a:avLst/>
-          </a:prstGeom>
-        </p:spPr>
-      </p:pic>
-      <p:pic>
-        <p:nvPicPr>
-          <p:cNvPr id="14" name="Picture 13" descr="A picture containing text, line, plot, diagram&#10;&#10;Description automatically generated">
-            <a:extLst>
-              <a:ext uri="{FF2B5EF4-FFF2-40B4-BE49-F238E27FC236}">
-                <a16:creationId xmlns:a16="http://schemas.microsoft.com/office/drawing/2014/main" id="{76C44484-5FED-B635-14D0-FFCBD25AFD57}"/>
-              </a:ext>
-            </a:extLst>
-          </p:cNvPr>
-          <p:cNvPicPr>
-            <a:picLocks noChangeAspect="1"/>
-          </p:cNvPicPr>
-          <p:nvPr/>
-        </p:nvPicPr>
-        <p:blipFill>
-          <a:blip r:embed="rId6">
-            <a:extLst>
-              <a:ext uri="{28A0092B-C50C-407E-A947-70E740481C1C}">
-                <a14:useLocalDpi xmlns:a14="http://schemas.microsoft.com/office/drawing/2010/main" val="0"/>
-              </a:ext>
-            </a:extLst>
-          </a:blip>
-          <a:stretch>
-            <a:fillRect/>
-          </a:stretch>
-        </p:blipFill>
-        <p:spPr>
-          <a:xfrm>
-            <a:off x="20028310" y="18595162"/>
-            <a:ext cx="9144000" cy="5486400"/>
-          </a:xfrm>
-          <a:prstGeom prst="rect">
-            <a:avLst/>
-          </a:prstGeom>
-        </p:spPr>
-      </p:pic>
-      <p:pic>
-        <p:nvPicPr>
-          <p:cNvPr id="19" name="Picture 18" descr="A picture containing text, diagram, plot, line&#10;&#10;Description automatically generated">
-            <a:extLst>
-              <a:ext uri="{FF2B5EF4-FFF2-40B4-BE49-F238E27FC236}">
-                <a16:creationId xmlns:a16="http://schemas.microsoft.com/office/drawing/2014/main" id="{1D90C954-C4BF-FD27-0BD1-0C1E40F43CC9}"/>
-              </a:ext>
-            </a:extLst>
-          </p:cNvPr>
-          <p:cNvPicPr>
-            <a:picLocks noChangeAspect="1"/>
-          </p:cNvPicPr>
-          <p:nvPr/>
-        </p:nvPicPr>
-        <p:blipFill>
-          <a:blip r:embed="rId7">
-            <a:extLst>
-              <a:ext uri="{28A0092B-C50C-407E-A947-70E740481C1C}">
-                <a14:useLocalDpi xmlns:a14="http://schemas.microsoft.com/office/drawing/2010/main" val="0"/>
-              </a:ext>
-            </a:extLst>
-          </a:blip>
-          <a:stretch>
-            <a:fillRect/>
-          </a:stretch>
-        </p:blipFill>
-        <p:spPr>
-          <a:xfrm>
-            <a:off x="15456310" y="11871118"/>
-            <a:ext cx="9144000" cy="5486400"/>
-          </a:xfrm>
-          <a:prstGeom prst="rect">
-            <a:avLst/>
-          </a:prstGeom>
-        </p:spPr>
-      </p:pic>
-      <p:pic>
-        <p:nvPicPr>
-          <p:cNvPr id="21" name="Picture 20" descr="A picture containing text, diagram, line, plot&#10;&#10;Description automatically generated">
-            <a:extLst>
-              <a:ext uri="{FF2B5EF4-FFF2-40B4-BE49-F238E27FC236}">
-                <a16:creationId xmlns:a16="http://schemas.microsoft.com/office/drawing/2014/main" id="{59BA1690-E80A-9442-54D3-7167D9B60940}"/>
-              </a:ext>
-            </a:extLst>
-          </p:cNvPr>
-          <p:cNvPicPr>
-            <a:picLocks noChangeAspect="1"/>
-          </p:cNvPicPr>
-          <p:nvPr/>
-        </p:nvPicPr>
-        <p:blipFill>
-          <a:blip r:embed="rId8">
-            <a:extLst>
-              <a:ext uri="{28A0092B-C50C-407E-A947-70E740481C1C}">
-                <a14:useLocalDpi xmlns:a14="http://schemas.microsoft.com/office/drawing/2010/main" val="0"/>
-              </a:ext>
-            </a:extLst>
-          </a:blip>
-          <a:stretch>
-            <a:fillRect/>
-          </a:stretch>
-        </p:blipFill>
-        <p:spPr>
-          <a:xfrm>
-            <a:off x="20028310" y="24202027"/>
-            <a:ext cx="9144000" cy="5486400"/>
-          </a:xfrm>
-          <a:prstGeom prst="rect">
-            <a:avLst/>
-          </a:prstGeom>
-        </p:spPr>
-      </p:pic>
       <p:graphicFrame>
         <p:nvGraphicFramePr>
           <p:cNvPr id="25" name="Table 24">
@@ -10457,6 +6748,116 @@
           </a:graphicData>
         </a:graphic>
       </p:graphicFrame>
+      <p:pic>
+        <p:nvPicPr>
+          <p:cNvPr id="2" name="Picture 1">
+            <a:extLst>
+              <a:ext uri="{FF2B5EF4-FFF2-40B4-BE49-F238E27FC236}">
+                <a16:creationId xmlns:a16="http://schemas.microsoft.com/office/drawing/2014/main" id="{4D3DD8C6-A50E-FF6D-12A9-5619F05F9D6E}"/>
+              </a:ext>
+            </a:extLst>
+          </p:cNvPr>
+          <p:cNvPicPr>
+            <a:picLocks noChangeAspect="1"/>
+          </p:cNvPicPr>
+          <p:nvPr/>
+        </p:nvPicPr>
+        <p:blipFill>
+          <a:blip r:embed="rId5"/>
+          <a:stretch>
+            <a:fillRect/>
+          </a:stretch>
+        </p:blipFill>
+        <p:spPr>
+          <a:xfrm>
+            <a:off x="15417802" y="6378291"/>
+            <a:ext cx="13754508" cy="7230269"/>
+          </a:xfrm>
+          <a:prstGeom prst="rect">
+            <a:avLst/>
+          </a:prstGeom>
+        </p:spPr>
+      </p:pic>
+      <p:pic>
+        <p:nvPicPr>
+          <p:cNvPr id="7" name="Picture 6" descr="A picture containing text, line, plot, diagram&#10;&#10;Description automatically generated">
+            <a:extLst>
+              <a:ext uri="{FF2B5EF4-FFF2-40B4-BE49-F238E27FC236}">
+                <a16:creationId xmlns:a16="http://schemas.microsoft.com/office/drawing/2014/main" id="{EA535E9B-0EA1-B989-CA58-7A33EB9BB995}"/>
+              </a:ext>
+            </a:extLst>
+          </p:cNvPr>
+          <p:cNvPicPr>
+            <a:picLocks noChangeAspect="1"/>
+          </p:cNvPicPr>
+          <p:nvPr/>
+        </p:nvPicPr>
+        <p:blipFill>
+          <a:blip r:embed="rId6">
+            <a:extLst>
+              <a:ext uri="{28A0092B-C50C-407E-A947-70E740481C1C}">
+                <a14:useLocalDpi xmlns:a14="http://schemas.microsoft.com/office/drawing/2010/main" val="0"/>
+              </a:ext>
+            </a:extLst>
+          </a:blip>
+          <a:stretch>
+            <a:fillRect/>
+          </a:stretch>
+        </p:blipFill>
+        <p:spPr>
+          <a:xfrm>
+            <a:off x="16519926" y="14255856"/>
+            <a:ext cx="11407415" cy="6844449"/>
+          </a:xfrm>
+          <a:prstGeom prst="rect">
+            <a:avLst/>
+          </a:prstGeom>
+        </p:spPr>
+      </p:pic>
+      <p:sp>
+        <p:nvSpPr>
+          <p:cNvPr id="11" name="TextBox 10">
+            <a:extLst>
+              <a:ext uri="{FF2B5EF4-FFF2-40B4-BE49-F238E27FC236}">
+                <a16:creationId xmlns:a16="http://schemas.microsoft.com/office/drawing/2014/main" id="{5B2E3B24-2FD4-D155-947E-C24B67FC83A3}"/>
+              </a:ext>
+            </a:extLst>
+          </p:cNvPr>
+          <p:cNvSpPr txBox="1"/>
+          <p:nvPr/>
+        </p:nvSpPr>
+        <p:spPr>
+          <a:xfrm>
+            <a:off x="23342600" y="12696791"/>
+            <a:ext cx="1625600" cy="707886"/>
+          </a:xfrm>
+          <a:prstGeom prst="rect">
+            <a:avLst/>
+          </a:prstGeom>
+          <a:noFill/>
+        </p:spPr>
+        <p:txBody>
+          <a:bodyPr wrap="square">
+            <a:spAutoFit/>
+          </a:bodyPr>
+          <a:lstStyle/>
+          <a:p>
+            <a:pPr algn="ctr"/>
+            <a:r>
+              <a:rPr lang="en-US" sz="2000" b="1" kern="1200" dirty="0">
+                <a:solidFill>
+                  <a:schemeClr val="dk1"/>
+                </a:solidFill>
+                <a:latin typeface="+mj-lt"/>
+                <a:ea typeface="+mn-ea"/>
+                <a:cs typeface="+mn-cs"/>
+              </a:rPr>
+              <a:t>See graph below</a:t>
+            </a:r>
+            <a:endParaRPr lang="en-US" sz="2000" b="1" dirty="0"/>
+          </a:p>
+        </p:txBody>
+      </p:sp>
     </p:spTree>
     <p:extLst>
       <p:ext uri="{BB962C8B-B14F-4D97-AF65-F5344CB8AC3E}">

</xml_diff>

<commit_message>
append plot to the poster
</commit_message>
<xml_diff>
--- a/poster.pptx
+++ b/poster.pptx
@@ -118,7 +118,7 @@
 <file path=ppt/revisionInfo.xml><?xml version="1.0" encoding="utf-8"?>
 <p1510:revInfo xmlns:a="http://schemas.openxmlformats.org/drawingml/2006/main" xmlns:r="http://schemas.openxmlformats.org/officeDocument/2006/relationships" xmlns:p1510="http://schemas.microsoft.com/office/powerpoint/2015/10/main">
   <p1510:revLst>
-    <p1510:client id="{B1541A9E-69A3-4C64-B18D-7A7F88D200FD}" v="183" dt="2023-06-09T16:37:05.205"/>
+    <p1510:client id="{97D10777-EDE1-4B59-B9E7-AD2396A8F3A8}" v="2" dt="2023-06-12T17:07:53.741"/>
   </p1510:revLst>
 </p1510:revInfo>
 </file>
@@ -462,6 +462,38 @@
             <pc:docMk/>
             <pc:sldMk cId="3381761132" sldId="257"/>
             <ac:picMk id="23" creationId="{C876177E-FB66-B35A-4A0E-0090808E5628}"/>
+          </ac:picMkLst>
+        </pc:picChg>
+      </pc:sldChg>
+    </pc:docChg>
+  </pc:docChgLst>
+  <pc:docChgLst>
+    <pc:chgData name="Shahar Shalom" userId="c1657878-da89-43af-9535-4a8d3e59b096" providerId="ADAL" clId="{97D10777-EDE1-4B59-B9E7-AD2396A8F3A8}"/>
+    <pc:docChg chg="modSld">
+      <pc:chgData name="Shahar Shalom" userId="c1657878-da89-43af-9535-4a8d3e59b096" providerId="ADAL" clId="{97D10777-EDE1-4B59-B9E7-AD2396A8F3A8}" dt="2023-06-12T17:08:41.395" v="25" actId="1076"/>
+      <pc:docMkLst>
+        <pc:docMk/>
+      </pc:docMkLst>
+      <pc:sldChg chg="addSp modSp mod">
+        <pc:chgData name="Shahar Shalom" userId="c1657878-da89-43af-9535-4a8d3e59b096" providerId="ADAL" clId="{97D10777-EDE1-4B59-B9E7-AD2396A8F3A8}" dt="2023-06-12T17:08:41.395" v="25" actId="1076"/>
+        <pc:sldMkLst>
+          <pc:docMk/>
+          <pc:sldMk cId="3381761132" sldId="257"/>
+        </pc:sldMkLst>
+        <pc:picChg chg="add mod">
+          <ac:chgData name="Shahar Shalom" userId="c1657878-da89-43af-9535-4a8d3e59b096" providerId="ADAL" clId="{97D10777-EDE1-4B59-B9E7-AD2396A8F3A8}" dt="2023-06-12T17:08:24.290" v="22" actId="1076"/>
+          <ac:picMkLst>
+            <pc:docMk/>
+            <pc:sldMk cId="3381761132" sldId="257"/>
+            <ac:picMk id="3" creationId="{7DAC06D9-AB4C-46AB-6EF8-5DD1078F3A28}"/>
+          </ac:picMkLst>
+        </pc:picChg>
+        <pc:picChg chg="add mod modCrop">
+          <ac:chgData name="Shahar Shalom" userId="c1657878-da89-43af-9535-4a8d3e59b096" providerId="ADAL" clId="{97D10777-EDE1-4B59-B9E7-AD2396A8F3A8}" dt="2023-06-12T17:08:41.395" v="25" actId="1076"/>
+          <ac:picMkLst>
+            <pc:docMk/>
+            <pc:sldMk cId="3381761132" sldId="257"/>
+            <ac:picMk id="4" creationId="{F6E72801-0D87-CFF1-70B7-91AE9A196B1C}"/>
           </ac:picMkLst>
         </pc:picChg>
       </pc:sldChg>
@@ -12918,6 +12950,77 @@
           </a:graphicData>
         </a:graphic>
       </p:graphicFrame>
+      <p:pic>
+        <p:nvPicPr>
+          <p:cNvPr id="3" name="Picture 2" descr="A picture containing text, line, screenshot, plot&#10;&#10;Description automatically generated">
+            <a:extLst>
+              <a:ext uri="{FF2B5EF4-FFF2-40B4-BE49-F238E27FC236}">
+                <a16:creationId xmlns:a16="http://schemas.microsoft.com/office/drawing/2014/main" id="{7DAC06D9-AB4C-46AB-6EF8-5DD1078F3A28}"/>
+              </a:ext>
+            </a:extLst>
+          </p:cNvPr>
+          <p:cNvPicPr>
+            <a:picLocks noChangeAspect="1"/>
+          </p:cNvPicPr>
+          <p:nvPr/>
+        </p:nvPicPr>
+        <p:blipFill>
+          <a:blip r:embed="rId4">
+            <a:extLst>
+              <a:ext uri="{28A0092B-C50C-407E-A947-70E740481C1C}">
+                <a14:useLocalDpi xmlns:a14="http://schemas.microsoft.com/office/drawing/2010/main" val="0"/>
+              </a:ext>
+            </a:extLst>
+          </a:blip>
+          <a:stretch>
+            <a:fillRect/>
+          </a:stretch>
+        </p:blipFill>
+        <p:spPr>
+          <a:xfrm>
+            <a:off x="12387812" y="17595630"/>
+            <a:ext cx="13461839" cy="10096379"/>
+          </a:xfrm>
+          <a:prstGeom prst="rect">
+            <a:avLst/>
+          </a:prstGeom>
+        </p:spPr>
+      </p:pic>
+      <p:pic>
+        <p:nvPicPr>
+          <p:cNvPr id="4" name="Picture 3" descr="A picture containing text, screenshot, diagram, line&#10;&#10;Description automatically generated">
+            <a:extLst>
+              <a:ext uri="{FF2B5EF4-FFF2-40B4-BE49-F238E27FC236}">
+                <a16:creationId xmlns:a16="http://schemas.microsoft.com/office/drawing/2014/main" id="{F6E72801-0D87-CFF1-70B7-91AE9A196B1C}"/>
+              </a:ext>
+            </a:extLst>
+          </p:cNvPr>
+          <p:cNvPicPr>
+            <a:picLocks noChangeAspect="1"/>
+          </p:cNvPicPr>
+          <p:nvPr/>
+        </p:nvPicPr>
+        <p:blipFill rotWithShape="1">
+          <a:blip r:embed="rId5">
+            <a:extLst>
+              <a:ext uri="{28A0092B-C50C-407E-A947-70E740481C1C}">
+                <a14:useLocalDpi xmlns:a14="http://schemas.microsoft.com/office/drawing/2010/main" val="0"/>
+              </a:ext>
+            </a:extLst>
+          </a:blip>
+          <a:srcRect l="84345" t="38746" r="1479" b="39176"/>
+          <a:stretch/>
+        </p:blipFill>
+        <p:spPr>
+          <a:xfrm>
+            <a:off x="22068637" y="22863412"/>
+            <a:ext cx="3495736" cy="3266447"/>
+          </a:xfrm>
+          <a:prstGeom prst="rect">
+            <a:avLst/>
+          </a:prstGeom>
+        </p:spPr>
+      </p:pic>
     </p:spTree>
     <p:extLst>
       <p:ext uri="{BB962C8B-B14F-4D97-AF65-F5344CB8AC3E}">

</xml_diff>

<commit_message>
Update presentation and poster
</commit_message>
<xml_diff>
--- a/poster.pptx
+++ b/poster.pptx
@@ -584,7 +584,7 @@
           <a:p>
             <a:fld id="{CFC00A23-1BFE-4A7E-A521-7B2182A093B7}" type="datetimeFigureOut">
               <a:rPr lang="he-IL" smtClean="0"/>
-              <a:t>כ"ג/סיון/תשפ"ג</a:t>
+              <a:t>כ"ד/סיון/תשפ"ג</a:t>
             </a:fld>
             <a:endParaRPr lang="he-IL"/>
           </a:p>
@@ -983,7 +983,7 @@
           <a:p>
             <a:fld id="{449B0C55-391A-4BA7-BF59-0A370099757C}" type="datetimeFigureOut">
               <a:rPr lang="he-IL" smtClean="0"/>
-              <a:t>כ"ג/סיון/תשפ"ג</a:t>
+              <a:t>כ"ד/סיון/תשפ"ג</a:t>
             </a:fld>
             <a:endParaRPr lang="he-IL"/>
           </a:p>
@@ -1153,7 +1153,7 @@
           <a:p>
             <a:fld id="{449B0C55-391A-4BA7-BF59-0A370099757C}" type="datetimeFigureOut">
               <a:rPr lang="he-IL" smtClean="0"/>
-              <a:t>כ"ג/סיון/תשפ"ג</a:t>
+              <a:t>כ"ד/סיון/תשפ"ג</a:t>
             </a:fld>
             <a:endParaRPr lang="he-IL"/>
           </a:p>
@@ -1333,7 +1333,7 @@
           <a:p>
             <a:fld id="{449B0C55-391A-4BA7-BF59-0A370099757C}" type="datetimeFigureOut">
               <a:rPr lang="he-IL" smtClean="0"/>
-              <a:t>כ"ג/סיון/תשפ"ג</a:t>
+              <a:t>כ"ד/סיון/תשפ"ג</a:t>
             </a:fld>
             <a:endParaRPr lang="he-IL"/>
           </a:p>
@@ -1503,7 +1503,7 @@
           <a:p>
             <a:fld id="{449B0C55-391A-4BA7-BF59-0A370099757C}" type="datetimeFigureOut">
               <a:rPr lang="he-IL" smtClean="0"/>
-              <a:t>כ"ג/סיון/תשפ"ג</a:t>
+              <a:t>כ"ד/סיון/תשפ"ג</a:t>
             </a:fld>
             <a:endParaRPr lang="he-IL"/>
           </a:p>
@@ -1747,7 +1747,7 @@
           <a:p>
             <a:fld id="{449B0C55-391A-4BA7-BF59-0A370099757C}" type="datetimeFigureOut">
               <a:rPr lang="he-IL" smtClean="0"/>
-              <a:t>כ"ג/סיון/תשפ"ג</a:t>
+              <a:t>כ"ד/סיון/תשפ"ג</a:t>
             </a:fld>
             <a:endParaRPr lang="he-IL"/>
           </a:p>
@@ -1979,7 +1979,7 @@
           <a:p>
             <a:fld id="{449B0C55-391A-4BA7-BF59-0A370099757C}" type="datetimeFigureOut">
               <a:rPr lang="he-IL" smtClean="0"/>
-              <a:t>כ"ג/סיון/תשפ"ג</a:t>
+              <a:t>כ"ד/סיון/תשפ"ג</a:t>
             </a:fld>
             <a:endParaRPr lang="he-IL"/>
           </a:p>
@@ -2346,7 +2346,7 @@
           <a:p>
             <a:fld id="{449B0C55-391A-4BA7-BF59-0A370099757C}" type="datetimeFigureOut">
               <a:rPr lang="he-IL" smtClean="0"/>
-              <a:t>כ"ג/סיון/תשפ"ג</a:t>
+              <a:t>כ"ד/סיון/תשפ"ג</a:t>
             </a:fld>
             <a:endParaRPr lang="he-IL"/>
           </a:p>
@@ -2464,7 +2464,7 @@
           <a:p>
             <a:fld id="{449B0C55-391A-4BA7-BF59-0A370099757C}" type="datetimeFigureOut">
               <a:rPr lang="he-IL" smtClean="0"/>
-              <a:t>כ"ג/סיון/תשפ"ג</a:t>
+              <a:t>כ"ד/סיון/תשפ"ג</a:t>
             </a:fld>
             <a:endParaRPr lang="he-IL"/>
           </a:p>
@@ -2559,7 +2559,7 @@
           <a:p>
             <a:fld id="{449B0C55-391A-4BA7-BF59-0A370099757C}" type="datetimeFigureOut">
               <a:rPr lang="he-IL" smtClean="0"/>
-              <a:t>כ"ג/סיון/תשפ"ג</a:t>
+              <a:t>כ"ד/סיון/תשפ"ג</a:t>
             </a:fld>
             <a:endParaRPr lang="he-IL"/>
           </a:p>
@@ -2836,7 +2836,7 @@
           <a:p>
             <a:fld id="{449B0C55-391A-4BA7-BF59-0A370099757C}" type="datetimeFigureOut">
               <a:rPr lang="he-IL" smtClean="0"/>
-              <a:t>כ"ג/סיון/תשפ"ג</a:t>
+              <a:t>כ"ד/סיון/תשפ"ג</a:t>
             </a:fld>
             <a:endParaRPr lang="he-IL"/>
           </a:p>
@@ -3093,7 +3093,7 @@
           <a:p>
             <a:fld id="{449B0C55-391A-4BA7-BF59-0A370099757C}" type="datetimeFigureOut">
               <a:rPr lang="he-IL" smtClean="0"/>
-              <a:t>כ"ג/סיון/תשפ"ג</a:t>
+              <a:t>כ"ד/סיון/תשפ"ג</a:t>
             </a:fld>
             <a:endParaRPr lang="he-IL"/>
           </a:p>
@@ -3306,7 +3306,7 @@
           <a:p>
             <a:fld id="{449B0C55-391A-4BA7-BF59-0A370099757C}" type="datetimeFigureOut">
               <a:rPr lang="he-IL" smtClean="0"/>
-              <a:t>כ"ג/סיון/תשפ"ג</a:t>
+              <a:t>כ"ד/סיון/תשפ"ג</a:t>
             </a:fld>
             <a:endParaRPr lang="he-IL"/>
           </a:p>
@@ -3721,41 +3721,6 @@
       </p:grpSpPr>
       <p:pic>
         <p:nvPicPr>
-          <p:cNvPr id="3" name="Picture 2" descr="A picture containing text, line, screenshot, plot&#10;&#10;Description automatically generated">
-            <a:extLst>
-              <a:ext uri="{FF2B5EF4-FFF2-40B4-BE49-F238E27FC236}">
-                <a16:creationId xmlns:a16="http://schemas.microsoft.com/office/drawing/2014/main" id="{7DAC06D9-AB4C-46AB-6EF8-5DD1078F3A28}"/>
-              </a:ext>
-            </a:extLst>
-          </p:cNvPr>
-          <p:cNvPicPr>
-            <a:picLocks noChangeAspect="1"/>
-          </p:cNvPicPr>
-          <p:nvPr/>
-        </p:nvPicPr>
-        <p:blipFill rotWithShape="1">
-          <a:blip r:embed="rId2">
-            <a:extLst>
-              <a:ext uri="{28A0092B-C50C-407E-A947-70E740481C1C}">
-                <a14:useLocalDpi xmlns:a14="http://schemas.microsoft.com/office/drawing/2010/main" val="0"/>
-              </a:ext>
-            </a:extLst>
-          </a:blip>
-          <a:srcRect t="13089"/>
-          <a:stretch/>
-        </p:blipFill>
-        <p:spPr>
-          <a:xfrm>
-            <a:off x="14464856" y="20092860"/>
-            <a:ext cx="13145797" cy="8568758"/>
-          </a:xfrm>
-          <a:prstGeom prst="rect">
-            <a:avLst/>
-          </a:prstGeom>
-        </p:spPr>
-      </p:pic>
-      <p:pic>
-        <p:nvPicPr>
           <p:cNvPr id="15" name="Picture 14" descr="A picture containing text, lighthouse, screenshot, design&#10;&#10;Description automatically generated">
             <a:extLst>
               <a:ext uri="{FF2B5EF4-FFF2-40B4-BE49-F238E27FC236}">
@@ -3769,7 +3734,7 @@
           <p:nvPr/>
         </p:nvPicPr>
         <p:blipFill>
-          <a:blip r:embed="rId3">
+          <a:blip r:embed="rId2">
             <a:duotone>
               <a:schemeClr val="accent1">
                 <a:shade val="45000"/>
@@ -3780,7 +3745,7 @@
             <a:extLst>
               <a:ext uri="{BEBA8EAE-BF5A-486C-A8C5-ECC9F3942E4B}">
                 <a14:imgProps xmlns:a14="http://schemas.microsoft.com/office/drawing/2010/main">
-                  <a14:imgLayer r:embed="rId4">
+                  <a14:imgLayer r:embed="rId3">
                     <a14:imgEffect>
                       <a14:brightnessContrast bright="-40000" contrast="40000"/>
                     </a14:imgEffect>
@@ -4007,14 +3972,14 @@
           <p:nvPr>
             <p:extLst>
               <p:ext uri="{D42A27DB-BD31-4B8C-83A1-F6EECF244321}">
-                <p14:modId xmlns:p14="http://schemas.microsoft.com/office/powerpoint/2010/main" val="3424396155"/>
+                <p14:modId xmlns:p14="http://schemas.microsoft.com/office/powerpoint/2010/main" val="1977631116"/>
               </p:ext>
             </p:extLst>
           </p:nvPr>
         </p:nvGraphicFramePr>
         <p:xfrm>
-          <a:off x="83963" y="4882742"/>
-          <a:ext cx="13013148" cy="5149215"/>
+          <a:off x="83966" y="4882742"/>
+          <a:ext cx="14393908" cy="4417695"/>
         </p:xfrm>
         <a:graphic>
           <a:graphicData uri="http://schemas.openxmlformats.org/drawingml/2006/table">
@@ -4023,7 +3988,7 @@
                 <a:tableStyleId>{F5AB1C69-6EDB-4FF4-983F-18BD219EF322}</a:tableStyleId>
               </a:tblPr>
               <a:tblGrid>
-                <a:gridCol w="13013148">
+                <a:gridCol w="14393908">
                   <a:extLst>
                     <a:ext uri="{9D8B030D-6E8A-4147-A177-3AD203B41FA5}">
                       <a16:colId xmlns:a16="http://schemas.microsoft.com/office/drawing/2014/main" val="3747045786"/>
@@ -4248,14 +4213,14 @@
           <p:nvPr>
             <p:extLst>
               <p:ext uri="{D42A27DB-BD31-4B8C-83A1-F6EECF244321}">
-                <p14:modId xmlns:p14="http://schemas.microsoft.com/office/powerpoint/2010/main" val="208112830"/>
+                <p14:modId xmlns:p14="http://schemas.microsoft.com/office/powerpoint/2010/main" val="1051685087"/>
               </p:ext>
             </p:extLst>
           </p:nvPr>
         </p:nvGraphicFramePr>
         <p:xfrm>
-          <a:off x="0" y="9817535"/>
-          <a:ext cx="13013148" cy="2234917"/>
+          <a:off x="83966" y="9583255"/>
+          <a:ext cx="14393908" cy="2400017"/>
         </p:xfrm>
         <a:graphic>
           <a:graphicData uri="http://schemas.openxmlformats.org/drawingml/2006/table">
@@ -4264,7 +4229,7 @@
                 <a:tableStyleId>{F5AB1C69-6EDB-4FF4-983F-18BD219EF322}</a:tableStyleId>
               </a:tblPr>
               <a:tblGrid>
-                <a:gridCol w="13013148">
+                <a:gridCol w="14393908">
                   <a:extLst>
                     <a:ext uri="{9D8B030D-6E8A-4147-A177-3AD203B41FA5}">
                       <a16:colId xmlns:a16="http://schemas.microsoft.com/office/drawing/2014/main" val="3747045786"/>
@@ -4272,13 +4237,17 @@
                   </a:extLst>
                 </a:gridCol>
               </a:tblGrid>
-              <a:tr h="483077">
-                <a:tc>
-                  <a:txBody>
-                    <a:bodyPr/>
-                    <a:lstStyle/>
-                    <a:p>
-                      <a:pPr algn="ctr" rtl="0"/>
+              <a:tr h="743164">
+                <a:tc>
+                  <a:txBody>
+                    <a:bodyPr/>
+                    <a:lstStyle/>
+                    <a:p>
+                      <a:pPr algn="ctr" rtl="0">
+                        <a:lnSpc>
+                          <a:spcPct val="150000"/>
+                        </a:lnSpc>
+                      </a:pPr>
                       <a:r>
                         <a:rPr lang="en-US" sz="3200" dirty="0">
                           <a:latin typeface="+mj-lt"/>
@@ -4434,14 +4403,14 @@
           <p:nvPr>
             <p:extLst>
               <p:ext uri="{D42A27DB-BD31-4B8C-83A1-F6EECF244321}">
-                <p14:modId xmlns:p14="http://schemas.microsoft.com/office/powerpoint/2010/main" val="1085844567"/>
+                <p14:modId xmlns:p14="http://schemas.microsoft.com/office/powerpoint/2010/main" val="1106619013"/>
               </p:ext>
             </p:extLst>
           </p:nvPr>
         </p:nvGraphicFramePr>
         <p:xfrm>
-          <a:off x="13360399" y="4892092"/>
-          <a:ext cx="16075199" cy="25474217"/>
+          <a:off x="14722110" y="4877883"/>
+          <a:ext cx="14675817" cy="24907044"/>
         </p:xfrm>
         <a:graphic>
           <a:graphicData uri="http://schemas.openxmlformats.org/drawingml/2006/table">
@@ -4450,7 +4419,7 @@
                 <a:tableStyleId>{F5AB1C69-6EDB-4FF4-983F-18BD219EF322}</a:tableStyleId>
               </a:tblPr>
               <a:tblGrid>
-                <a:gridCol w="16075199">
+                <a:gridCol w="14675817">
                   <a:extLst>
                     <a:ext uri="{9D8B030D-6E8A-4147-A177-3AD203B41FA5}">
                       <a16:colId xmlns:a16="http://schemas.microsoft.com/office/drawing/2014/main" val="3747045786"/>
@@ -4458,7 +4427,7 @@
                   </a:extLst>
                 </a:gridCol>
               </a:tblGrid>
-              <a:tr h="586662">
+              <a:tr h="751009">
                 <a:tc>
                   <a:txBody>
                     <a:bodyPr/>
@@ -4476,7 +4445,7 @@
                       </a:endParaRPr>
                     </a:p>
                   </a:txBody>
-                  <a:tcPr anchor="ctr">
+                  <a:tcPr anchor="b">
                     <a:lnL w="38100" cap="flat" cmpd="sng" algn="ctr">
                       <a:solidFill>
                         <a:schemeClr val="bg1"/>
@@ -4521,7 +4490,7 @@
                   </a:ext>
                 </a:extLst>
               </a:tr>
-              <a:tr h="23182864">
+              <a:tr h="23487304">
                 <a:tc>
                   <a:txBody>
                     <a:bodyPr/>
@@ -4543,7 +4512,18 @@
                           <a:ea typeface="+mn-ea"/>
                           <a:cs typeface="+mn-cs"/>
                         </a:rPr>
-                        <a:t> Results of the Second-year - Logistic regression Vs. GAM model :  </a:t>
+                        <a:t> </a:t>
+                      </a:r>
+                      <a:r>
+                        <a:rPr lang="en-US" sz="3200" kern="1200" dirty="0">
+                          <a:solidFill>
+                            <a:schemeClr val="dk1"/>
+                          </a:solidFill>
+                          <a:latin typeface="Calibri Light" panose="020F0302020204030204" pitchFamily="34" charset="0"/>
+                          <a:ea typeface="+mn-ea"/>
+                          <a:cs typeface="Calibri Light" panose="020F0302020204030204" pitchFamily="34" charset="0"/>
+                        </a:rPr>
+                        <a:t>Results of the Second-year - Logistic regression Vs. GAM model :  </a:t>
                       </a:r>
                     </a:p>
                     <a:p>
@@ -4840,8 +4820,31 @@
                         <a:lnSpc>
                           <a:spcPct val="150000"/>
                         </a:lnSpc>
+                        <a:spcBef>
+                          <a:spcPts val="0"/>
+                        </a:spcBef>
                         <a:buFont typeface="Arial" panose="020B0604020202020204" pitchFamily="34" charset="0"/>
                         <a:buNone/>
+                      </a:pPr>
+                      <a:r>
+                        <a:rPr lang="en-US" sz="3200" kern="1200" dirty="0">
+                          <a:solidFill>
+                            <a:schemeClr val="dk1"/>
+                          </a:solidFill>
+                          <a:latin typeface="Calibri Light" panose="020F0302020204030204" pitchFamily="34" charset="0"/>
+                          <a:ea typeface="+mn-ea"/>
+                          <a:cs typeface="Calibri Light" panose="020F0302020204030204" pitchFamily="34" charset="0"/>
+                        </a:rPr>
+                        <a:t>Prediction to the probability of a baby getting an Atopic disease depending on the date of birth:  </a:t>
+                      </a:r>
+                    </a:p>
+                    <a:p>
+                      <a:pPr marL="457200" indent="-457200" algn="l" rtl="0">
+                        <a:lnSpc>
+                          <a:spcPct val="150000"/>
+                        </a:lnSpc>
+                        <a:buFont typeface="Arial" panose="020B0604020202020204" pitchFamily="34" charset="0"/>
+                        <a:buChar char="•"/>
                       </a:pPr>
                       <a:endParaRPr lang="en-US" sz="3200" kern="1200" dirty="0">
                         <a:solidFill>
@@ -4851,26 +4854,6 @@
                         <a:ea typeface="+mn-ea"/>
                         <a:cs typeface="+mn-cs"/>
                       </a:endParaRPr>
-                    </a:p>
-                    <a:p>
-                      <a:pPr marL="0" indent="0" algn="l" rtl="0">
-                        <a:lnSpc>
-                          <a:spcPct val="150000"/>
-                        </a:lnSpc>
-                        <a:buFont typeface="Arial" panose="020B0604020202020204" pitchFamily="34" charset="0"/>
-                        <a:buNone/>
-                      </a:pPr>
-                      <a:r>
-                        <a:rPr lang="en-US" sz="3200" kern="1200" dirty="0">
-                          <a:solidFill>
-                            <a:schemeClr val="dk1"/>
-                          </a:solidFill>
-                          <a:latin typeface="+mn-lt"/>
-                          <a:ea typeface="+mn-ea"/>
-                          <a:cs typeface="+mn-cs"/>
-                        </a:rPr>
-                        <a:t>Probability of a baby getting an Atopic disease in the second year of his life: </a:t>
-                      </a:r>
                     </a:p>
                     <a:p>
                       <a:pPr marL="0" indent="0" algn="l" rtl="0">
@@ -4901,43 +4884,9 @@
                         <a:solidFill>
                           <a:schemeClr val="dk1"/>
                         </a:solidFill>
-                        <a:latin typeface="+mn-lt"/>
+                        <a:latin typeface="Calibri Light" panose="020F0302020204030204" pitchFamily="34" charset="0"/>
                         <a:ea typeface="+mn-ea"/>
-                        <a:cs typeface="+mn-cs"/>
-                      </a:endParaRPr>
-                    </a:p>
-                    <a:p>
-                      <a:pPr marL="0" indent="0" algn="l" rtl="0">
-                        <a:lnSpc>
-                          <a:spcPct val="150000"/>
-                        </a:lnSpc>
-                        <a:buFont typeface="Arial" panose="020B0604020202020204" pitchFamily="34" charset="0"/>
-                        <a:buNone/>
-                      </a:pPr>
-                      <a:endParaRPr lang="en-US" sz="3200" kern="1200" dirty="0">
-                        <a:solidFill>
-                          <a:schemeClr val="dk1"/>
-                        </a:solidFill>
-                        <a:latin typeface="+mn-lt"/>
-                        <a:ea typeface="+mn-ea"/>
-                        <a:cs typeface="+mn-cs"/>
-                      </a:endParaRPr>
-                    </a:p>
-                    <a:p>
-                      <a:pPr marL="0" indent="0" algn="l" rtl="0">
-                        <a:lnSpc>
-                          <a:spcPct val="150000"/>
-                        </a:lnSpc>
-                        <a:buFont typeface="Arial" panose="020B0604020202020204" pitchFamily="34" charset="0"/>
-                        <a:buNone/>
-                      </a:pPr>
-                      <a:endParaRPr lang="en-US" sz="3200" kern="1200" dirty="0">
-                        <a:solidFill>
-                          <a:schemeClr val="dk1"/>
-                        </a:solidFill>
-                        <a:latin typeface="+mn-lt"/>
-                        <a:ea typeface="+mn-ea"/>
-                        <a:cs typeface="+mn-cs"/>
+                        <a:cs typeface="Calibri Light" panose="020F0302020204030204" pitchFamily="34" charset="0"/>
                       </a:endParaRPr>
                     </a:p>
                     <a:p>
@@ -5184,14 +5133,14 @@
           <p:nvPr>
             <p:extLst>
               <p:ext uri="{D42A27DB-BD31-4B8C-83A1-F6EECF244321}">
-                <p14:modId xmlns:p14="http://schemas.microsoft.com/office/powerpoint/2010/main" val="288412767"/>
+                <p14:modId xmlns:p14="http://schemas.microsoft.com/office/powerpoint/2010/main" val="3615367705"/>
               </p:ext>
             </p:extLst>
           </p:nvPr>
         </p:nvGraphicFramePr>
         <p:xfrm>
-          <a:off x="83963" y="12272578"/>
-          <a:ext cx="12623800" cy="12607451"/>
+          <a:off x="64869" y="12208964"/>
+          <a:ext cx="14392800" cy="12498587"/>
         </p:xfrm>
         <a:graphic>
           <a:graphicData uri="http://schemas.openxmlformats.org/drawingml/2006/table">
@@ -5200,7 +5149,7 @@
                 <a:tableStyleId>{F5AB1C69-6EDB-4FF4-983F-18BD219EF322}</a:tableStyleId>
               </a:tblPr>
               <a:tblGrid>
-                <a:gridCol w="12623800">
+                <a:gridCol w="14392800">
                   <a:extLst>
                     <a:ext uri="{9D8B030D-6E8A-4147-A177-3AD203B41FA5}">
                       <a16:colId xmlns:a16="http://schemas.microsoft.com/office/drawing/2014/main" val="3747045786"/>
@@ -5208,7 +5157,7 @@
                   </a:extLst>
                 </a:gridCol>
               </a:tblGrid>
-              <a:tr h="856259">
+              <a:tr h="0">
                 <a:tc>
                   <a:txBody>
                     <a:bodyPr/>
@@ -5300,9 +5249,9 @@
                           <a:solidFill>
                             <a:schemeClr val="dk1"/>
                           </a:solidFill>
-                          <a:latin typeface="+mj-lt"/>
+                          <a:latin typeface="Calibri Light" panose="020F0302020204030204" pitchFamily="34" charset="0"/>
                           <a:ea typeface="+mn-ea"/>
-                          <a:cs typeface="+mn-cs"/>
+                          <a:cs typeface="Calibri Light" panose="020F0302020204030204" pitchFamily="34" charset="0"/>
                         </a:rPr>
                         <a:t>Data was collected starting from November 2018. </a:t>
                       </a:r>
@@ -5320,9 +5269,9 @@
                           <a:solidFill>
                             <a:schemeClr val="dk1"/>
                           </a:solidFill>
-                          <a:latin typeface="+mj-lt"/>
+                          <a:latin typeface="Calibri Light" panose="020F0302020204030204" pitchFamily="34" charset="0"/>
                           <a:ea typeface="+mn-ea"/>
-                          <a:cs typeface="+mn-cs"/>
+                          <a:cs typeface="Calibri Light" panose="020F0302020204030204" pitchFamily="34" charset="0"/>
                         </a:rPr>
                         <a:t>Experiment participants: Hebrew speaking parents from all sectors, close to due date with normal birth weight and no defects. </a:t>
                       </a:r>
@@ -5340,9 +5289,9 @@
                           <a:solidFill>
                             <a:schemeClr val="dk1"/>
                           </a:solidFill>
-                          <a:latin typeface="+mj-lt"/>
+                          <a:latin typeface="Calibri Light" panose="020F0302020204030204" pitchFamily="34" charset="0"/>
                           <a:ea typeface="+mn-ea"/>
-                          <a:cs typeface="+mn-cs"/>
+                          <a:cs typeface="Calibri Light" panose="020F0302020204030204" pitchFamily="34" charset="0"/>
                         </a:rPr>
                         <a:t>At predetermined intervals, parents were sent questionnaires to c</a:t>
                       </a:r>
@@ -5360,9 +5309,9 @@
                           <a:solidFill>
                             <a:schemeClr val="dk1"/>
                           </a:solidFill>
-                          <a:latin typeface="+mj-lt"/>
+                          <a:latin typeface="Calibri Light" panose="020F0302020204030204" pitchFamily="34" charset="0"/>
                           <a:ea typeface="+mn-ea"/>
-                          <a:cs typeface="+mn-cs"/>
+                          <a:cs typeface="Calibri Light" panose="020F0302020204030204" pitchFamily="34" charset="0"/>
                         </a:rPr>
                         <a:t>Characteristics of the babies, their families, and their environment were collected.</a:t>
                       </a:r>
@@ -5371,9 +5320,9 @@
                           <a:solidFill>
                             <a:schemeClr val="dk1"/>
                           </a:solidFill>
-                          <a:latin typeface="+mj-lt"/>
+                          <a:latin typeface="Calibri Light" panose="020F0302020204030204" pitchFamily="34" charset="0"/>
                           <a:ea typeface="+mn-ea"/>
-                          <a:cs typeface="+mn-cs"/>
+                          <a:cs typeface="Calibri Light" panose="020F0302020204030204" pitchFamily="34" charset="0"/>
                         </a:rPr>
                       </a:br>
                       <a:r>
@@ -5381,9 +5330,9 @@
                           <a:solidFill>
                             <a:schemeClr val="dk1"/>
                           </a:solidFill>
-                          <a:latin typeface="+mj-lt"/>
+                          <a:latin typeface="Calibri Light" panose="020F0302020204030204" pitchFamily="34" charset="0"/>
                           <a:ea typeface="+mn-ea"/>
-                          <a:cs typeface="+mn-cs"/>
+                          <a:cs typeface="Calibri Light" panose="020F0302020204030204" pitchFamily="34" charset="0"/>
                         </a:rPr>
                         <a:t>Development of utopian diseases among babies was examined during experiment. </a:t>
                       </a:r>
@@ -5411,9 +5360,9 @@
                           <a:solidFill>
                             <a:schemeClr val="dk1"/>
                           </a:solidFill>
-                          <a:latin typeface="+mj-lt"/>
+                          <a:latin typeface="Calibri Light" panose="020F0302020204030204" pitchFamily="34" charset="0"/>
                           <a:ea typeface="+mn-ea"/>
-                          <a:cs typeface="+mn-cs"/>
+                          <a:cs typeface="Calibri Light" panose="020F0302020204030204" pitchFamily="34" charset="0"/>
                         </a:rPr>
                         <a:t>The babies were divided into 4 groups according to the date of birth and main landmarks during the pandemic</a:t>
                       </a:r>
@@ -5421,9 +5370,9 @@
                         <a:solidFill>
                           <a:schemeClr val="dk1"/>
                         </a:solidFill>
-                        <a:latin typeface="+mj-lt"/>
+                        <a:latin typeface="Calibri Light" panose="020F0302020204030204" pitchFamily="34" charset="0"/>
                         <a:ea typeface="+mn-ea"/>
-                        <a:cs typeface="+mn-cs"/>
+                        <a:cs typeface="Calibri Light" panose="020F0302020204030204" pitchFamily="34" charset="0"/>
                       </a:endParaRPr>
                     </a:p>
                     <a:p>
@@ -5551,14 +5500,14 @@
           <p:nvPr>
             <p:extLst>
               <p:ext uri="{D42A27DB-BD31-4B8C-83A1-F6EECF244321}">
-                <p14:modId xmlns:p14="http://schemas.microsoft.com/office/powerpoint/2010/main" val="3666064296"/>
+                <p14:modId xmlns:p14="http://schemas.microsoft.com/office/powerpoint/2010/main" val="294106235"/>
               </p:ext>
             </p:extLst>
           </p:nvPr>
         </p:nvGraphicFramePr>
         <p:xfrm>
-          <a:off x="41176" y="26754297"/>
-          <a:ext cx="11912800" cy="7813783"/>
+          <a:off x="37671" y="24933243"/>
+          <a:ext cx="14392800" cy="8078470"/>
         </p:xfrm>
         <a:graphic>
           <a:graphicData uri="http://schemas.openxmlformats.org/drawingml/2006/table">
@@ -5567,7 +5516,7 @@
                 <a:tableStyleId>{F5AB1C69-6EDB-4FF4-983F-18BD219EF322}</a:tableStyleId>
               </a:tblPr>
               <a:tblGrid>
-                <a:gridCol w="11912800">
+                <a:gridCol w="14392800">
                   <a:extLst>
                     <a:ext uri="{9D8B030D-6E8A-4147-A177-3AD203B41FA5}">
                       <a16:colId xmlns:a16="http://schemas.microsoft.com/office/drawing/2014/main" val="3747045786"/>
@@ -5575,7 +5524,7 @@
                   </a:extLst>
                 </a:gridCol>
               </a:tblGrid>
-              <a:tr h="649657">
+              <a:tr h="734639">
                 <a:tc>
                   <a:txBody>
                     <a:bodyPr/>
@@ -5589,12 +5538,12 @@
                         <a:buNone/>
                       </a:pPr>
                       <a:r>
-                        <a:rPr lang="en-US" sz="2800" dirty="0">
+                        <a:rPr lang="en-US" sz="3200" dirty="0">
                           <a:latin typeface="+mj-lt"/>
                         </a:rPr>
                         <a:t>Experimental Design</a:t>
                       </a:r>
-                      <a:endParaRPr lang="en-US" sz="2800" kern="1200" dirty="0">
+                      <a:endParaRPr lang="en-US" sz="3200" kern="1200" dirty="0">
                         <a:solidFill>
                           <a:schemeClr val="dk1"/>
                         </a:solidFill>
@@ -5663,7 +5612,7 @@
                         <a:buChar char="•"/>
                       </a:pPr>
                       <a:r>
-                        <a:rPr lang="en-US" sz="2800" b="1" kern="1200" dirty="0">
+                        <a:rPr lang="en-US" sz="3200" b="1" kern="1200" dirty="0">
                           <a:solidFill>
                             <a:schemeClr val="dk1"/>
                           </a:solidFill>
@@ -5674,7 +5623,7 @@
                         <a:t>Logistic Regression Model </a:t>
                       </a:r>
                       <a:r>
-                        <a:rPr lang="en-US" sz="2800" kern="1200" dirty="0">
+                        <a:rPr lang="en-US" sz="3200" kern="1200" dirty="0">
                           <a:solidFill>
                             <a:schemeClr val="dk1"/>
                           </a:solidFill>
@@ -5693,7 +5642,7 @@
                         <a:buFont typeface="Arial" panose="020B0604020202020204" pitchFamily="34" charset="0"/>
                         <a:buChar char="•"/>
                       </a:pPr>
-                      <a:endParaRPr lang="en-US" sz="2800" kern="1200" dirty="0">
+                      <a:endParaRPr lang="en-US" sz="3200" kern="1200" dirty="0">
                         <a:solidFill>
                           <a:schemeClr val="dk1"/>
                         </a:solidFill>
@@ -5711,7 +5660,7 @@
                         <a:buChar char="•"/>
                       </a:pPr>
                       <a:r>
-                        <a:rPr lang="en-US" sz="2800" b="1" kern="1200" dirty="0">
+                        <a:rPr lang="en-US" sz="3200" b="1" kern="1200" dirty="0">
                           <a:solidFill>
                             <a:schemeClr val="dk1"/>
                           </a:solidFill>
@@ -5722,7 +5671,7 @@
                         <a:t>Generalized Additive Model: </a:t>
                       </a:r>
                       <a:r>
-                        <a:rPr lang="en-US" sz="2800" b="0" kern="1200" dirty="0">
+                        <a:rPr lang="en-US" sz="3200" b="0" kern="1200" dirty="0">
                           <a:solidFill>
                             <a:schemeClr val="dk1"/>
                           </a:solidFill>
@@ -5733,7 +5682,7 @@
                         <a:t>GAM model </a:t>
                       </a:r>
                       <a:r>
-                        <a:rPr lang="en-US" sz="2800" kern="1200" dirty="0">
+                        <a:rPr lang="en-US" sz="3200" kern="1200" dirty="0">
                           <a:solidFill>
                             <a:schemeClr val="dk1"/>
                           </a:solidFill>
@@ -5818,14 +5767,14 @@
           <p:nvPr>
             <p:extLst>
               <p:ext uri="{D42A27DB-BD31-4B8C-83A1-F6EECF244321}">
-                <p14:modId xmlns:p14="http://schemas.microsoft.com/office/powerpoint/2010/main" val="1682231514"/>
+                <p14:modId xmlns:p14="http://schemas.microsoft.com/office/powerpoint/2010/main" val="2694900852"/>
               </p:ext>
             </p:extLst>
           </p:nvPr>
         </p:nvGraphicFramePr>
         <p:xfrm>
-          <a:off x="12062298" y="28661618"/>
-          <a:ext cx="17457265" cy="5862577"/>
+          <a:off x="14722110" y="29991147"/>
+          <a:ext cx="14759782" cy="4332754"/>
         </p:xfrm>
         <a:graphic>
           <a:graphicData uri="http://schemas.openxmlformats.org/drawingml/2006/table">
@@ -5834,7 +5783,7 @@
                 <a:tableStyleId>{F5AB1C69-6EDB-4FF4-983F-18BD219EF322}</a:tableStyleId>
               </a:tblPr>
               <a:tblGrid>
-                <a:gridCol w="17457265">
+                <a:gridCol w="14759782">
                   <a:extLst>
                     <a:ext uri="{9D8B030D-6E8A-4147-A177-3AD203B41FA5}">
                       <a16:colId xmlns:a16="http://schemas.microsoft.com/office/drawing/2014/main" val="3747045786"/>
@@ -5842,7 +5791,7 @@
                   </a:extLst>
                 </a:gridCol>
               </a:tblGrid>
-              <a:tr h="867345">
+              <a:tr h="734911">
                 <a:tc>
                   <a:txBody>
                     <a:bodyPr/>
@@ -5905,7 +5854,7 @@
                   </a:ext>
                 </a:extLst>
               </a:tr>
-              <a:tr h="4995232">
+              <a:tr h="3597843">
                 <a:tc>
                   <a:txBody>
                     <a:bodyPr/>
@@ -5986,50 +5935,6 @@
           </a:graphicData>
         </a:graphic>
       </p:graphicFrame>
-      <p:sp>
-        <p:nvSpPr>
-          <p:cNvPr id="11" name="TextBox 10">
-            <a:extLst>
-              <a:ext uri="{FF2B5EF4-FFF2-40B4-BE49-F238E27FC236}">
-                <a16:creationId xmlns:a16="http://schemas.microsoft.com/office/drawing/2014/main" id="{5B2E3B24-2FD4-D155-947E-C24B67FC83A3}"/>
-              </a:ext>
-            </a:extLst>
-          </p:cNvPr>
-          <p:cNvSpPr txBox="1"/>
-          <p:nvPr/>
-        </p:nvSpPr>
-        <p:spPr>
-          <a:xfrm>
-            <a:off x="23342600" y="12696791"/>
-            <a:ext cx="1625600" cy="707886"/>
-          </a:xfrm>
-          <a:prstGeom prst="rect">
-            <a:avLst/>
-          </a:prstGeom>
-          <a:noFill/>
-        </p:spPr>
-        <p:txBody>
-          <a:bodyPr wrap="square">
-            <a:spAutoFit/>
-          </a:bodyPr>
-          <a:lstStyle/>
-          <a:p>
-            <a:pPr algn="ctr"/>
-            <a:r>
-              <a:rPr lang="en-US" sz="2000" b="1" kern="1200" dirty="0">
-                <a:solidFill>
-                  <a:schemeClr val="dk1"/>
-                </a:solidFill>
-                <a:latin typeface="+mj-lt"/>
-                <a:ea typeface="+mn-ea"/>
-                <a:cs typeface="+mn-cs"/>
-              </a:rPr>
-              <a:t>See graph below</a:t>
-            </a:r>
-            <a:endParaRPr lang="en-US" sz="2000" b="1" dirty="0"/>
-          </a:p>
-        </p:txBody>
-      </p:sp>
       <p:graphicFrame>
         <p:nvGraphicFramePr>
           <p:cNvPr id="8" name="Table 7">
@@ -6045,13 +5950,13 @@
           <p:nvPr>
             <p:extLst>
               <p:ext uri="{D42A27DB-BD31-4B8C-83A1-F6EECF244321}">
-                <p14:modId xmlns:p14="http://schemas.microsoft.com/office/powerpoint/2010/main" val="892441648"/>
+                <p14:modId xmlns:p14="http://schemas.microsoft.com/office/powerpoint/2010/main" val="973883131"/>
               </p:ext>
             </p:extLst>
           </p:nvPr>
         </p:nvGraphicFramePr>
         <p:xfrm>
-          <a:off x="771799" y="22863412"/>
+          <a:off x="1637048" y="19802726"/>
           <a:ext cx="10451554" cy="3416083"/>
         </p:xfrm>
         <a:graphic>
@@ -6724,70 +6629,70 @@
           <p:nvPr>
             <p:extLst>
               <p:ext uri="{D42A27DB-BD31-4B8C-83A1-F6EECF244321}">
-                <p14:modId xmlns:p14="http://schemas.microsoft.com/office/powerpoint/2010/main" val="4097028160"/>
+                <p14:modId xmlns:p14="http://schemas.microsoft.com/office/powerpoint/2010/main" val="4031527223"/>
               </p:ext>
             </p:extLst>
           </p:nvPr>
         </p:nvGraphicFramePr>
         <p:xfrm>
-          <a:off x="13749746" y="6316995"/>
-          <a:ext cx="15422564" cy="12517653"/>
+          <a:off x="15057048" y="6408944"/>
+          <a:ext cx="14081275" cy="12160429"/>
         </p:xfrm>
         <a:graphic>
           <a:graphicData uri="http://schemas.openxmlformats.org/drawingml/2006/table">
             <a:tbl>
               <a:tblPr/>
               <a:tblGrid>
-                <a:gridCol w="4943115">
+                <a:gridCol w="5337545">
                   <a:extLst>
                     <a:ext uri="{9D8B030D-6E8A-4147-A177-3AD203B41FA5}">
                       <a16:colId xmlns:a16="http://schemas.microsoft.com/office/drawing/2014/main" val="1687023719"/>
                     </a:ext>
                   </a:extLst>
                 </a:gridCol>
-                <a:gridCol w="1865135">
+                <a:gridCol w="1637414">
                   <a:extLst>
                     <a:ext uri="{9D8B030D-6E8A-4147-A177-3AD203B41FA5}">
                       <a16:colId xmlns:a16="http://schemas.microsoft.com/office/drawing/2014/main" val="1042797128"/>
                     </a:ext>
                   </a:extLst>
                 </a:gridCol>
-                <a:gridCol w="1010615">
+                <a:gridCol w="1080000">
                   <a:extLst>
                     <a:ext uri="{9D8B030D-6E8A-4147-A177-3AD203B41FA5}">
                       <a16:colId xmlns:a16="http://schemas.microsoft.com/office/drawing/2014/main" val="2733175140"/>
                     </a:ext>
                   </a:extLst>
                 </a:gridCol>
-                <a:gridCol w="1053919">
+                <a:gridCol w="1080000">
                   <a:extLst>
                     <a:ext uri="{9D8B030D-6E8A-4147-A177-3AD203B41FA5}">
                       <a16:colId xmlns:a16="http://schemas.microsoft.com/office/drawing/2014/main" val="1020968963"/>
                     </a:ext>
                   </a:extLst>
                 </a:gridCol>
-                <a:gridCol w="1593974">
+                <a:gridCol w="1148316">
                   <a:extLst>
                     <a:ext uri="{9D8B030D-6E8A-4147-A177-3AD203B41FA5}">
                       <a16:colId xmlns:a16="http://schemas.microsoft.com/office/drawing/2014/main" val="3302576519"/>
                     </a:ext>
                   </a:extLst>
                 </a:gridCol>
-                <a:gridCol w="2295882">
+                <a:gridCol w="1638000">
                   <a:extLst>
                     <a:ext uri="{9D8B030D-6E8A-4147-A177-3AD203B41FA5}">
                       <a16:colId xmlns:a16="http://schemas.microsoft.com/office/drawing/2014/main" val="1835266576"/>
                     </a:ext>
                   </a:extLst>
                 </a:gridCol>
-                <a:gridCol w="1390310">
+                <a:gridCol w="1080000">
                   <a:extLst>
                     <a:ext uri="{9D8B030D-6E8A-4147-A177-3AD203B41FA5}">
                       <a16:colId xmlns:a16="http://schemas.microsoft.com/office/drawing/2014/main" val="1266378933"/>
                     </a:ext>
                   </a:extLst>
                 </a:gridCol>
-                <a:gridCol w="1269614">
+                <a:gridCol w="1080000">
                   <a:extLst>
                     <a:ext uri="{9D8B030D-6E8A-4147-A177-3AD203B41FA5}">
                       <a16:colId xmlns:a16="http://schemas.microsoft.com/office/drawing/2014/main" val="4255070870"/>
@@ -6864,7 +6769,7 @@
                     <a:p>
                       <a:pPr algn="ctr" fontAlgn="ctr"/>
                       <a:r>
-                        <a:rPr lang="en-US" sz="3200" b="1" i="0" u="none" strike="noStrike">
+                        <a:rPr lang="en-US" sz="3200" b="1" i="0" u="none" strike="noStrike" dirty="0">
                           <a:solidFill>
                             <a:srgbClr val="000000"/>
                           </a:solidFill>
@@ -6952,7 +6857,7 @@
                     <a:p>
                       <a:pPr algn="ctr" fontAlgn="ctr"/>
                       <a:r>
-                        <a:rPr lang="en-US" sz="3200" b="1" i="0" u="none" strike="noStrike">
+                        <a:rPr lang="en-US" sz="3200" b="1" i="0" u="none" strike="noStrike" dirty="0">
                           <a:solidFill>
                             <a:srgbClr val="000000"/>
                           </a:solidFill>
@@ -7096,15 +7001,15 @@
                     <a:p>
                       <a:pPr algn="ctr" fontAlgn="ctr"/>
                       <a:r>
-                        <a:rPr lang="en-US" sz="3200" b="0" i="0" u="none" strike="noStrike">
-                          <a:solidFill>
-                            <a:srgbClr val="000000"/>
-                          </a:solidFill>
-                          <a:effectLst/>
-                          <a:latin typeface="Calibri Light" panose="020F0302020204030204" pitchFamily="34" charset="0"/>
-                          <a:cs typeface="Calibri Light" panose="020F0302020204030204" pitchFamily="34" charset="0"/>
-                        </a:rPr>
-                        <a:t>Std</a:t>
+                        <a:rPr lang="en-US" sz="3200" b="0" i="0" u="none" strike="noStrike" dirty="0">
+                          <a:solidFill>
+                            <a:srgbClr val="000000"/>
+                          </a:solidFill>
+                          <a:effectLst/>
+                          <a:latin typeface="Calibri Light" panose="020F0302020204030204" pitchFamily="34" charset="0"/>
+                          <a:cs typeface="Calibri Light" panose="020F0302020204030204" pitchFamily="34" charset="0"/>
+                        </a:rPr>
+                        <a:t>Std. Error</a:t>
                       </a:r>
                     </a:p>
                   </a:txBody>
@@ -7472,7 +7377,7 @@
                     <a:p>
                       <a:pPr algn="ctr" fontAlgn="ctr"/>
                       <a:r>
-                        <a:rPr lang="he-IL" sz="3200" b="0" i="0" u="none" strike="noStrike">
+                        <a:rPr lang="he-IL" sz="3200" b="0" i="0" u="none" strike="noStrike" dirty="0">
                           <a:solidFill>
                             <a:srgbClr val="000000"/>
                           </a:solidFill>
@@ -7705,7 +7610,7 @@
                     <a:p>
                       <a:pPr algn="ctr" fontAlgn="ctr"/>
                       <a:r>
-                        <a:rPr lang="he-IL" sz="3200" b="0" i="0" u="none" strike="noStrike">
+                        <a:rPr lang="he-IL" sz="3200" b="0" i="0" u="none" strike="noStrike" dirty="0">
                           <a:solidFill>
                             <a:srgbClr val="000000"/>
                           </a:solidFill>
@@ -7748,7 +7653,7 @@
                     <a:p>
                       <a:pPr algn="ctr" fontAlgn="ctr"/>
                       <a:r>
-                        <a:rPr lang="he-IL" sz="3200" b="0" i="0" u="none" strike="noStrike">
+                        <a:rPr lang="he-IL" sz="3200" b="0" i="0" u="none" strike="noStrike" dirty="0">
                           <a:solidFill>
                             <a:srgbClr val="000000"/>
                           </a:solidFill>
@@ -8235,7 +8140,7 @@
                     <a:p>
                       <a:pPr algn="ctr" fontAlgn="ctr"/>
                       <a:r>
-                        <a:rPr lang="he-IL" sz="3200" b="0" i="0" u="none" strike="noStrike">
+                        <a:rPr lang="he-IL" sz="3200" b="0" i="0" u="none" strike="noStrike" dirty="0">
                           <a:solidFill>
                             <a:srgbClr val="000000"/>
                           </a:solidFill>
@@ -8315,7 +8220,7 @@
                     <a:p>
                       <a:pPr algn="ctr" fontAlgn="ctr"/>
                       <a:r>
-                        <a:rPr lang="he-IL" sz="3200" b="0" i="0" u="none" strike="noStrike">
+                        <a:rPr lang="he-IL" sz="3200" b="0" i="0" u="none" strike="noStrike" dirty="0">
                           <a:solidFill>
                             <a:srgbClr val="000000"/>
                           </a:solidFill>
@@ -8438,7 +8343,7 @@
                     <a:p>
                       <a:pPr algn="ctr" fontAlgn="ctr"/>
                       <a:r>
-                        <a:rPr lang="he-IL" sz="3200" b="0" i="0" u="none" strike="noStrike">
+                        <a:rPr lang="he-IL" sz="3200" b="0" i="0" u="none" strike="noStrike" dirty="0">
                           <a:solidFill>
                             <a:srgbClr val="000000"/>
                           </a:solidFill>
@@ -8899,7 +8804,7 @@
                   </a:ext>
                 </a:extLst>
               </a:tr>
-              <a:tr h="494110">
+              <a:tr h="522902">
                 <a:tc>
                   <a:txBody>
                     <a:bodyPr/>
@@ -8956,7 +8861,7 @@
                     <a:p>
                       <a:pPr algn="ctr" fontAlgn="ctr"/>
                       <a:r>
-                        <a:rPr lang="he-IL" sz="3200" b="0" i="0" u="none" strike="noStrike">
+                        <a:rPr lang="he-IL" sz="3200" b="0" i="0" u="none" strike="noStrike" dirty="0">
                           <a:solidFill>
                             <a:srgbClr val="000000"/>
                           </a:solidFill>
@@ -9116,7 +9021,7 @@
                     <a:p>
                       <a:pPr algn="ctr" fontAlgn="ctr"/>
                       <a:r>
-                        <a:rPr lang="he-IL" sz="3200" b="0" i="0" u="none" strike="noStrike">
+                        <a:rPr lang="he-IL" sz="3200" b="0" i="0" u="none" strike="noStrike" dirty="0">
                           <a:solidFill>
                             <a:srgbClr val="000000"/>
                           </a:solidFill>
@@ -9338,7 +9243,7 @@
                     <a:p>
                       <a:pPr algn="ctr" fontAlgn="ctr"/>
                       <a:r>
-                        <a:rPr lang="he-IL" sz="3200" b="0" i="0" u="none" strike="noStrike">
+                        <a:rPr lang="he-IL" sz="3200" b="0" i="0" u="none" strike="noStrike" dirty="0">
                           <a:solidFill>
                             <a:srgbClr val="000000"/>
                           </a:solidFill>
@@ -9498,7 +9403,7 @@
                     <a:p>
                       <a:pPr algn="ctr" fontAlgn="ctr"/>
                       <a:r>
-                        <a:rPr lang="he-IL" sz="3200" b="0" i="0" u="none" strike="noStrike">
+                        <a:rPr lang="he-IL" sz="3200" b="0" i="0" u="none" strike="noStrike" dirty="0">
                           <a:solidFill>
                             <a:srgbClr val="000000"/>
                           </a:solidFill>
@@ -9634,7 +9539,7 @@
                     <a:p>
                       <a:pPr algn="ctr" fontAlgn="ctr"/>
                       <a:r>
-                        <a:rPr lang="he-IL" sz="3200" b="0" i="0" u="none" strike="noStrike">
+                        <a:rPr lang="he-IL" sz="3200" b="0" i="0" u="none" strike="noStrike" dirty="0">
                           <a:solidFill>
                             <a:srgbClr val="000000"/>
                           </a:solidFill>
@@ -9677,7 +9582,7 @@
                     <a:p>
                       <a:pPr algn="ctr" fontAlgn="ctr"/>
                       <a:r>
-                        <a:rPr lang="he-IL" sz="3200" b="0" i="0" u="none" strike="noStrike">
+                        <a:rPr lang="he-IL" sz="3200" b="0" i="0" u="none" strike="noStrike" dirty="0">
                           <a:solidFill>
                             <a:srgbClr val="000000"/>
                           </a:solidFill>
@@ -9714,7 +9619,7 @@
                     <a:p>
                       <a:pPr algn="ctr" fontAlgn="ctr"/>
                       <a:r>
-                        <a:rPr lang="he-IL" sz="3200" b="0" i="0" u="none" strike="noStrike">
+                        <a:rPr lang="he-IL" sz="3200" b="0" i="0" u="none" strike="noStrike" dirty="0">
                           <a:solidFill>
                             <a:srgbClr val="000000"/>
                           </a:solidFill>
@@ -9794,7 +9699,7 @@
                     <a:p>
                       <a:pPr algn="ctr" fontAlgn="ctr"/>
                       <a:r>
-                        <a:rPr lang="he-IL" sz="3200" b="0" i="0" u="none" strike="noStrike">
+                        <a:rPr lang="he-IL" sz="3200" b="0" i="0" u="none" strike="noStrike" dirty="0">
                           <a:solidFill>
                             <a:srgbClr val="000000"/>
                           </a:solidFill>
@@ -9837,7 +9742,7 @@
                     <a:p>
                       <a:pPr algn="ctr" fontAlgn="ctr"/>
                       <a:r>
-                        <a:rPr lang="he-IL" sz="3200" b="0" i="0" u="none" strike="noStrike">
+                        <a:rPr lang="he-IL" sz="3200" b="0" i="0" u="none" strike="noStrike" dirty="0">
                           <a:solidFill>
                             <a:srgbClr val="000000"/>
                           </a:solidFill>
@@ -9874,7 +9779,7 @@
                     <a:p>
                       <a:pPr algn="ctr" fontAlgn="ctr"/>
                       <a:r>
-                        <a:rPr lang="he-IL" sz="3200" b="0" i="0" u="none" strike="noStrike">
+                        <a:rPr lang="he-IL" sz="3200" b="0" i="0" u="none" strike="noStrike" dirty="0">
                           <a:solidFill>
                             <a:srgbClr val="000000"/>
                           </a:solidFill>
@@ -9973,7 +9878,7 @@
                     <a:p>
                       <a:pPr algn="ctr" fontAlgn="ctr"/>
                       <a:r>
-                        <a:rPr lang="he-IL" sz="3200" b="0" i="0" u="none" strike="noStrike">
+                        <a:rPr lang="he-IL" sz="3200" b="0" i="0" u="none" strike="noStrike" dirty="0">
                           <a:solidFill>
                             <a:srgbClr val="000000"/>
                           </a:solidFill>
@@ -10016,7 +9921,7 @@
                     <a:p>
                       <a:pPr algn="ctr" fontAlgn="ctr"/>
                       <a:r>
-                        <a:rPr lang="he-IL" sz="3200" b="0" i="0" u="none" strike="noStrike">
+                        <a:rPr lang="he-IL" sz="3200" b="0" i="0" u="none" strike="noStrike" dirty="0">
                           <a:solidFill>
                             <a:srgbClr val="000000"/>
                           </a:solidFill>
@@ -10133,7 +10038,7 @@
                     <a:p>
                       <a:pPr algn="ctr" fontAlgn="ctr"/>
                       <a:r>
-                        <a:rPr lang="he-IL" sz="3200" b="0" i="0" u="none" strike="noStrike">
+                        <a:rPr lang="he-IL" sz="3200" b="0" i="0" u="none" strike="noStrike" dirty="0">
                           <a:solidFill>
                             <a:srgbClr val="000000"/>
                           </a:solidFill>
@@ -10176,7 +10081,7 @@
                     <a:p>
                       <a:pPr algn="ctr" fontAlgn="ctr"/>
                       <a:r>
-                        <a:rPr lang="he-IL" sz="3200" b="0" i="0" u="none" strike="noStrike">
+                        <a:rPr lang="he-IL" sz="3200" b="0" i="0" u="none" strike="noStrike" dirty="0">
                           <a:solidFill>
                             <a:srgbClr val="000000"/>
                           </a:solidFill>
@@ -10392,7 +10297,7 @@
                     <a:p>
                       <a:pPr algn="ctr" fontAlgn="ctr"/>
                       <a:r>
-                        <a:rPr lang="he-IL" sz="3200" b="0" i="0" u="none" strike="noStrike">
+                        <a:rPr lang="he-IL" sz="3200" b="0" i="0" u="none" strike="noStrike" dirty="0">
                           <a:solidFill>
                             <a:srgbClr val="000000"/>
                           </a:solidFill>
@@ -10515,7 +10420,7 @@
                     <a:p>
                       <a:pPr algn="ctr" fontAlgn="ctr"/>
                       <a:r>
-                        <a:rPr lang="he-IL" sz="3200" b="0" i="0" u="none" strike="noStrike">
+                        <a:rPr lang="he-IL" sz="3200" b="0" i="0" u="none" strike="noStrike" dirty="0">
                           <a:solidFill>
                             <a:srgbClr val="000000"/>
                           </a:solidFill>
@@ -10552,7 +10457,7 @@
                     <a:p>
                       <a:pPr algn="ctr" fontAlgn="ctr"/>
                       <a:r>
-                        <a:rPr lang="he-IL" sz="3200" b="0" i="0" u="none" strike="noStrike">
+                        <a:rPr lang="he-IL" sz="3200" b="0" i="0" u="none" strike="noStrike" dirty="0">
                           <a:solidFill>
                             <a:srgbClr val="000000"/>
                           </a:solidFill>
@@ -10719,7 +10624,7 @@
                     <a:p>
                       <a:pPr algn="ctr" fontAlgn="ctr"/>
                       <a:r>
-                        <a:rPr lang="he-IL" sz="3200" b="0" i="0" u="none" strike="noStrike">
+                        <a:rPr lang="he-IL" sz="3200" b="0" i="0" u="none" strike="noStrike" dirty="0">
                           <a:solidFill>
                             <a:srgbClr val="000000"/>
                           </a:solidFill>
@@ -10759,7 +10664,7 @@
                     <a:p>
                       <a:pPr algn="ctr" fontAlgn="ctr"/>
                       <a:r>
-                        <a:rPr lang="he-IL" sz="3200" b="0" i="0" u="none" strike="noStrike">
+                        <a:rPr lang="he-IL" sz="3200" b="0" i="0" u="none" strike="noStrike" dirty="0">
                           <a:solidFill>
                             <a:srgbClr val="000000"/>
                           </a:solidFill>
@@ -11033,7 +10938,7 @@
                     <a:p>
                       <a:pPr algn="ctr" fontAlgn="ctr"/>
                       <a:r>
-                        <a:rPr lang="he-IL" sz="3200" b="0" i="0" u="none" strike="noStrike">
+                        <a:rPr lang="he-IL" sz="3200" b="0" i="0" u="none" strike="noStrike" dirty="0">
                           <a:solidFill>
                             <a:srgbClr val="000000"/>
                           </a:solidFill>
@@ -11076,7 +10981,7 @@
                     <a:p>
                       <a:pPr algn="ctr" fontAlgn="ctr"/>
                       <a:r>
-                        <a:rPr lang="he-IL" sz="3200" b="0" i="0" u="none" strike="noStrike">
+                        <a:rPr lang="he-IL" sz="3200" b="0" i="0" u="none" strike="noStrike" dirty="0">
                           <a:solidFill>
                             <a:srgbClr val="000000"/>
                           </a:solidFill>
@@ -11113,7 +11018,7 @@
                     <a:p>
                       <a:pPr algn="ctr" fontAlgn="ctr"/>
                       <a:r>
-                        <a:rPr lang="he-IL" sz="3200" b="0" i="0" u="none" strike="noStrike">
+                        <a:rPr lang="he-IL" sz="3200" b="0" i="0" u="none" strike="noStrike" dirty="0">
                           <a:solidFill>
                             <a:srgbClr val="000000"/>
                           </a:solidFill>
@@ -11236,7 +11141,7 @@
                     <a:p>
                       <a:pPr algn="ctr" fontAlgn="ctr"/>
                       <a:r>
-                        <a:rPr lang="he-IL" sz="3200" b="0" i="0" u="none" strike="noStrike">
+                        <a:rPr lang="he-IL" sz="3200" b="0" i="0" u="none" strike="noStrike" dirty="0">
                           <a:solidFill>
                             <a:srgbClr val="000000"/>
                           </a:solidFill>
@@ -11273,7 +11178,7 @@
                     <a:p>
                       <a:pPr algn="ctr" fontAlgn="ctr"/>
                       <a:r>
-                        <a:rPr lang="he-IL" sz="3200" b="0" i="0" u="none" strike="noStrike">
+                        <a:rPr lang="he-IL" sz="3200" b="0" i="0" u="none" strike="noStrike" dirty="0">
                           <a:solidFill>
                             <a:srgbClr val="000000"/>
                           </a:solidFill>
@@ -11415,7 +11320,7 @@
                     <a:p>
                       <a:pPr algn="ctr" fontAlgn="ctr"/>
                       <a:r>
-                        <a:rPr lang="he-IL" sz="3200" b="0" i="0" u="none" strike="noStrike">
+                        <a:rPr lang="he-IL" sz="3200" b="0" i="0" u="none" strike="noStrike" dirty="0">
                           <a:solidFill>
                             <a:srgbClr val="000000"/>
                           </a:solidFill>
@@ -11575,7 +11480,7 @@
                     <a:p>
                       <a:pPr algn="ctr" fontAlgn="ctr"/>
                       <a:r>
-                        <a:rPr lang="he-IL" sz="3200" b="0" i="0" u="none" strike="noStrike">
+                        <a:rPr lang="he-IL" sz="3200" b="0" i="0" u="none" strike="noStrike" dirty="0">
                           <a:solidFill>
                             <a:srgbClr val="000000"/>
                           </a:solidFill>
@@ -11711,7 +11616,7 @@
                     <a:p>
                       <a:pPr algn="ctr" fontAlgn="ctr"/>
                       <a:r>
-                        <a:rPr lang="he-IL" sz="3200" b="0" i="0" u="none" strike="noStrike">
+                        <a:rPr lang="he-IL" sz="3200" b="0" i="0" u="none" strike="noStrike" dirty="0">
                           <a:solidFill>
                             <a:srgbClr val="000000"/>
                           </a:solidFill>
@@ -11754,7 +11659,7 @@
                     <a:p>
                       <a:pPr algn="ctr" fontAlgn="ctr"/>
                       <a:r>
-                        <a:rPr lang="he-IL" sz="3200" b="0" i="0" u="none" strike="noStrike">
+                        <a:rPr lang="he-IL" sz="3200" b="0" i="0" u="none" strike="noStrike" dirty="0">
                           <a:solidFill>
                             <a:srgbClr val="000000"/>
                           </a:solidFill>
@@ -11791,7 +11696,7 @@
                     <a:p>
                       <a:pPr algn="ctr" fontAlgn="ctr"/>
                       <a:r>
-                        <a:rPr lang="he-IL" sz="3200" b="0" i="0" u="none" strike="noStrike">
+                        <a:rPr lang="he-IL" sz="3200" b="0" i="0" u="none" strike="noStrike" dirty="0">
                           <a:solidFill>
                             <a:srgbClr val="000000"/>
                           </a:solidFill>
@@ -11951,7 +11856,7 @@
                     <a:p>
                       <a:pPr algn="ctr" fontAlgn="ctr"/>
                       <a:r>
-                        <a:rPr lang="he-IL" sz="3200" b="0" i="0" u="none" strike="noStrike">
+                        <a:rPr lang="he-IL" sz="3200" b="0" i="0" u="none" strike="noStrike" dirty="0">
                           <a:solidFill>
                             <a:srgbClr val="000000"/>
                           </a:solidFill>
@@ -12050,7 +11955,7 @@
                     <a:p>
                       <a:pPr algn="ctr" fontAlgn="ctr"/>
                       <a:r>
-                        <a:rPr lang="he-IL" sz="3200" b="0" i="0" u="none" strike="noStrike">
+                        <a:rPr lang="he-IL" sz="3200" b="0" i="0" u="none" strike="noStrike" dirty="0">
                           <a:solidFill>
                             <a:srgbClr val="000000"/>
                           </a:solidFill>
@@ -12093,7 +11998,7 @@
                     <a:p>
                       <a:pPr algn="ctr" fontAlgn="ctr"/>
                       <a:r>
-                        <a:rPr lang="he-IL" sz="3200" b="0" i="0" u="none" strike="noStrike">
+                        <a:rPr lang="he-IL" sz="3200" b="0" i="0" u="none" strike="noStrike" dirty="0">
                           <a:solidFill>
                             <a:srgbClr val="000000"/>
                           </a:solidFill>
@@ -12130,7 +12035,7 @@
                     <a:p>
                       <a:pPr algn="ctr" fontAlgn="ctr"/>
                       <a:r>
-                        <a:rPr lang="he-IL" sz="3200" b="0" i="0" u="none" strike="noStrike">
+                        <a:rPr lang="he-IL" sz="3200" b="0" i="0" u="none" strike="noStrike" dirty="0">
                           <a:solidFill>
                             <a:srgbClr val="000000"/>
                           </a:solidFill>
@@ -12210,7 +12115,7 @@
                     <a:p>
                       <a:pPr algn="ctr" fontAlgn="ctr"/>
                       <a:r>
-                        <a:rPr lang="he-IL" sz="3200" b="0" i="0" u="none" strike="noStrike">
+                        <a:rPr lang="he-IL" sz="3200" b="0" i="0" u="none" strike="noStrike" dirty="0">
                           <a:solidFill>
                             <a:srgbClr val="000000"/>
                           </a:solidFill>
@@ -12290,7 +12195,7 @@
                     <a:p>
                       <a:pPr algn="ctr" fontAlgn="ctr"/>
                       <a:r>
-                        <a:rPr lang="he-IL" sz="3200" b="0" i="0" u="none" strike="noStrike">
+                        <a:rPr lang="he-IL" sz="3200" b="0" i="0" u="none" strike="noStrike" dirty="0">
                           <a:solidFill>
                             <a:srgbClr val="000000"/>
                           </a:solidFill>
@@ -12403,7 +12308,7 @@
                     <a:p>
                       <a:pPr algn="ctr" fontAlgn="ctr"/>
                       <a:r>
-                        <a:rPr lang="he-IL" sz="3200" b="0" i="0" u="none" strike="noStrike">
+                        <a:rPr lang="he-IL" sz="3200" b="0" i="0" u="none" strike="noStrike" dirty="0">
                           <a:solidFill>
                             <a:srgbClr val="000000"/>
                           </a:solidFill>
@@ -12449,7 +12354,7 @@
                     <a:p>
                       <a:pPr algn="ctr" fontAlgn="ctr"/>
                       <a:r>
-                        <a:rPr lang="he-IL" sz="3200" b="0" i="0" u="none" strike="noStrike">
+                        <a:rPr lang="he-IL" sz="3200" b="0" i="0" u="none" strike="noStrike" dirty="0">
                           <a:solidFill>
                             <a:srgbClr val="000000"/>
                           </a:solidFill>
@@ -12489,7 +12394,7 @@
                     <a:p>
                       <a:pPr algn="ctr" fontAlgn="ctr"/>
                       <a:r>
-                        <a:rPr lang="he-IL" sz="3200" b="0" i="0" u="none" strike="noStrike">
+                        <a:rPr lang="he-IL" sz="3200" b="0" i="0" u="none" strike="noStrike" dirty="0">
                           <a:solidFill>
                             <a:srgbClr val="000000"/>
                           </a:solidFill>
@@ -12754,7 +12659,7 @@
                     <a:p>
                       <a:pPr algn="ctr" fontAlgn="ctr"/>
                       <a:r>
-                        <a:rPr lang="he-IL" sz="3200" b="0" i="0" u="none" strike="noStrike">
+                        <a:rPr lang="he-IL" sz="3200" b="0" i="0" u="none" strike="noStrike" dirty="0">
                           <a:solidFill>
                             <a:srgbClr val="000000"/>
                           </a:solidFill>
@@ -12800,7 +12705,7 @@
                     <a:p>
                       <a:pPr algn="ctr" fontAlgn="ctr"/>
                       <a:r>
-                        <a:rPr lang="he-IL" sz="3200" b="0" i="0" u="none" strike="noStrike">
+                        <a:rPr lang="he-IL" sz="3200" b="0" i="0" u="none" strike="noStrike" dirty="0">
                           <a:solidFill>
                             <a:srgbClr val="000000"/>
                           </a:solidFill>
@@ -12840,7 +12745,7 @@
                     <a:p>
                       <a:pPr algn="ctr" fontAlgn="ctr"/>
                       <a:r>
-                        <a:rPr lang="he-IL" sz="3200" b="0" i="0" u="none" strike="noStrike">
+                        <a:rPr lang="he-IL" sz="3200" b="0" i="0" u="none" strike="noStrike" dirty="0">
                           <a:solidFill>
                             <a:srgbClr val="000000"/>
                           </a:solidFill>
@@ -13267,6 +13172,41 @@
           </a:graphicData>
         </a:graphic>
       </p:graphicFrame>
+      <p:pic>
+        <p:nvPicPr>
+          <p:cNvPr id="3" name="Picture 2" descr="A picture containing text, line, screenshot, plot&#10;&#10;Description automatically generated">
+            <a:extLst>
+              <a:ext uri="{FF2B5EF4-FFF2-40B4-BE49-F238E27FC236}">
+                <a16:creationId xmlns:a16="http://schemas.microsoft.com/office/drawing/2014/main" id="{7DAC06D9-AB4C-46AB-6EF8-5DD1078F3A28}"/>
+              </a:ext>
+            </a:extLst>
+          </p:cNvPr>
+          <p:cNvPicPr>
+            <a:picLocks noChangeAspect="1"/>
+          </p:cNvPicPr>
+          <p:nvPr/>
+        </p:nvPicPr>
+        <p:blipFill rotWithShape="1">
+          <a:blip r:embed="rId4">
+            <a:extLst>
+              <a:ext uri="{28A0092B-C50C-407E-A947-70E740481C1C}">
+                <a14:useLocalDpi xmlns:a14="http://schemas.microsoft.com/office/drawing/2010/main" val="0"/>
+              </a:ext>
+            </a:extLst>
+          </a:blip>
+          <a:srcRect t="13089"/>
+          <a:stretch/>
+        </p:blipFill>
+        <p:spPr>
+          <a:xfrm>
+            <a:off x="15524786" y="20403720"/>
+            <a:ext cx="13145797" cy="8568758"/>
+          </a:xfrm>
+          <a:prstGeom prst="rect">
+            <a:avLst/>
+          </a:prstGeom>
+        </p:spPr>
+      </p:pic>
       <p:pic>
         <p:nvPicPr>
           <p:cNvPr id="4" name="Picture 3" descr="A picture containing text, screenshot, diagram, line&#10;&#10;Description automatically generated">
@@ -13294,7 +13234,7 @@
         </p:blipFill>
         <p:spPr>
           <a:xfrm>
-            <a:off x="23279522" y="23690480"/>
+            <a:off x="24348465" y="23615739"/>
             <a:ext cx="3495736" cy="3266447"/>
           </a:xfrm>
           <a:prstGeom prst="rect">
@@ -13302,6 +13242,51 @@
           </a:prstGeom>
         </p:spPr>
       </p:pic>
+      <p:sp>
+        <p:nvSpPr>
+          <p:cNvPr id="10" name="AutoShape 4">
+            <a:extLst>
+              <a:ext uri="{FF2B5EF4-FFF2-40B4-BE49-F238E27FC236}">
+                <a16:creationId xmlns:a16="http://schemas.microsoft.com/office/drawing/2014/main" id="{978712EB-DDC1-FAB1-F39A-A0141EED0C01}"/>
+              </a:ext>
+            </a:extLst>
+          </p:cNvPr>
+          <p:cNvSpPr>
+            <a:spLocks noChangeAspect="1" noChangeArrowheads="1"/>
+          </p:cNvSpPr>
+          <p:nvPr/>
+        </p:nvSpPr>
+        <p:spPr bwMode="auto">
+          <a:xfrm>
+            <a:off x="14606588" y="17127538"/>
+            <a:ext cx="304800" cy="304800"/>
+          </a:xfrm>
+          <a:prstGeom prst="rect">
+            <a:avLst/>
+          </a:prstGeom>
+          <a:noFill/>
+          <a:extLst>
+            <a:ext uri="{909E8E84-426E-40DD-AFC4-6F175D3DCCD1}">
+              <a14:hiddenFill xmlns:a14="http://schemas.microsoft.com/office/drawing/2010/main">
+                <a:solidFill>
+                  <a:srgbClr val="FFFFFF"/>
+                </a:solidFill>
+              </a14:hiddenFill>
+            </a:ext>
+          </a:extLst>
+        </p:spPr>
+        <p:txBody>
+          <a:bodyPr vert="horz" wrap="square" lIns="91440" tIns="45720" rIns="91440" bIns="45720" numCol="1" anchor="t" anchorCtr="0" compatLnSpc="1">
+            <a:prstTxWarp prst="textNoShape">
+              <a:avLst/>
+            </a:prstTxWarp>
+          </a:bodyPr>
+          <a:lstStyle/>
+          <a:p>
+            <a:endParaRPr lang="he-IL" dirty="0"/>
+          </a:p>
+        </p:txBody>
+      </p:sp>
     </p:spTree>
     <p:extLst>
       <p:ext uri="{BB962C8B-B14F-4D97-AF65-F5344CB8AC3E}">

</xml_diff>